<commit_message>
dshe-proposal & scan copy folder
</commit_message>
<xml_diff>
--- a/Startup/Presentation_iDEA.pptx
+++ b/Startup/Presentation_iDEA.pptx
@@ -4121,7 +4121,7 @@
         <a:lstStyle/>
         <a:p>
           <a:r>
-            <a:rPr lang="en-US" sz="1200">
+            <a:rPr lang="en-US" sz="1200" b="1">
               <a:latin typeface="Times New Roman" panose="02020603050405020304" pitchFamily="18" charset="0"/>
               <a:cs typeface="Times New Roman" panose="02020603050405020304" pitchFamily="18" charset="0"/>
             </a:rPr>
@@ -4161,7 +4161,7 @@
         <a:p>
           <a:pPr algn="ctr"/>
           <a:r>
-            <a:rPr lang="en-US" sz="1200">
+            <a:rPr lang="en-US" sz="1200" b="1">
               <a:latin typeface="Times New Roman" panose="02020603050405020304" pitchFamily="18" charset="0"/>
               <a:cs typeface="Times New Roman" panose="02020603050405020304" pitchFamily="18" charset="0"/>
             </a:rPr>
@@ -4201,7 +4201,7 @@
         <a:p>
           <a:pPr algn="ctr"/>
           <a:r>
-            <a:rPr lang="en-US" sz="1200" dirty="0">
+            <a:rPr lang="en-US" sz="1200" b="1" dirty="0">
               <a:latin typeface="Times New Roman" panose="02020603050405020304" pitchFamily="18" charset="0"/>
               <a:cs typeface="Times New Roman" panose="02020603050405020304" pitchFamily="18" charset="0"/>
             </a:rPr>
@@ -4211,7 +4211,7 @@
         <a:p>
           <a:pPr algn="ctr"/>
           <a:r>
-            <a:rPr lang="en-US" sz="1200" dirty="0">
+            <a:rPr lang="en-US" sz="1200" b="1" dirty="0">
               <a:latin typeface="Times New Roman" panose="02020603050405020304" pitchFamily="18" charset="0"/>
               <a:cs typeface="Times New Roman" panose="02020603050405020304" pitchFamily="18" charset="0"/>
             </a:rPr>
@@ -4250,7 +4250,7 @@
         <a:lstStyle/>
         <a:p>
           <a:r>
-            <a:rPr lang="en-US" sz="1200" dirty="0">
+            <a:rPr lang="en-US" sz="1200" b="1" dirty="0">
               <a:latin typeface="Times New Roman" panose="02020603050405020304" pitchFamily="18" charset="0"/>
               <a:cs typeface="Times New Roman" panose="02020603050405020304" pitchFamily="18" charset="0"/>
             </a:rPr>
@@ -4259,7 +4259,7 @@
         </a:p>
         <a:p>
           <a:r>
-            <a:rPr lang="en-US" sz="1200" dirty="0">
+            <a:rPr lang="en-US" sz="1200" b="1" dirty="0">
               <a:latin typeface="Times New Roman" panose="02020603050405020304" pitchFamily="18" charset="0"/>
               <a:cs typeface="Times New Roman" panose="02020603050405020304" pitchFamily="18" charset="0"/>
             </a:rPr>
@@ -4298,7 +4298,7 @@
         <a:lstStyle/>
         <a:p>
           <a:r>
-            <a:rPr lang="en-US" sz="1200">
+            <a:rPr lang="en-US" sz="1200" b="1">
               <a:latin typeface="Times New Roman" panose="02020603050405020304" pitchFamily="18" charset="0"/>
               <a:cs typeface="Times New Roman" panose="02020603050405020304" pitchFamily="18" charset="0"/>
             </a:rPr>
@@ -4337,7 +4337,7 @@
         <a:lstStyle/>
         <a:p>
           <a:r>
-            <a:rPr lang="en-US" sz="1200" dirty="0">
+            <a:rPr lang="en-US" sz="1200" b="1" dirty="0">
               <a:latin typeface="Times New Roman" panose="02020603050405020304" pitchFamily="18" charset="0"/>
               <a:cs typeface="Times New Roman" panose="02020603050405020304" pitchFamily="18" charset="0"/>
             </a:rPr>
@@ -4346,7 +4346,7 @@
         </a:p>
         <a:p>
           <a:r>
-            <a:rPr lang="en-US" sz="1200" dirty="0">
+            <a:rPr lang="en-US" sz="1200" b="1" dirty="0">
               <a:latin typeface="Times New Roman" panose="02020603050405020304" pitchFamily="18" charset="0"/>
               <a:cs typeface="Times New Roman" panose="02020603050405020304" pitchFamily="18" charset="0"/>
             </a:rPr>
@@ -4385,7 +4385,7 @@
         <a:lstStyle/>
         <a:p>
           <a:r>
-            <a:rPr lang="en-US" sz="1200" dirty="0">
+            <a:rPr lang="en-US" sz="1200" b="1" dirty="0">
               <a:latin typeface="Times New Roman" panose="02020603050405020304" pitchFamily="18" charset="0"/>
               <a:cs typeface="Times New Roman" panose="02020603050405020304" pitchFamily="18" charset="0"/>
             </a:rPr>
@@ -4394,7 +4394,7 @@
         </a:p>
         <a:p>
           <a:r>
-            <a:rPr lang="en-US" sz="1200" dirty="0">
+            <a:rPr lang="en-US" sz="1200" b="1" dirty="0">
               <a:latin typeface="Times New Roman" panose="02020603050405020304" pitchFamily="18" charset="0"/>
               <a:cs typeface="Times New Roman" panose="02020603050405020304" pitchFamily="18" charset="0"/>
             </a:rPr>
@@ -4450,7 +4450,7 @@
       <dgm:spPr/>
     </dgm:pt>
     <dgm:pt modelId="{27A85491-2A19-4D0E-BF4C-6F8B70D97B1E}" type="pres">
-      <dgm:prSet presAssocID="{CB5159F0-3D4F-429D-80F8-228ABC7798F5}" presName="text" presStyleLbl="fgAcc0" presStyleIdx="0" presStyleCnt="1">
+      <dgm:prSet presAssocID="{CB5159F0-3D4F-429D-80F8-228ABC7798F5}" presName="text" presStyleLbl="fgAcc0" presStyleIdx="0" presStyleCnt="1" custLinFactNeighborX="1039" custLinFactNeighborY="-2371">
         <dgm:presLayoutVars>
           <dgm:chPref val="3"/>
         </dgm:presLayoutVars>
@@ -4727,7 +4727,10 @@
         <a:p>
           <a:pPr algn="ctr"/>
           <a:r>
-            <a:rPr lang="en-US" sz="1400" dirty="0">
+            <a:rPr lang="en-US" sz="1400" b="1" dirty="0">
+              <a:solidFill>
+                <a:schemeClr val="tx1"/>
+              </a:solidFill>
               <a:latin typeface="Times New Roman" panose="02020603050405020304" pitchFamily="18" charset="0"/>
               <a:cs typeface="Times New Roman" panose="02020603050405020304" pitchFamily="18" charset="0"/>
             </a:rPr>
@@ -4853,7 +4856,10 @@
         <a:p>
           <a:pPr algn="ctr"/>
           <a:r>
-            <a:rPr lang="en-US" sz="1200" dirty="0">
+            <a:rPr lang="en-US" sz="1100" b="1" dirty="0">
+              <a:solidFill>
+                <a:schemeClr val="tx1"/>
+              </a:solidFill>
               <a:latin typeface="Times New Roman" panose="02020603050405020304" pitchFamily="18" charset="0"/>
               <a:cs typeface="Times New Roman" panose="02020603050405020304" pitchFamily="18" charset="0"/>
             </a:rPr>
@@ -4993,11 +4999,14 @@
         <a:p>
           <a:pPr algn="ctr"/>
           <a:r>
-            <a:rPr lang="en-US" sz="1600" dirty="0">
+            <a:rPr lang="en-US" sz="1600" b="1" dirty="0">
+              <a:solidFill>
+                <a:schemeClr val="tx1"/>
+              </a:solidFill>
               <a:latin typeface="Times New Roman" panose="02020603050405020304" pitchFamily="18" charset="0"/>
               <a:cs typeface="Times New Roman" panose="02020603050405020304" pitchFamily="18" charset="0"/>
             </a:rPr>
-            <a:t>Payment gateway</a:t>
+            <a:t>Payment Gateway</a:t>
           </a:r>
         </a:p>
       </dgm:t>
@@ -5027,14 +5036,20 @@
       </dgm:t>
     </dgm:pt>
     <dgm:pt modelId="{F5D05CB3-EF88-4863-A22A-0AD57D43AC36}">
-      <dgm:prSet phldrT="[Text]"/>
+      <dgm:prSet phldrT="[Text]" custT="1"/>
       <dgm:spPr/>
       <dgm:t>
         <a:bodyPr/>
         <a:lstStyle/>
         <a:p>
           <a:pPr algn="just"/>
-          <a:endParaRPr lang="en-US" dirty="0"/>
+          <a:r>
+            <a:rPr lang="en-US" sz="1400" dirty="0">
+              <a:latin typeface="Times New Roman" panose="02020603050405020304" pitchFamily="18" charset="0"/>
+              <a:cs typeface="Times New Roman" panose="02020603050405020304" pitchFamily="18" charset="0"/>
+            </a:rPr>
+            <a:t>Registration with payment and get username and password</a:t>
+          </a:r>
         </a:p>
       </dgm:t>
     </dgm:pt>
@@ -5051,45 +5066,6 @@
       </dgm:t>
     </dgm:pt>
     <dgm:pt modelId="{4BB9F2BD-EA0D-4D36-AA43-6CC8F666F4DB}" type="sibTrans" cxnId="{32F0EB2D-3AF0-4343-BDD8-ACDFB61963E9}">
-      <dgm:prSet/>
-      <dgm:spPr/>
-      <dgm:t>
-        <a:bodyPr/>
-        <a:lstStyle/>
-        <a:p>
-          <a:pPr algn="just"/>
-          <a:endParaRPr lang="en-US"/>
-        </a:p>
-      </dgm:t>
-    </dgm:pt>
-    <dgm:pt modelId="{2577DCC8-3949-4A26-BFA3-D8BFA5303839}">
-      <dgm:prSet phldrT="[Text]"/>
-      <dgm:spPr/>
-      <dgm:t>
-        <a:bodyPr/>
-        <a:lstStyle/>
-        <a:p>
-          <a:pPr algn="just"/>
-          <a:r>
-            <a:rPr lang="en-US" dirty="0"/>
-            <a:t>Registration with payment and get username and password</a:t>
-          </a:r>
-        </a:p>
-      </dgm:t>
-    </dgm:pt>
-    <dgm:pt modelId="{40B680A8-544B-43FF-8302-B4C283BADB1A}" type="parTrans" cxnId="{A170E02B-6366-482D-A2AC-0ADA43AD7BDF}">
-      <dgm:prSet/>
-      <dgm:spPr/>
-      <dgm:t>
-        <a:bodyPr/>
-        <a:lstStyle/>
-        <a:p>
-          <a:pPr algn="just"/>
-          <a:endParaRPr lang="en-US"/>
-        </a:p>
-      </dgm:t>
-    </dgm:pt>
-    <dgm:pt modelId="{364D79BE-27C6-431F-AD37-53D7565C0F20}" type="sibTrans" cxnId="{A170E02B-6366-482D-A2AC-0ADA43AD7BDF}">
       <dgm:prSet/>
       <dgm:spPr/>
       <dgm:t>
@@ -5228,7 +5204,7 @@
       </dgm:t>
     </dgm:pt>
     <dgm:pt modelId="{74A36379-CA3E-4D74-B28E-5EE25B16F959}">
-      <dgm:prSet phldrT="[Text]"/>
+      <dgm:prSet phldrT="[Text]" custT="1"/>
       <dgm:spPr/>
       <dgm:t>
         <a:bodyPr/>
@@ -5236,7 +5212,10 @@
         <a:p>
           <a:pPr algn="just"/>
           <a:r>
-            <a:rPr lang="en-US" dirty="0"/>
+            <a:rPr lang="en-US" sz="1400" dirty="0">
+              <a:latin typeface="Times New Roman" panose="02020603050405020304" pitchFamily="18" charset="0"/>
+              <a:cs typeface="Times New Roman" panose="02020603050405020304" pitchFamily="18" charset="0"/>
+            </a:rPr>
             <a:t>Without username and password no one can enter the webpage</a:t>
           </a:r>
         </a:p>
@@ -5265,7 +5244,7 @@
       </dgm:t>
     </dgm:pt>
     <dgm:pt modelId="{CFE90F19-DEE6-4FAF-9D6D-C37EB1C4E52C}">
-      <dgm:prSet phldrT="[Text]"/>
+      <dgm:prSet phldrT="[Text]" custT="1"/>
       <dgm:spPr/>
       <dgm:t>
         <a:bodyPr/>
@@ -5273,7 +5252,10 @@
         <a:p>
           <a:pPr algn="just"/>
           <a:r>
-            <a:rPr lang="en-US" dirty="0"/>
+            <a:rPr lang="en-US" sz="1400" dirty="0">
+              <a:latin typeface="Times New Roman" panose="02020603050405020304" pitchFamily="18" charset="0"/>
+              <a:cs typeface="Times New Roman" panose="02020603050405020304" pitchFamily="18" charset="0"/>
+            </a:rPr>
             <a:t>Without monthly payment studentship will be terminated from webpage</a:t>
           </a:r>
         </a:p>
@@ -5302,7 +5284,7 @@
       </dgm:t>
     </dgm:pt>
     <dgm:pt modelId="{AA83F903-BC37-418E-B9DD-0CB9F5C4E1F5}">
-      <dgm:prSet phldrT="[Text]"/>
+      <dgm:prSet phldrT="[Text]" custT="1"/>
       <dgm:spPr/>
       <dgm:t>
         <a:bodyPr/>
@@ -5310,7 +5292,10 @@
         <a:p>
           <a:pPr algn="just"/>
           <a:r>
-            <a:rPr lang="en-US" dirty="0"/>
+            <a:rPr lang="en-US" sz="1400" dirty="0">
+              <a:latin typeface="Times New Roman" panose="02020603050405020304" pitchFamily="18" charset="0"/>
+              <a:cs typeface="Times New Roman" panose="02020603050405020304" pitchFamily="18" charset="0"/>
+            </a:rPr>
             <a:t>Payment direct transfer to institute account at specific time. </a:t>
           </a:r>
         </a:p>
@@ -5387,7 +5372,7 @@
       <dgm:spPr/>
     </dgm:pt>
     <dgm:pt modelId="{84002781-99DF-4BC0-B6A4-70859C3B65C9}" type="pres">
-      <dgm:prSet presAssocID="{E1623A83-C88A-479D-980E-F9049F588974}" presName="descendantText" presStyleLbl="alignAcc1" presStyleIdx="1" presStyleCnt="3" custScaleY="140450">
+      <dgm:prSet presAssocID="{E1623A83-C88A-479D-980E-F9049F588974}" presName="descendantText" presStyleLbl="alignAcc1" presStyleIdx="1" presStyleCnt="3" custScaleY="107593">
         <dgm:presLayoutVars>
           <dgm:bulletEnabled val="1"/>
         </dgm:presLayoutVars>
@@ -5412,7 +5397,7 @@
       <dgm:spPr/>
     </dgm:pt>
     <dgm:pt modelId="{69E9353B-9F86-4C08-A79E-1E0D912504FE}" type="pres">
-      <dgm:prSet presAssocID="{E9547AEF-38A3-4ECC-91DD-273153C55815}" presName="descendantText" presStyleLbl="alignAcc1" presStyleIdx="2" presStyleCnt="3" custScaleY="142860">
+      <dgm:prSet presAssocID="{E9547AEF-38A3-4ECC-91DD-273153C55815}" presName="descendantText" presStyleLbl="alignAcc1" presStyleIdx="2" presStyleCnt="3" custScaleY="100025">
         <dgm:presLayoutVars>
           <dgm:bulletEnabled val="1"/>
         </dgm:presLayoutVars>
@@ -5425,30 +5410,28 @@
     <dgm:cxn modelId="{87D3A209-AD4F-4A36-A515-1F10E715B0AA}" type="presOf" srcId="{E9547AEF-38A3-4ECC-91DD-273153C55815}" destId="{80218641-E6E0-42A9-8BE7-DE8152220D28}" srcOrd="0" destOrd="0" presId="urn:microsoft.com/office/officeart/2005/8/layout/chevron2"/>
     <dgm:cxn modelId="{912A9B0D-1ED7-42FF-83C6-EAC7E62F3B8E}" type="presOf" srcId="{BDAB45A0-0B5E-4A88-B06B-93C068B4A1AA}" destId="{84002781-99DF-4BC0-B6A4-70859C3B65C9}" srcOrd="0" destOrd="1" presId="urn:microsoft.com/office/officeart/2005/8/layout/chevron2"/>
     <dgm:cxn modelId="{1892B814-1666-4B36-BEBF-74F1FC0736BC}" srcId="{C0270D47-7C52-4C4D-A11B-DFDD1A655383}" destId="{E9547AEF-38A3-4ECC-91DD-273153C55815}" srcOrd="2" destOrd="0" parTransId="{C2EE3604-9817-454E-8DE2-30B12B81BA7B}" sibTransId="{568A1E97-089A-45CB-848E-9383A3F9F8C4}"/>
-    <dgm:cxn modelId="{BBFEA01B-5469-45C9-B897-F98A1BF193F0}" srcId="{E9547AEF-38A3-4ECC-91DD-273153C55815}" destId="{AA83F903-BC37-418E-B9DD-0CB9F5C4E1F5}" srcOrd="4" destOrd="0" parTransId="{737EDE52-C31C-4AAA-8C75-660A09CE6037}" sibTransId="{067A99D8-EC1B-45EC-AF45-AEE6792FEAA4}"/>
+    <dgm:cxn modelId="{BBFEA01B-5469-45C9-B897-F98A1BF193F0}" srcId="{E9547AEF-38A3-4ECC-91DD-273153C55815}" destId="{AA83F903-BC37-418E-B9DD-0CB9F5C4E1F5}" srcOrd="3" destOrd="0" parTransId="{737EDE52-C31C-4AAA-8C75-660A09CE6037}" sibTransId="{067A99D8-EC1B-45EC-AF45-AEE6792FEAA4}"/>
     <dgm:cxn modelId="{8078A21E-ECD5-46CC-91F0-46F3AE3AF4D2}" type="presOf" srcId="{F4E99ABC-1C8D-4F95-97DD-B4E439254A54}" destId="{84002781-99DF-4BC0-B6A4-70859C3B65C9}" srcOrd="0" destOrd="2" presId="urn:microsoft.com/office/officeart/2005/8/layout/chevron2"/>
-    <dgm:cxn modelId="{7BAE5921-10FC-4551-963B-4513A94B2F14}" type="presOf" srcId="{2577DCC8-3949-4A26-BFA3-D8BFA5303839}" destId="{69E9353B-9F86-4C08-A79E-1E0D912504FE}" srcOrd="0" destOrd="1" presId="urn:microsoft.com/office/officeart/2005/8/layout/chevron2"/>
     <dgm:cxn modelId="{E214C426-1211-4B34-80EB-0812691EF725}" type="presOf" srcId="{2D20AB39-636B-405B-9BA9-D57CD5A85D34}" destId="{60E8797E-8C84-46CC-9F0E-0D50A60BD085}" srcOrd="0" destOrd="1" presId="urn:microsoft.com/office/officeart/2005/8/layout/chevron2"/>
-    <dgm:cxn modelId="{A170E02B-6366-482D-A2AC-0ADA43AD7BDF}" srcId="{E9547AEF-38A3-4ECC-91DD-273153C55815}" destId="{2577DCC8-3949-4A26-BFA3-D8BFA5303839}" srcOrd="1" destOrd="0" parTransId="{40B680A8-544B-43FF-8302-B4C283BADB1A}" sibTransId="{364D79BE-27C6-431F-AD37-53D7565C0F20}"/>
     <dgm:cxn modelId="{32F0EB2D-3AF0-4343-BDD8-ACDFB61963E9}" srcId="{E9547AEF-38A3-4ECC-91DD-273153C55815}" destId="{F5D05CB3-EF88-4863-A22A-0AD57D43AC36}" srcOrd="0" destOrd="0" parTransId="{6A56774E-7661-485E-AA31-713695E7D6C9}" sibTransId="{4BB9F2BD-EA0D-4D36-AA43-6CC8F666F4DB}"/>
     <dgm:cxn modelId="{8A70802F-51A6-49DC-8A26-0AEDD5DBE37F}" type="presOf" srcId="{9421B519-AC39-453A-8C12-82D10408DC48}" destId="{84002781-99DF-4BC0-B6A4-70859C3B65C9}" srcOrd="0" destOrd="3" presId="urn:microsoft.com/office/officeart/2005/8/layout/chevron2"/>
-    <dgm:cxn modelId="{67BF4032-903E-4B3C-9D96-74BD6BC86B47}" srcId="{E9547AEF-38A3-4ECC-91DD-273153C55815}" destId="{CFE90F19-DEE6-4FAF-9D6D-C37EB1C4E52C}" srcOrd="3" destOrd="0" parTransId="{E197059F-F3A2-464F-87AC-8A82503EFFA9}" sibTransId="{DFB1ACEA-D170-43FE-A48D-F97CEF2653C5}"/>
-    <dgm:cxn modelId="{1D90E13E-60EA-45F2-85F2-61B3BEC344E2}" type="presOf" srcId="{CFE90F19-DEE6-4FAF-9D6D-C37EB1C4E52C}" destId="{69E9353B-9F86-4C08-A79E-1E0D912504FE}" srcOrd="0" destOrd="3" presId="urn:microsoft.com/office/officeart/2005/8/layout/chevron2"/>
+    <dgm:cxn modelId="{67BF4032-903E-4B3C-9D96-74BD6BC86B47}" srcId="{E9547AEF-38A3-4ECC-91DD-273153C55815}" destId="{CFE90F19-DEE6-4FAF-9D6D-C37EB1C4E52C}" srcOrd="2" destOrd="0" parTransId="{E197059F-F3A2-464F-87AC-8A82503EFFA9}" sibTransId="{DFB1ACEA-D170-43FE-A48D-F97CEF2653C5}"/>
+    <dgm:cxn modelId="{1D90E13E-60EA-45F2-85F2-61B3BEC344E2}" type="presOf" srcId="{CFE90F19-DEE6-4FAF-9D6D-C37EB1C4E52C}" destId="{69E9353B-9F86-4C08-A79E-1E0D912504FE}" srcOrd="0" destOrd="2" presId="urn:microsoft.com/office/officeart/2005/8/layout/chevron2"/>
     <dgm:cxn modelId="{7163D23F-8275-4A4D-8ACD-93693E13A279}" type="presOf" srcId="{879E2A2B-4958-45D2-92AF-F28AAEAA5F1F}" destId="{60E8797E-8C84-46CC-9F0E-0D50A60BD085}" srcOrd="0" destOrd="0" presId="urn:microsoft.com/office/officeart/2005/8/layout/chevron2"/>
     <dgm:cxn modelId="{01B7CA41-7B5A-45FD-BD5E-B4143885CB37}" srcId="{089EA3D8-BDF2-46E0-B800-C041C2585B4B}" destId="{2F7FE826-2783-4B9A-BE8E-0B3E962D376D}" srcOrd="2" destOrd="0" parTransId="{5AAD4A95-EDB8-422C-8B01-63FDC19FE54C}" sibTransId="{26FF3ACC-B2DD-44F6-8164-81CC97C54FDC}"/>
-    <dgm:cxn modelId="{1D1DEC46-08C0-4235-A29D-CBC9845C015A}" srcId="{E9547AEF-38A3-4ECC-91DD-273153C55815}" destId="{74A36379-CA3E-4D74-B28E-5EE25B16F959}" srcOrd="2" destOrd="0" parTransId="{61779054-E2E0-40F3-8BB4-144A0B64C2CD}" sibTransId="{20933DC5-8E9F-497F-87AF-32B7714D9B8E}"/>
+    <dgm:cxn modelId="{1D1DEC46-08C0-4235-A29D-CBC9845C015A}" srcId="{E9547AEF-38A3-4ECC-91DD-273153C55815}" destId="{74A36379-CA3E-4D74-B28E-5EE25B16F959}" srcOrd="1" destOrd="0" parTransId="{61779054-E2E0-40F3-8BB4-144A0B64C2CD}" sibTransId="{20933DC5-8E9F-497F-87AF-32B7714D9B8E}"/>
     <dgm:cxn modelId="{6104AA78-9FDE-4075-B3BA-E3B169362B39}" type="presOf" srcId="{2F7FE826-2783-4B9A-BE8E-0B3E962D376D}" destId="{60E8797E-8C84-46CC-9F0E-0D50A60BD085}" srcOrd="0" destOrd="2" presId="urn:microsoft.com/office/officeart/2005/8/layout/chevron2"/>
     <dgm:cxn modelId="{AA441779-1053-4371-B40D-24667CEE01A2}" srcId="{E1623A83-C88A-479D-980E-F9049F588974}" destId="{9421B519-AC39-453A-8C12-82D10408DC48}" srcOrd="3" destOrd="0" parTransId="{D1C61447-FA79-40EF-96F3-A18AD2D22B1D}" sibTransId="{76CE87D0-584A-4843-A4E1-E166FE87EBE3}"/>
     <dgm:cxn modelId="{0F3E718F-5FB9-4D2B-A942-85F6CBE49AED}" type="presOf" srcId="{012A00F0-0C00-4B43-AD39-82F2C692377A}" destId="{84002781-99DF-4BC0-B6A4-70859C3B65C9}" srcOrd="0" destOrd="0" presId="urn:microsoft.com/office/officeart/2005/8/layout/chevron2"/>
     <dgm:cxn modelId="{BB479296-77D1-47C1-A3C7-1B7E7A1CD671}" srcId="{E1623A83-C88A-479D-980E-F9049F588974}" destId="{012A00F0-0C00-4B43-AD39-82F2C692377A}" srcOrd="0" destOrd="0" parTransId="{D11863BE-7465-4DF8-A0C6-B6D95C3D3547}" sibTransId="{64CEF4D1-84FE-48D6-8A79-EA5B40A9D10B}"/>
-    <dgm:cxn modelId="{F0AFED97-B33A-46DF-B881-15483746C7AB}" type="presOf" srcId="{74A36379-CA3E-4D74-B28E-5EE25B16F959}" destId="{69E9353B-9F86-4C08-A79E-1E0D912504FE}" srcOrd="0" destOrd="2" presId="urn:microsoft.com/office/officeart/2005/8/layout/chevron2"/>
+    <dgm:cxn modelId="{F0AFED97-B33A-46DF-B881-15483746C7AB}" type="presOf" srcId="{74A36379-CA3E-4D74-B28E-5EE25B16F959}" destId="{69E9353B-9F86-4C08-A79E-1E0D912504FE}" srcOrd="0" destOrd="1" presId="urn:microsoft.com/office/officeart/2005/8/layout/chevron2"/>
     <dgm:cxn modelId="{7288249B-A7E9-43A6-92AB-36C04CDF21CB}" srcId="{C0270D47-7C52-4C4D-A11B-DFDD1A655383}" destId="{E1623A83-C88A-479D-980E-F9049F588974}" srcOrd="1" destOrd="0" parTransId="{1AE858E5-7B01-44D5-83B5-FC076BEEA169}" sibTransId="{FDF7C513-B3C1-4008-A953-63788CAEF3E3}"/>
     <dgm:cxn modelId="{D13F479D-FB73-46C5-8D64-1DCEEC4ACF43}" srcId="{E1623A83-C88A-479D-980E-F9049F588974}" destId="{BDAB45A0-0B5E-4A88-B06B-93C068B4A1AA}" srcOrd="1" destOrd="0" parTransId="{FABC3EAC-667D-41AE-A71A-C59C647A94B2}" sibTransId="{FC5BBEFC-ABEB-4EB0-8FD5-413656589FEC}"/>
     <dgm:cxn modelId="{F4D1BAAA-CEDB-408B-BB3D-4BE56E596690}" srcId="{089EA3D8-BDF2-46E0-B800-C041C2585B4B}" destId="{2D20AB39-636B-405B-9BA9-D57CD5A85D34}" srcOrd="1" destOrd="0" parTransId="{5D0CB9EA-61DA-4291-968C-465D18013344}" sibTransId="{153196CE-6D56-4A05-B7E5-865D6977737C}"/>
     <dgm:cxn modelId="{2A68A2AC-7B6F-47ED-B513-2C14E82E54C7}" type="presOf" srcId="{E1623A83-C88A-479D-980E-F9049F588974}" destId="{9AF23D0F-21F2-4566-AD66-4B20A9BE2B6E}" srcOrd="0" destOrd="0" presId="urn:microsoft.com/office/officeart/2005/8/layout/chevron2"/>
     <dgm:cxn modelId="{7320E6B8-99E9-4984-9882-FF586A8C58B3}" srcId="{089EA3D8-BDF2-46E0-B800-C041C2585B4B}" destId="{879E2A2B-4958-45D2-92AF-F28AAEAA5F1F}" srcOrd="0" destOrd="0" parTransId="{68889F5F-F995-4D17-BD6D-F6B2C951C949}" sibTransId="{4B8371B5-07AF-4C60-9D6E-76EAF0518137}"/>
     <dgm:cxn modelId="{15B485E4-FE2D-4054-8F0A-F911F2DC1D11}" type="presOf" srcId="{C0270D47-7C52-4C4D-A11B-DFDD1A655383}" destId="{C6494E78-AFDD-4BAD-AD9C-960D6E875106}" srcOrd="0" destOrd="0" presId="urn:microsoft.com/office/officeart/2005/8/layout/chevron2"/>
-    <dgm:cxn modelId="{17A4D4E5-7342-480A-8191-6E466A4FB21B}" type="presOf" srcId="{AA83F903-BC37-418E-B9DD-0CB9F5C4E1F5}" destId="{69E9353B-9F86-4C08-A79E-1E0D912504FE}" srcOrd="0" destOrd="4" presId="urn:microsoft.com/office/officeart/2005/8/layout/chevron2"/>
+    <dgm:cxn modelId="{17A4D4E5-7342-480A-8191-6E466A4FB21B}" type="presOf" srcId="{AA83F903-BC37-418E-B9DD-0CB9F5C4E1F5}" destId="{69E9353B-9F86-4C08-A79E-1E0D912504FE}" srcOrd="0" destOrd="3" presId="urn:microsoft.com/office/officeart/2005/8/layout/chevron2"/>
     <dgm:cxn modelId="{B53394ED-30D8-442B-8EDF-70C1B13814B4}" type="presOf" srcId="{089EA3D8-BDF2-46E0-B800-C041C2585B4B}" destId="{46764EB8-836B-4209-A8E9-277C026E793D}" srcOrd="0" destOrd="0" presId="urn:microsoft.com/office/officeart/2005/8/layout/chevron2"/>
     <dgm:cxn modelId="{3E0C15EE-3068-4543-95B1-1CDB5F518609}" srcId="{E1623A83-C88A-479D-980E-F9049F588974}" destId="{F4E99ABC-1C8D-4F95-97DD-B4E439254A54}" srcOrd="2" destOrd="0" parTransId="{A7007984-EF49-4248-84EF-8556B5C80C33}" sibTransId="{67614A9F-21E6-4DAE-A1E8-E5EBB4AB76BE}"/>
     <dgm:cxn modelId="{B7D6DBF1-64B5-44D6-A708-120B3C2C1D20}" srcId="{C0270D47-7C52-4C4D-A11B-DFDD1A655383}" destId="{089EA3D8-BDF2-46E0-B800-C041C2585B4B}" srcOrd="0" destOrd="0" parTransId="{A13EFD0B-2690-4FB4-8AAC-63DF45923AD6}" sibTransId="{9E77A90D-9EB7-4FB5-84F0-0E0B174CCB07}"/>
@@ -6584,8 +6567,8 @@
       </dsp:nvSpPr>
       <dsp:spPr>
         <a:xfrm>
-          <a:off x="5071169" y="1124901"/>
-          <a:ext cx="1052006" cy="500659"/>
+          <a:off x="5089055" y="1098983"/>
+          <a:ext cx="1034120" cy="526577"/>
         </a:xfrm>
         <a:custGeom>
           <a:avLst/>
@@ -6599,13 +6582,13 @@
                 <a:pt x="0" y="0"/>
               </a:moveTo>
               <a:lnTo>
-                <a:pt x="0" y="341184"/>
+                <a:pt x="0" y="367102"/>
               </a:lnTo>
               <a:lnTo>
-                <a:pt x="1052006" y="341184"/>
+                <a:pt x="1034120" y="367102"/>
               </a:lnTo>
               <a:lnTo>
-                <a:pt x="1052006" y="500659"/>
+                <a:pt x="1034120" y="526577"/>
               </a:lnTo>
             </a:path>
           </a:pathLst>
@@ -6889,8 +6872,8 @@
       </dsp:nvSpPr>
       <dsp:spPr>
         <a:xfrm>
-          <a:off x="4019163" y="1124901"/>
-          <a:ext cx="1052006" cy="500659"/>
+          <a:off x="4019163" y="1098983"/>
+          <a:ext cx="1069892" cy="526577"/>
         </a:xfrm>
         <a:custGeom>
           <a:avLst/>
@@ -6901,16 +6884,16 @@
           <a:pathLst>
             <a:path>
               <a:moveTo>
-                <a:pt x="1052006" y="0"/>
+                <a:pt x="1069892" y="0"/>
               </a:moveTo>
               <a:lnTo>
-                <a:pt x="1052006" y="341184"/>
+                <a:pt x="1069892" y="367102"/>
               </a:lnTo>
               <a:lnTo>
-                <a:pt x="0" y="341184"/>
+                <a:pt x="0" y="367102"/>
               </a:lnTo>
               <a:lnTo>
-                <a:pt x="0" y="500659"/>
+                <a:pt x="0" y="526577"/>
               </a:lnTo>
             </a:path>
           </a:pathLst>
@@ -6950,7 +6933,7 @@
       </dsp:nvSpPr>
       <dsp:spPr>
         <a:xfrm>
-          <a:off x="4210436" y="31771"/>
+          <a:off x="4228322" y="5853"/>
           <a:ext cx="1721465" cy="1093130"/>
         </a:xfrm>
         <a:prstGeom prst="roundRect">
@@ -7001,7 +6984,7 @@
       </dsp:nvSpPr>
       <dsp:spPr>
         <a:xfrm>
-          <a:off x="4401710" y="213481"/>
+          <a:off x="4419596" y="187563"/>
           <a:ext cx="1721465" cy="1093130"/>
         </a:xfrm>
         <a:prstGeom prst="roundRect">
@@ -7062,7 +7045,7 @@
             <a:buNone/>
           </a:pPr>
           <a:r>
-            <a:rPr lang="en-US" sz="1200" kern="1200">
+            <a:rPr lang="en-US" sz="1200" b="1" kern="1200">
               <a:latin typeface="Times New Roman" panose="02020603050405020304" pitchFamily="18" charset="0"/>
               <a:cs typeface="Times New Roman" panose="02020603050405020304" pitchFamily="18" charset="0"/>
             </a:rPr>
@@ -7071,7 +7054,7 @@
         </a:p>
       </dsp:txBody>
       <dsp:txXfrm>
-        <a:off x="4433727" y="245498"/>
+        <a:off x="4451613" y="219580"/>
         <a:ext cx="1657431" cy="1029096"/>
       </dsp:txXfrm>
     </dsp:sp>
@@ -7194,7 +7177,7 @@
             <a:buNone/>
           </a:pPr>
           <a:r>
-            <a:rPr lang="en-US" sz="1200" kern="1200">
+            <a:rPr lang="en-US" sz="1200" b="1" kern="1200">
               <a:latin typeface="Times New Roman" panose="02020603050405020304" pitchFamily="18" charset="0"/>
               <a:cs typeface="Times New Roman" panose="02020603050405020304" pitchFamily="18" charset="0"/>
             </a:rPr>
@@ -7326,7 +7309,7 @@
             <a:buNone/>
           </a:pPr>
           <a:r>
-            <a:rPr lang="en-US" sz="1200" kern="1200" dirty="0">
+            <a:rPr lang="en-US" sz="1200" b="1" kern="1200" dirty="0">
               <a:latin typeface="Times New Roman" panose="02020603050405020304" pitchFamily="18" charset="0"/>
               <a:cs typeface="Times New Roman" panose="02020603050405020304" pitchFamily="18" charset="0"/>
             </a:rPr>
@@ -7347,7 +7330,7 @@
             <a:buNone/>
           </a:pPr>
           <a:r>
-            <a:rPr lang="en-US" sz="1200" kern="1200" dirty="0">
+            <a:rPr lang="en-US" sz="1200" b="1" kern="1200" dirty="0">
               <a:latin typeface="Times New Roman" panose="02020603050405020304" pitchFamily="18" charset="0"/>
               <a:cs typeface="Times New Roman" panose="02020603050405020304" pitchFamily="18" charset="0"/>
             </a:rPr>
@@ -7479,7 +7462,7 @@
             <a:buNone/>
           </a:pPr>
           <a:r>
-            <a:rPr lang="en-US" sz="1200" kern="1200" dirty="0">
+            <a:rPr lang="en-US" sz="1200" b="1" kern="1200" dirty="0">
               <a:latin typeface="Times New Roman" panose="02020603050405020304" pitchFamily="18" charset="0"/>
               <a:cs typeface="Times New Roman" panose="02020603050405020304" pitchFamily="18" charset="0"/>
             </a:rPr>
@@ -7500,7 +7483,7 @@
             <a:buNone/>
           </a:pPr>
           <a:r>
-            <a:rPr lang="en-US" sz="1200" kern="1200" dirty="0">
+            <a:rPr lang="en-US" sz="1200" b="1" kern="1200" dirty="0">
               <a:latin typeface="Times New Roman" panose="02020603050405020304" pitchFamily="18" charset="0"/>
               <a:cs typeface="Times New Roman" panose="02020603050405020304" pitchFamily="18" charset="0"/>
             </a:rPr>
@@ -7632,7 +7615,7 @@
             <a:buNone/>
           </a:pPr>
           <a:r>
-            <a:rPr lang="en-US" sz="1200" kern="1200" dirty="0">
+            <a:rPr lang="en-US" sz="1200" b="1" kern="1200" dirty="0">
               <a:latin typeface="Times New Roman" panose="02020603050405020304" pitchFamily="18" charset="0"/>
               <a:cs typeface="Times New Roman" panose="02020603050405020304" pitchFamily="18" charset="0"/>
             </a:rPr>
@@ -7653,7 +7636,7 @@
             <a:buNone/>
           </a:pPr>
           <a:r>
-            <a:rPr lang="en-US" sz="1200" kern="1200" dirty="0">
+            <a:rPr lang="en-US" sz="1200" b="1" kern="1200" dirty="0">
               <a:latin typeface="Times New Roman" panose="02020603050405020304" pitchFamily="18" charset="0"/>
               <a:cs typeface="Times New Roman" panose="02020603050405020304" pitchFamily="18" charset="0"/>
             </a:rPr>
@@ -7785,7 +7768,7 @@
             <a:buNone/>
           </a:pPr>
           <a:r>
-            <a:rPr lang="en-US" sz="1200" kern="1200" dirty="0">
+            <a:rPr lang="en-US" sz="1200" b="1" kern="1200" dirty="0">
               <a:latin typeface="Times New Roman" panose="02020603050405020304" pitchFamily="18" charset="0"/>
               <a:cs typeface="Times New Roman" panose="02020603050405020304" pitchFamily="18" charset="0"/>
             </a:rPr>
@@ -7806,7 +7789,7 @@
             <a:buNone/>
           </a:pPr>
           <a:r>
-            <a:rPr lang="en-US" sz="1200" kern="1200" dirty="0">
+            <a:rPr lang="en-US" sz="1200" b="1" kern="1200" dirty="0">
               <a:latin typeface="Times New Roman" panose="02020603050405020304" pitchFamily="18" charset="0"/>
               <a:cs typeface="Times New Roman" panose="02020603050405020304" pitchFamily="18" charset="0"/>
             </a:rPr>
@@ -7938,7 +7921,7 @@
             <a:buNone/>
           </a:pPr>
           <a:r>
-            <a:rPr lang="en-US" sz="1200" kern="1200">
+            <a:rPr lang="en-US" sz="1200" b="1" kern="1200">
               <a:latin typeface="Times New Roman" panose="02020603050405020304" pitchFamily="18" charset="0"/>
               <a:cs typeface="Times New Roman" panose="02020603050405020304" pitchFamily="18" charset="0"/>
             </a:rPr>
@@ -7970,8 +7953,8 @@
       </dsp:nvSpPr>
       <dsp:spPr>
         <a:xfrm rot="5400000">
-          <a:off x="-235346" y="244853"/>
-          <a:ext cx="1568975" cy="1098282"/>
+          <a:off x="-256422" y="262093"/>
+          <a:ext cx="1709480" cy="1196636"/>
         </a:xfrm>
         <a:prstGeom prst="chevron">
           <a:avLst/>
@@ -8030,7 +8013,10 @@
             <a:buNone/>
           </a:pPr>
           <a:r>
-            <a:rPr lang="en-US" sz="1400" kern="1200" dirty="0">
+            <a:rPr lang="en-US" sz="1400" b="1" kern="1200" dirty="0">
+              <a:solidFill>
+                <a:schemeClr val="tx1"/>
+              </a:solidFill>
               <a:latin typeface="Times New Roman" panose="02020603050405020304" pitchFamily="18" charset="0"/>
               <a:cs typeface="Times New Roman" panose="02020603050405020304" pitchFamily="18" charset="0"/>
             </a:rPr>
@@ -8039,8 +8025,8 @@
         </a:p>
       </dsp:txBody>
       <dsp:txXfrm rot="-5400000">
-        <a:off x="1" y="558647"/>
-        <a:ext cx="1098282" cy="470693"/>
+        <a:off x="0" y="603989"/>
+        <a:ext cx="1196636" cy="512844"/>
       </dsp:txXfrm>
     </dsp:sp>
     <dsp:sp modelId="{60E8797E-8C84-46CC-9F0E-0D50A60BD085}">
@@ -8050,8 +8036,8 @@
       </dsp:nvSpPr>
       <dsp:spPr>
         <a:xfrm rot="5400000">
-          <a:off x="4033865" y="-2936309"/>
-          <a:ext cx="1020370" cy="6902717"/>
+          <a:off x="4037433" y="-2845695"/>
+          <a:ext cx="1111746" cy="6804363"/>
         </a:xfrm>
         <a:prstGeom prst="round2SameRect">
           <a:avLst/>
@@ -8160,8 +8146,8 @@
         </a:p>
       </dsp:txBody>
       <dsp:txXfrm rot="-5400000">
-        <a:off x="1092692" y="54674"/>
-        <a:ext cx="6852907" cy="920750"/>
+        <a:off x="1191125" y="54884"/>
+        <a:ext cx="6750092" cy="1003204"/>
       </dsp:txXfrm>
     </dsp:sp>
     <dsp:sp modelId="{9AF23D0F-21F2-4566-AD66-4B20A9BE2B6E}">
@@ -8171,8 +8157,8 @@
       </dsp:nvSpPr>
       <dsp:spPr>
         <a:xfrm rot="5400000">
-          <a:off x="-235346" y="1845014"/>
-          <a:ext cx="1568975" cy="1098282"/>
+          <a:off x="-256422" y="1823005"/>
+          <a:ext cx="1709480" cy="1196636"/>
         </a:xfrm>
         <a:prstGeom prst="chevron">
           <a:avLst/>
@@ -8213,12 +8199,12 @@
         </a:fontRef>
       </dsp:style>
       <dsp:txBody>
-        <a:bodyPr spcFirstLastPara="0" vert="horz" wrap="square" lIns="7620" tIns="7620" rIns="7620" bIns="7620" numCol="1" spcCol="1270" anchor="ctr" anchorCtr="0">
+        <a:bodyPr spcFirstLastPara="0" vert="horz" wrap="square" lIns="6985" tIns="6985" rIns="6985" bIns="6985" numCol="1" spcCol="1270" anchor="ctr" anchorCtr="0">
           <a:noAutofit/>
         </a:bodyPr>
         <a:lstStyle/>
         <a:p>
-          <a:pPr marL="0" lvl="0" indent="0" algn="ctr" defTabSz="533400">
+          <a:pPr marL="0" lvl="0" indent="0" algn="ctr" defTabSz="488950">
             <a:lnSpc>
               <a:spcPct val="90000"/>
             </a:lnSpc>
@@ -8231,7 +8217,10 @@
             <a:buNone/>
           </a:pPr>
           <a:r>
-            <a:rPr lang="en-US" sz="1200" kern="1200" dirty="0">
+            <a:rPr lang="en-US" sz="1100" b="1" kern="1200" dirty="0">
+              <a:solidFill>
+                <a:schemeClr val="tx1"/>
+              </a:solidFill>
               <a:latin typeface="Times New Roman" panose="02020603050405020304" pitchFamily="18" charset="0"/>
               <a:cs typeface="Times New Roman" panose="02020603050405020304" pitchFamily="18" charset="0"/>
             </a:rPr>
@@ -8240,8 +8229,8 @@
         </a:p>
       </dsp:txBody>
       <dsp:txXfrm rot="-5400000">
-        <a:off x="1" y="2158808"/>
-        <a:ext cx="1098282" cy="470693"/>
+        <a:off x="0" y="2164901"/>
+        <a:ext cx="1196636" cy="512844"/>
       </dsp:txXfrm>
     </dsp:sp>
     <dsp:sp modelId="{84002781-99DF-4BC0-B6A4-70859C3B65C9}">
@@ -8251,8 +8240,8 @@
       </dsp:nvSpPr>
       <dsp:spPr>
         <a:xfrm rot="5400000">
-          <a:off x="3833462" y="-1331773"/>
-          <a:ext cx="1432356" cy="6902717"/>
+          <a:off x="4001051" y="-1280017"/>
+          <a:ext cx="1195532" cy="6804363"/>
         </a:xfrm>
         <a:prstGeom prst="round2SameRect">
           <a:avLst/>
@@ -8396,8 +8385,8 @@
         </a:p>
       </dsp:txBody>
       <dsp:txXfrm rot="-5400000">
-        <a:off x="1098282" y="1473329"/>
-        <a:ext cx="6832795" cy="1292512"/>
+        <a:off x="1196636" y="1582759"/>
+        <a:ext cx="6746002" cy="1078810"/>
       </dsp:txXfrm>
     </dsp:sp>
     <dsp:sp modelId="{80218641-E6E0-42A9-8BE7-DE8152220D28}">
@@ -8407,8 +8396,8 @@
       </dsp:nvSpPr>
       <dsp:spPr>
         <a:xfrm rot="5400000">
-          <a:off x="-235346" y="3457463"/>
-          <a:ext cx="1568975" cy="1098282"/>
+          <a:off x="-256422" y="3341870"/>
+          <a:ext cx="1709480" cy="1196636"/>
         </a:xfrm>
         <a:prstGeom prst="chevron">
           <a:avLst/>
@@ -8467,17 +8456,20 @@
             <a:buNone/>
           </a:pPr>
           <a:r>
-            <a:rPr lang="en-US" sz="1600" kern="1200" dirty="0">
+            <a:rPr lang="en-US" sz="1600" b="1" kern="1200" dirty="0">
+              <a:solidFill>
+                <a:schemeClr val="tx1"/>
+              </a:solidFill>
               <a:latin typeface="Times New Roman" panose="02020603050405020304" pitchFamily="18" charset="0"/>
               <a:cs typeface="Times New Roman" panose="02020603050405020304" pitchFamily="18" charset="0"/>
             </a:rPr>
-            <a:t>Payment gateway</a:t>
+            <a:t>Payment Gateway</a:t>
           </a:r>
         </a:p>
       </dsp:txBody>
       <dsp:txXfrm rot="-5400000">
-        <a:off x="1" y="3771257"/>
-        <a:ext cx="1098282" cy="470693"/>
+        <a:off x="0" y="3683766"/>
+        <a:ext cx="1196636" cy="512844"/>
       </dsp:txXfrm>
     </dsp:sp>
     <dsp:sp modelId="{69E9353B-9F86-4C08-A79E-1E0D912504FE}">
@@ -8487,8 +8479,8 @@
       </dsp:nvSpPr>
       <dsp:spPr>
         <a:xfrm rot="5400000">
-          <a:off x="3821173" y="280675"/>
-          <a:ext cx="1456934" cy="6902717"/>
+          <a:off x="4043098" y="238847"/>
+          <a:ext cx="1111439" cy="6804363"/>
         </a:xfrm>
         <a:prstGeom prst="round2SameRect">
           <a:avLst/>
@@ -8528,27 +8520,12 @@
         <a:fontRef idx="minor"/>
       </dsp:style>
       <dsp:txBody>
-        <a:bodyPr spcFirstLastPara="0" vert="horz" wrap="square" lIns="106680" tIns="9525" rIns="9525" bIns="9525" numCol="1" spcCol="1270" anchor="ctr" anchorCtr="0">
+        <a:bodyPr spcFirstLastPara="0" vert="horz" wrap="square" lIns="99568" tIns="8890" rIns="8890" bIns="8890" numCol="1" spcCol="1270" anchor="ctr" anchorCtr="0">
           <a:noAutofit/>
         </a:bodyPr>
         <a:lstStyle/>
         <a:p>
-          <a:pPr marL="114300" lvl="1" indent="-114300" algn="just" defTabSz="666750">
-            <a:lnSpc>
-              <a:spcPct val="90000"/>
-            </a:lnSpc>
-            <a:spcBef>
-              <a:spcPct val="0"/>
-            </a:spcBef>
-            <a:spcAft>
-              <a:spcPct val="15000"/>
-            </a:spcAft>
-            <a:buChar char="•"/>
-          </a:pPr>
-          <a:endParaRPr lang="en-US" sz="1500" kern="1200" dirty="0"/>
-        </a:p>
-        <a:p>
-          <a:pPr marL="114300" lvl="1" indent="-114300" algn="just" defTabSz="666750">
+          <a:pPr marL="114300" lvl="1" indent="-114300" algn="just" defTabSz="622300">
             <a:lnSpc>
               <a:spcPct val="90000"/>
             </a:lnSpc>
@@ -8561,12 +8538,15 @@
             <a:buChar char="•"/>
           </a:pPr>
           <a:r>
-            <a:rPr lang="en-US" sz="1500" kern="1200" dirty="0"/>
+            <a:rPr lang="en-US" sz="1400" kern="1200" dirty="0">
+              <a:latin typeface="Times New Roman" panose="02020603050405020304" pitchFamily="18" charset="0"/>
+              <a:cs typeface="Times New Roman" panose="02020603050405020304" pitchFamily="18" charset="0"/>
+            </a:rPr>
             <a:t>Registration with payment and get username and password</a:t>
           </a:r>
         </a:p>
         <a:p>
-          <a:pPr marL="114300" lvl="1" indent="-114300" algn="just" defTabSz="666750">
+          <a:pPr marL="114300" lvl="1" indent="-114300" algn="just" defTabSz="622300">
             <a:lnSpc>
               <a:spcPct val="90000"/>
             </a:lnSpc>
@@ -8579,12 +8559,15 @@
             <a:buChar char="•"/>
           </a:pPr>
           <a:r>
-            <a:rPr lang="en-US" sz="1500" kern="1200" dirty="0"/>
+            <a:rPr lang="en-US" sz="1400" kern="1200" dirty="0">
+              <a:latin typeface="Times New Roman" panose="02020603050405020304" pitchFamily="18" charset="0"/>
+              <a:cs typeface="Times New Roman" panose="02020603050405020304" pitchFamily="18" charset="0"/>
+            </a:rPr>
             <a:t>Without username and password no one can enter the webpage</a:t>
           </a:r>
         </a:p>
         <a:p>
-          <a:pPr marL="114300" lvl="1" indent="-114300" algn="just" defTabSz="666750">
+          <a:pPr marL="114300" lvl="1" indent="-114300" algn="just" defTabSz="622300">
             <a:lnSpc>
               <a:spcPct val="90000"/>
             </a:lnSpc>
@@ -8597,12 +8580,15 @@
             <a:buChar char="•"/>
           </a:pPr>
           <a:r>
-            <a:rPr lang="en-US" sz="1500" kern="1200" dirty="0"/>
+            <a:rPr lang="en-US" sz="1400" kern="1200" dirty="0">
+              <a:latin typeface="Times New Roman" panose="02020603050405020304" pitchFamily="18" charset="0"/>
+              <a:cs typeface="Times New Roman" panose="02020603050405020304" pitchFamily="18" charset="0"/>
+            </a:rPr>
             <a:t>Without monthly payment studentship will be terminated from webpage</a:t>
           </a:r>
         </a:p>
         <a:p>
-          <a:pPr marL="114300" lvl="1" indent="-114300" algn="just" defTabSz="666750">
+          <a:pPr marL="114300" lvl="1" indent="-114300" algn="just" defTabSz="622300">
             <a:lnSpc>
               <a:spcPct val="90000"/>
             </a:lnSpc>
@@ -8615,14 +8601,17 @@
             <a:buChar char="•"/>
           </a:pPr>
           <a:r>
-            <a:rPr lang="en-US" sz="1500" kern="1200" dirty="0"/>
+            <a:rPr lang="en-US" sz="1400" kern="1200" dirty="0">
+              <a:latin typeface="Times New Roman" panose="02020603050405020304" pitchFamily="18" charset="0"/>
+              <a:cs typeface="Times New Roman" panose="02020603050405020304" pitchFamily="18" charset="0"/>
+            </a:rPr>
             <a:t>Payment direct transfer to institute account at specific time. </a:t>
           </a:r>
         </a:p>
       </dsp:txBody>
       <dsp:txXfrm rot="-5400000">
-        <a:off x="1098282" y="3074688"/>
-        <a:ext cx="6831595" cy="1314690"/>
+        <a:off x="1196636" y="3139565"/>
+        <a:ext cx="6750107" cy="1002927"/>
       </dsp:txXfrm>
     </dsp:sp>
   </dsp:spTree>
@@ -9235,8 +9224,8 @@
       </dsp:nvSpPr>
       <dsp:spPr>
         <a:xfrm>
-          <a:off x="3289027" y="2449"/>
-          <a:ext cx="1651545" cy="1073504"/>
+          <a:off x="3314141" y="3214"/>
+          <a:ext cx="1601316" cy="1040855"/>
         </a:xfrm>
         <a:prstGeom prst="roundRect">
           <a:avLst/>
@@ -9307,8 +9296,8 @@
         </a:p>
       </dsp:txBody>
       <dsp:txXfrm>
-        <a:off x="3341431" y="54853"/>
-        <a:ext cx="1546737" cy="968696"/>
+        <a:off x="3364951" y="54024"/>
+        <a:ext cx="1499696" cy="939235"/>
       </dsp:txXfrm>
     </dsp:sp>
     <dsp:sp modelId="{EC99378D-1CD5-46E7-89EF-E83BD78BA9DF}">
@@ -9318,8 +9307,8 @@
       </dsp:nvSpPr>
       <dsp:spPr>
         <a:xfrm>
-          <a:off x="1919162" y="517164"/>
-          <a:ext cx="4289364" cy="4289364"/>
+          <a:off x="1986504" y="502269"/>
+          <a:ext cx="4157785" cy="4157785"/>
         </a:xfrm>
         <a:custGeom>
           <a:avLst/>
@@ -9330,9 +9319,9 @@
           <a:pathLst>
             <a:path>
               <a:moveTo>
-                <a:pt x="3257260" y="311152"/>
+                <a:pt x="3157490" y="301697"/>
               </a:moveTo>
-              <a:arcTo wR="2144682" hR="2144682" stAng="18074953" swAng="1317597"/>
+              <a:arcTo wR="2078892" hR="2078892" stAng="18075239" swAng="1317190"/>
             </a:path>
           </a:pathLst>
         </a:custGeom>
@@ -9371,8 +9360,8 @@
       </dsp:nvSpPr>
       <dsp:spPr>
         <a:xfrm>
-          <a:off x="5328756" y="1600202"/>
-          <a:ext cx="1651545" cy="1073504"/>
+          <a:off x="5291301" y="1551956"/>
+          <a:ext cx="1601316" cy="1040855"/>
         </a:xfrm>
         <a:prstGeom prst="roundRect">
           <a:avLst/>
@@ -9483,8 +9472,8 @@
         </a:p>
       </dsp:txBody>
       <dsp:txXfrm>
-        <a:off x="5381160" y="1652606"/>
-        <a:ext cx="1546737" cy="968696"/>
+        <a:off x="5342111" y="1602766"/>
+        <a:ext cx="1499696" cy="939235"/>
       </dsp:txXfrm>
     </dsp:sp>
     <dsp:sp modelId="{E2284D40-90D3-4AB7-9AC6-87E36E2D3E8C}">
@@ -9494,8 +9483,8 @@
       </dsp:nvSpPr>
       <dsp:spPr>
         <a:xfrm>
-          <a:off x="1938012" y="588289"/>
-          <a:ext cx="4289364" cy="4289364"/>
+          <a:off x="2004784" y="571237"/>
+          <a:ext cx="4157785" cy="4157785"/>
         </a:xfrm>
         <a:custGeom>
           <a:avLst/>
@@ -9506,9 +9495,9 @@
           <a:pathLst>
             <a:path>
               <a:moveTo>
-                <a:pt x="4280825" y="2335870"/>
+                <a:pt x="4149502" y="2264283"/>
               </a:moveTo>
-              <a:arcTo wR="2144682" hR="2144682" stAng="21906866" swAng="1235384"/>
+              <a:arcTo wR="2078892" hR="2078892" stAng="21906979" swAng="1235068"/>
             </a:path>
           </a:pathLst>
         </a:custGeom>
@@ -9547,8 +9536,8 @@
       </dsp:nvSpPr>
       <dsp:spPr>
         <a:xfrm>
-          <a:off x="4549639" y="3882215"/>
-          <a:ext cx="1651545" cy="1073504"/>
+          <a:off x="4536084" y="3763966"/>
+          <a:ext cx="1601316" cy="1040855"/>
         </a:xfrm>
         <a:prstGeom prst="roundRect">
           <a:avLst/>
@@ -9619,8 +9608,8 @@
         </a:p>
       </dsp:txBody>
       <dsp:txXfrm>
-        <a:off x="4602043" y="3934619"/>
-        <a:ext cx="1546737" cy="968696"/>
+        <a:off x="4586894" y="3814776"/>
+        <a:ext cx="1499696" cy="939235"/>
       </dsp:txXfrm>
     </dsp:sp>
     <dsp:sp modelId="{9D642DEF-7259-4C72-B1B1-2C936315AEFE}">
@@ -9630,8 +9619,8 @@
       </dsp:nvSpPr>
       <dsp:spPr>
         <a:xfrm>
-          <a:off x="1970117" y="539201"/>
-          <a:ext cx="4289364" cy="4289364"/>
+          <a:off x="2035907" y="523642"/>
+          <a:ext cx="4157785" cy="4157785"/>
         </a:xfrm>
         <a:custGeom>
           <a:avLst/>
@@ -9642,9 +9631,9 @@
           <a:pathLst>
             <a:path>
               <a:moveTo>
-                <a:pt x="2407955" y="4273143"/>
+                <a:pt x="2333957" y="4142078"/>
               </a:moveTo>
-              <a:arcTo wR="2144682" hR="2144682" stAng="4976927" swAng="846146"/>
+              <a:arcTo wR="2078892" hR="2078892" stAng="4977149" swAng="845702"/>
             </a:path>
           </a:pathLst>
         </a:custGeom>
@@ -9683,8 +9672,8 @@
       </dsp:nvSpPr>
       <dsp:spPr>
         <a:xfrm>
-          <a:off x="2028414" y="3882215"/>
-          <a:ext cx="1651545" cy="1073504"/>
+          <a:off x="2092199" y="3763966"/>
+          <a:ext cx="1601316" cy="1040855"/>
         </a:xfrm>
         <a:prstGeom prst="roundRect">
           <a:avLst/>
@@ -9755,8 +9744,8 @@
         </a:p>
       </dsp:txBody>
       <dsp:txXfrm>
-        <a:off x="2080818" y="3934619"/>
-        <a:ext cx="1546737" cy="968696"/>
+        <a:off x="2143009" y="3814776"/>
+        <a:ext cx="1499696" cy="939235"/>
       </dsp:txXfrm>
     </dsp:sp>
     <dsp:sp modelId="{CCB46475-68D3-4908-B102-C3E6733DDC3F}">
@@ -9766,8 +9755,8 @@
       </dsp:nvSpPr>
       <dsp:spPr>
         <a:xfrm>
-          <a:off x="2000418" y="585451"/>
-          <a:ext cx="4289364" cy="4289364"/>
+          <a:off x="2065280" y="568485"/>
+          <a:ext cx="4157785" cy="4157785"/>
         </a:xfrm>
         <a:custGeom>
           <a:avLst/>
@@ -9778,9 +9767,9 @@
           <a:pathLst>
             <a:path>
               <a:moveTo>
-                <a:pt x="213085" y="3076667"/>
+                <a:pt x="206496" y="2982179"/>
               </a:moveTo>
-              <a:arcTo wR="2144682" hR="2144682" stAng="9254575" swAng="1242545"/>
+              <a:arcTo wR="2078892" hR="2078892" stAng="9254777" swAng="1242228"/>
             </a:path>
           </a:pathLst>
         </a:custGeom>
@@ -9819,8 +9808,8 @@
       </dsp:nvSpPr>
       <dsp:spPr>
         <a:xfrm>
-          <a:off x="1249307" y="1593495"/>
-          <a:ext cx="1651545" cy="1073504"/>
+          <a:off x="1336992" y="1545455"/>
+          <a:ext cx="1601316" cy="1040855"/>
         </a:xfrm>
         <a:prstGeom prst="roundRect">
           <a:avLst/>
@@ -9891,8 +9880,8 @@
         </a:p>
       </dsp:txBody>
       <dsp:txXfrm>
-        <a:off x="1301711" y="1645899"/>
-        <a:ext cx="1546737" cy="968696"/>
+        <a:off x="1387802" y="1596265"/>
+        <a:ext cx="1499696" cy="939235"/>
       </dsp:txXfrm>
     </dsp:sp>
     <dsp:sp modelId="{43EEC9F9-B90E-4574-B73A-C91BB9B5F41A}">
@@ -9902,8 +9891,8 @@
       </dsp:nvSpPr>
       <dsp:spPr>
         <a:xfrm>
-          <a:off x="2018598" y="518271"/>
-          <a:ext cx="4289364" cy="4289364"/>
+          <a:off x="2082910" y="503343"/>
+          <a:ext cx="4157785" cy="4157785"/>
         </a:xfrm>
         <a:custGeom>
           <a:avLst/>
@@ -9914,9 +9903,9 @@
           <a:pathLst>
             <a:path>
               <a:moveTo>
-                <a:pt x="431848" y="853998"/>
+                <a:pt x="418646" y="827742"/>
               </a:moveTo>
-              <a:arcTo wR="2144682" hR="2144682" stAng="13019963" swAng="1311347"/>
+              <a:arcTo wR="2078892" hR="2078892" stAng="13020086" swAng="1310939"/>
             </a:path>
           </a:pathLst>
         </a:custGeom>
@@ -9967,8 +9956,8 @@
       </dsp:nvSpPr>
       <dsp:spPr>
         <a:xfrm>
-          <a:off x="3431678" y="143"/>
-          <a:ext cx="1366242" cy="1366242"/>
+          <a:off x="3435697" y="9"/>
+          <a:ext cx="1358205" cy="1358205"/>
         </a:xfrm>
         <a:prstGeom prst="ellipse">
           <a:avLst/>
@@ -10036,8 +10025,8 @@
         </a:p>
       </dsp:txBody>
       <dsp:txXfrm>
-        <a:off x="3631760" y="200225"/>
-        <a:ext cx="966078" cy="966078"/>
+        <a:off x="3634602" y="198914"/>
+        <a:ext cx="960395" cy="960395"/>
       </dsp:txXfrm>
     </dsp:sp>
     <dsp:sp modelId="{C1395B43-11DF-4559-BAB2-1038F767E615}">
@@ -10047,8 +10036,8 @@
       </dsp:nvSpPr>
       <dsp:spPr>
         <a:xfrm rot="2160000">
-          <a:off x="4754947" y="1050053"/>
-          <a:ext cx="364047" cy="461106"/>
+          <a:off x="4750910" y="1043136"/>
+          <a:ext cx="360778" cy="458394"/>
         </a:xfrm>
         <a:prstGeom prst="rightArrow">
           <a:avLst>
@@ -10105,8 +10094,8 @@
         </a:p>
       </dsp:txBody>
       <dsp:txXfrm>
-        <a:off x="4765376" y="1110177"/>
-        <a:ext cx="254833" cy="276664"/>
+        <a:off x="4761245" y="1103006"/>
+        <a:ext cx="252545" cy="275036"/>
       </dsp:txXfrm>
     </dsp:sp>
     <dsp:sp modelId="{E0FC5FC8-C425-43AD-A027-8E12750454CA}">
@@ -10116,8 +10105,8 @@
       </dsp:nvSpPr>
       <dsp:spPr>
         <a:xfrm>
-          <a:off x="5092691" y="1206939"/>
-          <a:ext cx="1366242" cy="1366242"/>
+          <a:off x="5085218" y="1198456"/>
+          <a:ext cx="1358205" cy="1358205"/>
         </a:xfrm>
         <a:prstGeom prst="ellipse">
           <a:avLst/>
@@ -10185,8 +10174,8 @@
         </a:p>
       </dsp:txBody>
       <dsp:txXfrm>
-        <a:off x="5292773" y="1407021"/>
-        <a:ext cx="966078" cy="966078"/>
+        <a:off x="5284123" y="1397361"/>
+        <a:ext cx="960395" cy="960395"/>
       </dsp:txXfrm>
     </dsp:sp>
     <dsp:sp modelId="{13ABE4D7-067B-4A81-927F-4C04A007F0A6}">
@@ -10196,8 +10185,8 @@
       </dsp:nvSpPr>
       <dsp:spPr>
         <a:xfrm rot="6437572">
-          <a:off x="5312681" y="2606083"/>
-          <a:ext cx="336869" cy="461106"/>
+          <a:off x="5304765" y="2588406"/>
+          <a:ext cx="333785" cy="458394"/>
         </a:xfrm>
         <a:prstGeom prst="rightArrow">
           <a:avLst>
@@ -10254,8 +10243,8 @@
         </a:p>
       </dsp:txBody>
       <dsp:txXfrm rot="10800000">
-        <a:off x="5378232" y="2650058"/>
-        <a:ext cx="235808" cy="276664"/>
+        <a:off x="5369715" y="2632281"/>
+        <a:ext cx="233650" cy="275036"/>
       </dsp:txXfrm>
     </dsp:sp>
     <dsp:sp modelId="{5011271E-1386-432B-86D3-BEE3FFB9DE2A}">
@@ -10265,8 +10254,8 @@
       </dsp:nvSpPr>
       <dsp:spPr>
         <a:xfrm>
-          <a:off x="4414230" y="3124196"/>
-          <a:ext cx="1529371" cy="1366242"/>
+          <a:off x="4411366" y="3102448"/>
+          <a:ext cx="1520375" cy="1358205"/>
         </a:xfrm>
         <a:prstGeom prst="ellipse">
           <a:avLst/>
@@ -10334,8 +10323,8 @@
         </a:p>
       </dsp:txBody>
       <dsp:txXfrm>
-        <a:off x="4638201" y="3324278"/>
-        <a:ext cx="1081429" cy="966078"/>
+        <a:off x="4634020" y="3301353"/>
+        <a:ext cx="1075067" cy="960395"/>
       </dsp:txXfrm>
     </dsp:sp>
     <dsp:sp modelId="{042B9D9E-1494-40E0-8289-5860126BA400}">
@@ -10345,8 +10334,8 @@
       </dsp:nvSpPr>
       <dsp:spPr>
         <a:xfrm rot="10741827">
-          <a:off x="3932013" y="3594981"/>
-          <a:ext cx="340895" cy="461106"/>
+          <a:off x="3933610" y="3570446"/>
+          <a:ext cx="337741" cy="458394"/>
         </a:xfrm>
         <a:prstGeom prst="rightArrow">
           <a:avLst>
@@ -10403,8 +10392,8 @@
         </a:p>
       </dsp:txBody>
       <dsp:txXfrm rot="10800000">
-        <a:off x="4034274" y="3686337"/>
-        <a:ext cx="238627" cy="276664"/>
+        <a:off x="4034925" y="3661268"/>
+        <a:ext cx="236419" cy="275036"/>
       </dsp:txXfrm>
     </dsp:sp>
     <dsp:sp modelId="{5980F613-36CE-4D10-A0BB-76E262E5230A}">
@@ -10414,8 +10403,8 @@
       </dsp:nvSpPr>
       <dsp:spPr>
         <a:xfrm>
-          <a:off x="2405116" y="3159577"/>
-          <a:ext cx="1366242" cy="1366242"/>
+          <a:off x="2416237" y="3137585"/>
+          <a:ext cx="1358205" cy="1358205"/>
         </a:xfrm>
         <a:prstGeom prst="ellipse">
           <a:avLst/>
@@ -10483,8 +10472,8 @@
         </a:p>
       </dsp:txBody>
       <dsp:txXfrm>
-        <a:off x="2605198" y="3359659"/>
-        <a:ext cx="966078" cy="966078"/>
+        <a:off x="2615142" y="3336490"/>
+        <a:ext cx="960395" cy="960395"/>
       </dsp:txXfrm>
     </dsp:sp>
     <dsp:sp modelId="{4AE285E2-6833-4A55-8C3D-61BEFC557A91}">
@@ -10494,8 +10483,8 @@
       </dsp:nvSpPr>
       <dsp:spPr>
         <a:xfrm rot="15120000">
-          <a:off x="2592172" y="2645625"/>
-          <a:ext cx="364047" cy="461106"/>
+          <a:off x="2603075" y="2627637"/>
+          <a:ext cx="360778" cy="458394"/>
         </a:xfrm>
         <a:prstGeom prst="rightArrow">
           <a:avLst>
@@ -10552,8 +10541,8 @@
         </a:p>
       </dsp:txBody>
       <dsp:txXfrm rot="10800000">
-        <a:off x="2663653" y="2789780"/>
-        <a:ext cx="254833" cy="276664"/>
+        <a:off x="2673914" y="2770784"/>
+        <a:ext cx="252545" cy="275036"/>
       </dsp:txXfrm>
     </dsp:sp>
     <dsp:sp modelId="{AF2FDEF7-C475-4783-82D4-6C2BE9DB4A7A}">
@@ -10563,8 +10552,8 @@
       </dsp:nvSpPr>
       <dsp:spPr>
         <a:xfrm>
-          <a:off x="1770665" y="1206939"/>
-          <a:ext cx="1366242" cy="1366242"/>
+          <a:off x="1786176" y="1198456"/>
+          <a:ext cx="1358205" cy="1358205"/>
         </a:xfrm>
         <a:prstGeom prst="ellipse">
           <a:avLst/>
@@ -10632,8 +10621,8 @@
         </a:p>
       </dsp:txBody>
       <dsp:txXfrm>
-        <a:off x="1970747" y="1407021"/>
-        <a:ext cx="966078" cy="966078"/>
+        <a:off x="1985081" y="1397361"/>
+        <a:ext cx="960395" cy="960395"/>
       </dsp:txXfrm>
     </dsp:sp>
     <dsp:sp modelId="{4553ACDA-F547-4000-B4D7-AD9A4ACB239B}">
@@ -10643,8 +10632,8 @@
       </dsp:nvSpPr>
       <dsp:spPr>
         <a:xfrm rot="19440000">
-          <a:off x="3093934" y="1062165"/>
-          <a:ext cx="364047" cy="461106"/>
+          <a:off x="3101389" y="1055140"/>
+          <a:ext cx="360778" cy="458394"/>
         </a:xfrm>
         <a:prstGeom prst="rightArrow">
           <a:avLst>
@@ -10701,8 +10690,8 @@
         </a:p>
       </dsp:txBody>
       <dsp:txXfrm>
-        <a:off x="3104363" y="1186483"/>
-        <a:ext cx="254833" cy="276664"/>
+        <a:off x="3111724" y="1178628"/>
+        <a:ext cx="252545" cy="275036"/>
       </dsp:txXfrm>
     </dsp:sp>
   </dsp:spTree>
@@ -18465,7 +18454,7 @@
           <a:p>
             <a:fld id="{BD302FDB-5DD1-4BC3-ABC3-A2B039A0A405}" type="datetimeFigureOut">
               <a:rPr lang="en-US" smtClean="0"/>
-              <a:t>9/24/2020</a:t>
+              <a:t>9/27/2020</a:t>
             </a:fld>
             <a:endParaRPr lang="en-US" dirty="0"/>
           </a:p>
@@ -19217,7 +19206,7 @@
           <a:p>
             <a:fld id="{E3CD44F6-68C3-400C-8537-CE2E82CF54C2}" type="datetimeFigureOut">
               <a:rPr lang="en-US" smtClean="0"/>
-              <a:t>9/24/2020</a:t>
+              <a:t>9/27/2020</a:t>
             </a:fld>
             <a:endParaRPr lang="en-US" dirty="0"/>
           </a:p>
@@ -19385,7 +19374,7 @@
           <a:p>
             <a:fld id="{E3CD44F6-68C3-400C-8537-CE2E82CF54C2}" type="datetimeFigureOut">
               <a:rPr lang="en-US" smtClean="0"/>
-              <a:t>9/24/2020</a:t>
+              <a:t>9/27/2020</a:t>
             </a:fld>
             <a:endParaRPr lang="en-US" dirty="0"/>
           </a:p>
@@ -19563,7 +19552,7 @@
           <a:p>
             <a:fld id="{E3CD44F6-68C3-400C-8537-CE2E82CF54C2}" type="datetimeFigureOut">
               <a:rPr lang="en-US" smtClean="0"/>
-              <a:t>9/24/2020</a:t>
+              <a:t>9/27/2020</a:t>
             </a:fld>
             <a:endParaRPr lang="en-US" dirty="0"/>
           </a:p>
@@ -20055,7 +20044,7 @@
           <a:p>
             <a:fld id="{E3CD44F6-68C3-400C-8537-CE2E82CF54C2}" type="datetimeFigureOut">
               <a:rPr lang="en-US" smtClean="0"/>
-              <a:t>9/24/2020</a:t>
+              <a:t>9/27/2020</a:t>
             </a:fld>
             <a:endParaRPr lang="en-US" dirty="0"/>
           </a:p>
@@ -20340,7 +20329,7 @@
           <a:p>
             <a:fld id="{E3CD44F6-68C3-400C-8537-CE2E82CF54C2}" type="datetimeFigureOut">
               <a:rPr lang="en-US" smtClean="0"/>
-              <a:t>9/24/2020</a:t>
+              <a:t>9/27/2020</a:t>
             </a:fld>
             <a:endParaRPr lang="en-US" dirty="0"/>
           </a:p>
@@ -20759,7 +20748,7 @@
           <a:p>
             <a:fld id="{E3CD44F6-68C3-400C-8537-CE2E82CF54C2}" type="datetimeFigureOut">
               <a:rPr lang="en-US" smtClean="0"/>
-              <a:t>9/24/2020</a:t>
+              <a:t>9/27/2020</a:t>
             </a:fld>
             <a:endParaRPr lang="en-US" dirty="0"/>
           </a:p>
@@ -20876,7 +20865,7 @@
           <a:p>
             <a:fld id="{E3CD44F6-68C3-400C-8537-CE2E82CF54C2}" type="datetimeFigureOut">
               <a:rPr lang="en-US" smtClean="0"/>
-              <a:t>9/24/2020</a:t>
+              <a:t>9/27/2020</a:t>
             </a:fld>
             <a:endParaRPr lang="en-US" dirty="0"/>
           </a:p>
@@ -20971,7 +20960,7 @@
           <a:p>
             <a:fld id="{E3CD44F6-68C3-400C-8537-CE2E82CF54C2}" type="datetimeFigureOut">
               <a:rPr lang="en-US" smtClean="0"/>
-              <a:t>9/24/2020</a:t>
+              <a:t>9/27/2020</a:t>
             </a:fld>
             <a:endParaRPr lang="en-US" dirty="0"/>
           </a:p>
@@ -21246,7 +21235,7 @@
           <a:p>
             <a:fld id="{E3CD44F6-68C3-400C-8537-CE2E82CF54C2}" type="datetimeFigureOut">
               <a:rPr lang="en-US" smtClean="0"/>
-              <a:t>9/24/2020</a:t>
+              <a:t>9/27/2020</a:t>
             </a:fld>
             <a:endParaRPr lang="en-US" dirty="0"/>
           </a:p>
@@ -21498,7 +21487,7 @@
           <a:p>
             <a:fld id="{E3CD44F6-68C3-400C-8537-CE2E82CF54C2}" type="datetimeFigureOut">
               <a:rPr lang="en-US" smtClean="0"/>
-              <a:t>9/24/2020</a:t>
+              <a:t>9/27/2020</a:t>
             </a:fld>
             <a:endParaRPr lang="en-US" dirty="0"/>
           </a:p>
@@ -21709,7 +21698,7 @@
           <a:p>
             <a:fld id="{E3CD44F6-68C3-400C-8537-CE2E82CF54C2}" type="datetimeFigureOut">
               <a:rPr lang="en-US" smtClean="0"/>
-              <a:t>9/24/2020</a:t>
+              <a:t>9/27/2020</a:t>
             </a:fld>
             <a:endParaRPr lang="en-US" dirty="0"/>
           </a:p>
@@ -22096,7 +22085,7 @@
         </p:nvSpPr>
         <p:spPr>
           <a:xfrm>
-            <a:off x="381000" y="2130425"/>
+            <a:off x="381000" y="1295400"/>
             <a:ext cx="8382000" cy="1470025"/>
           </a:xfrm>
         </p:spPr>
@@ -22138,7 +22127,7 @@
         </p:nvSpPr>
         <p:spPr>
           <a:xfrm>
-            <a:off x="1524000" y="3886200"/>
+            <a:off x="1371600" y="3514628"/>
             <a:ext cx="6400800" cy="609600"/>
           </a:xfrm>
         </p:spPr>
@@ -22151,6 +22140,13 @@
                 <a:solidFill>
                   <a:srgbClr val="002060"/>
                 </a:solidFill>
+                <a:effectLst>
+                  <a:outerShdw blurRad="38100" dist="38100" dir="2700000" algn="tl">
+                    <a:srgbClr val="000000">
+                      <a:alpha val="43137"/>
+                    </a:srgbClr>
+                  </a:outerShdw>
+                </a:effectLst>
                 <a:latin typeface="Times New Roman" panose="02020603050405020304" pitchFamily="18" charset="0"/>
                 <a:cs typeface="Times New Roman" panose="02020603050405020304" pitchFamily="18" charset="0"/>
               </a:rPr>
@@ -22227,12 +22223,21 @@
             </a:r>
           </a:p>
           <a:p>
-            <a:pPr lvl="1">
+            <a:pPr marL="0" indent="0" algn="ctr">
+              <a:buNone/>
+            </a:pPr>
+            <a:endParaRPr lang="en-US" sz="2000" b="1" i="1" u="sng" dirty="0">
+              <a:latin typeface="Times New Roman" panose="02020603050405020304" pitchFamily="18" charset="0"/>
+              <a:cs typeface="Times New Roman" panose="02020603050405020304" pitchFamily="18" charset="0"/>
+            </a:endParaRPr>
+          </a:p>
+          <a:p>
+            <a:pPr lvl="1" algn="just">
               <a:buFont typeface="Wingdings" panose="05000000000000000000" pitchFamily="2" charset="2"/>
               <a:buChar char="v"/>
             </a:pPr>
             <a:r>
-              <a:rPr lang="en-US" sz="1800" dirty="0">
+              <a:rPr lang="en-US" sz="2200" dirty="0">
                 <a:latin typeface="Times New Roman" panose="02020603050405020304" pitchFamily="18" charset="0"/>
                 <a:cs typeface="Times New Roman" panose="02020603050405020304" pitchFamily="18" charset="0"/>
               </a:rPr>
@@ -22240,12 +22245,12 @@
             </a:r>
           </a:p>
           <a:p>
-            <a:pPr lvl="1">
+            <a:pPr lvl="1" algn="just">
               <a:buFont typeface="Wingdings" panose="05000000000000000000" pitchFamily="2" charset="2"/>
               <a:buChar char="v"/>
             </a:pPr>
             <a:r>
-              <a:rPr lang="en-US" sz="1800" dirty="0">
+              <a:rPr lang="en-US" sz="2200" dirty="0">
                 <a:latin typeface="Times New Roman" panose="02020603050405020304" pitchFamily="18" charset="0"/>
                 <a:cs typeface="Times New Roman" panose="02020603050405020304" pitchFamily="18" charset="0"/>
               </a:rPr>
@@ -22253,12 +22258,12 @@
             </a:r>
           </a:p>
           <a:p>
-            <a:pPr lvl="1">
+            <a:pPr lvl="1" algn="just">
               <a:buFont typeface="Wingdings" panose="05000000000000000000" pitchFamily="2" charset="2"/>
               <a:buChar char="v"/>
             </a:pPr>
             <a:r>
-              <a:rPr lang="en-US" sz="1800" dirty="0">
+              <a:rPr lang="en-US" sz="2200" dirty="0">
                 <a:latin typeface="Times New Roman" panose="02020603050405020304" pitchFamily="18" charset="0"/>
                 <a:cs typeface="Times New Roman" panose="02020603050405020304" pitchFamily="18" charset="0"/>
               </a:rPr>
@@ -22266,12 +22271,12 @@
             </a:r>
           </a:p>
           <a:p>
-            <a:pPr lvl="1">
+            <a:pPr lvl="1" algn="just">
               <a:buFont typeface="Wingdings" panose="05000000000000000000" pitchFamily="2" charset="2"/>
               <a:buChar char="v"/>
             </a:pPr>
             <a:r>
-              <a:rPr lang="en-US" sz="1800" dirty="0">
+              <a:rPr lang="en-US" sz="2200" dirty="0">
                 <a:latin typeface="Times New Roman" panose="02020603050405020304" pitchFamily="18" charset="0"/>
                 <a:cs typeface="Times New Roman" panose="02020603050405020304" pitchFamily="18" charset="0"/>
               </a:rPr>
@@ -22279,12 +22284,12 @@
             </a:r>
           </a:p>
           <a:p>
-            <a:pPr lvl="1">
+            <a:pPr lvl="1" algn="just">
               <a:buFont typeface="Wingdings" panose="05000000000000000000" pitchFamily="2" charset="2"/>
               <a:buChar char="v"/>
             </a:pPr>
             <a:r>
-              <a:rPr lang="en-US" sz="1800" dirty="0">
+              <a:rPr lang="en-US" sz="2200" dirty="0">
                 <a:latin typeface="Times New Roman" panose="02020603050405020304" pitchFamily="18" charset="0"/>
                 <a:cs typeface="Times New Roman" panose="02020603050405020304" pitchFamily="18" charset="0"/>
               </a:rPr>
@@ -22292,12 +22297,12 @@
             </a:r>
           </a:p>
           <a:p>
-            <a:pPr lvl="1">
+            <a:pPr lvl="1" algn="just">
               <a:buFont typeface="Wingdings" panose="05000000000000000000" pitchFamily="2" charset="2"/>
               <a:buChar char="v"/>
             </a:pPr>
             <a:r>
-              <a:rPr lang="en-US" sz="1800" dirty="0">
+              <a:rPr lang="en-US" sz="2200" dirty="0">
                 <a:latin typeface="Times New Roman" panose="02020603050405020304" pitchFamily="18" charset="0"/>
                 <a:cs typeface="Times New Roman" panose="02020603050405020304" pitchFamily="18" charset="0"/>
               </a:rPr>
@@ -22305,25 +22310,25 @@
             </a:r>
           </a:p>
           <a:p>
-            <a:pPr lvl="1">
+            <a:pPr lvl="1" algn="just">
               <a:buFont typeface="Wingdings" panose="05000000000000000000" pitchFamily="2" charset="2"/>
               <a:buChar char="v"/>
             </a:pPr>
             <a:r>
-              <a:rPr lang="en-US" sz="1800" dirty="0">
+              <a:rPr lang="en-US" sz="2200" dirty="0">
                 <a:latin typeface="Times New Roman" panose="02020603050405020304" pitchFamily="18" charset="0"/>
                 <a:cs typeface="Times New Roman" panose="02020603050405020304" pitchFamily="18" charset="0"/>
               </a:rPr>
-              <a:t>Photo Hit Social Media:</a:t>
+              <a:t>Photo Hit Social Media</a:t>
             </a:r>
           </a:p>
           <a:p>
-            <a:pPr lvl="1">
+            <a:pPr lvl="1" algn="just">
               <a:buFont typeface="Wingdings" panose="05000000000000000000" pitchFamily="2" charset="2"/>
               <a:buChar char="v"/>
             </a:pPr>
             <a:r>
-              <a:rPr lang="en-US" sz="1800" dirty="0">
+              <a:rPr lang="en-US" sz="2200" dirty="0">
                 <a:latin typeface="Times New Roman" panose="02020603050405020304" pitchFamily="18" charset="0"/>
                 <a:cs typeface="Times New Roman" panose="02020603050405020304" pitchFamily="18" charset="0"/>
               </a:rPr>
@@ -22408,7 +22413,12 @@
             <p:ph type="title"/>
           </p:nvPr>
         </p:nvSpPr>
-        <p:spPr/>
+        <p:spPr>
+          <a:xfrm>
+            <a:off x="457200" y="274638"/>
+            <a:ext cx="8229600" cy="639762"/>
+          </a:xfrm>
+        </p:spPr>
         <p:txBody>
           <a:bodyPr>
             <a:normAutofit fontScale="90000"/>
@@ -22463,7 +22473,7 @@
           </a:bodyPr>
           <a:lstStyle/>
           <a:p>
-            <a:pPr marL="0" indent="0">
+            <a:pPr marL="0" indent="0" algn="just">
               <a:buClr>
                 <a:srgbClr val="C00000"/>
               </a:buClr>
@@ -22478,7 +22488,7 @@
             </a:r>
           </a:p>
           <a:p>
-            <a:pPr>
+            <a:pPr algn="just">
               <a:buClr>
                 <a:srgbClr val="C00000"/>
               </a:buClr>
@@ -22486,15 +22496,22 @@
               <a:buChar char="§"/>
             </a:pPr>
             <a:r>
+              <a:rPr lang="en-US" sz="2200" b="1" dirty="0">
+                <a:latin typeface="Times New Roman" panose="02020603050405020304" pitchFamily="18" charset="0"/>
+                <a:cs typeface="Times New Roman" panose="02020603050405020304" pitchFamily="18" charset="0"/>
+              </a:rPr>
+              <a:t>The Target Market:</a:t>
+            </a:r>
+            <a:r>
               <a:rPr lang="en-US" sz="2200" dirty="0">
                 <a:latin typeface="Times New Roman" panose="02020603050405020304" pitchFamily="18" charset="0"/>
                 <a:cs typeface="Times New Roman" panose="02020603050405020304" pitchFamily="18" charset="0"/>
               </a:rPr>
-              <a:t>The target market: School, College, University, Madrasah, Polytechnic, Technical Education, Youth development Centers, Govt. Office Training Centers, NGO Training Centers, Corporate Offices and others.</a:t>
+              <a:t> School, College, University, Madrasah, Polytechnic, Technical Education, Youth development Centers, Govt. Office Training Centers, NGO Training Centers, Corporate Offices and others.</a:t>
             </a:r>
           </a:p>
           <a:p>
-            <a:pPr>
+            <a:pPr algn="just">
               <a:buClr>
                 <a:srgbClr val="C00000"/>
               </a:buClr>
@@ -22502,15 +22519,22 @@
               <a:buChar char="§"/>
             </a:pPr>
             <a:r>
+              <a:rPr lang="en-US" sz="2200" b="1" dirty="0">
+                <a:latin typeface="Times New Roman" panose="02020603050405020304" pitchFamily="18" charset="0"/>
+                <a:cs typeface="Times New Roman" panose="02020603050405020304" pitchFamily="18" charset="0"/>
+              </a:rPr>
+              <a:t>The Total Market Size : </a:t>
+            </a:r>
+            <a:r>
               <a:rPr lang="en-US" sz="2200" dirty="0">
                 <a:latin typeface="Times New Roman" panose="02020603050405020304" pitchFamily="18" charset="0"/>
                 <a:cs typeface="Times New Roman" panose="02020603050405020304" pitchFamily="18" charset="0"/>
               </a:rPr>
-              <a:t>The total market size : Around 50,000 + Institutes in Bangladesh</a:t>
+              <a:t>Around 50,000 + Institutes in Bangladesh</a:t>
             </a:r>
           </a:p>
           <a:p>
-            <a:pPr>
+            <a:pPr algn="just">
               <a:buClr>
                 <a:srgbClr val="C00000"/>
               </a:buClr>
@@ -22518,11 +22542,18 @@
               <a:buChar char="§"/>
             </a:pPr>
             <a:r>
+              <a:rPr lang="en-US" sz="2200" b="1" dirty="0">
+                <a:latin typeface="Times New Roman" panose="02020603050405020304" pitchFamily="18" charset="0"/>
+                <a:cs typeface="Times New Roman" panose="02020603050405020304" pitchFamily="18" charset="0"/>
+              </a:rPr>
+              <a:t>The Market Share that the Company will Target: </a:t>
+            </a:r>
+            <a:r>
               <a:rPr lang="en-US" sz="2200" dirty="0">
                 <a:latin typeface="Times New Roman" panose="02020603050405020304" pitchFamily="18" charset="0"/>
                 <a:cs typeface="Times New Roman" panose="02020603050405020304" pitchFamily="18" charset="0"/>
               </a:rPr>
-              <a:t>The market share that the company will target: 15%-20% of Total Market </a:t>
+              <a:t>15%-20% of Total Market </a:t>
             </a:r>
           </a:p>
         </p:txBody>
@@ -22843,20 +22874,20 @@
               <a:buChar char="§"/>
             </a:pPr>
             <a:r>
-              <a:rPr lang="en-US" sz="5000" b="1" dirty="0">
+              <a:rPr lang="en-US" sz="6000" b="1" dirty="0">
                 <a:latin typeface="Times New Roman" panose="02020603050405020304" pitchFamily="18" charset="0"/>
                 <a:cs typeface="Times New Roman" panose="02020603050405020304" pitchFamily="18" charset="0"/>
               </a:rPr>
-              <a:t>Direct and indirect competitors: </a:t>
+              <a:t>Direct and Indirect Competitors: </a:t>
             </a:r>
           </a:p>
           <a:p>
-            <a:pPr marL="742950" indent="-742950">
+            <a:pPr marL="742950" indent="-742950" algn="just">
               <a:buFont typeface="+mj-lt"/>
               <a:buAutoNum type="arabicPeriod"/>
             </a:pPr>
             <a:r>
-              <a:rPr lang="en-US" sz="3800" dirty="0">
+              <a:rPr lang="en-US" sz="4500" dirty="0">
                 <a:latin typeface="Times New Roman" panose="02020603050405020304" pitchFamily="18" charset="0"/>
                 <a:cs typeface="Times New Roman" panose="02020603050405020304" pitchFamily="18" charset="0"/>
               </a:rPr>
@@ -22864,12 +22895,12 @@
             </a:r>
           </a:p>
           <a:p>
-            <a:pPr marL="742950" indent="-742950">
+            <a:pPr marL="742950" indent="-742950" algn="just">
               <a:buFont typeface="+mj-lt"/>
               <a:buAutoNum type="arabicPeriod"/>
             </a:pPr>
             <a:r>
-              <a:rPr lang="en-US" sz="3800" dirty="0">
+              <a:rPr lang="en-US" sz="4500" dirty="0">
                 <a:latin typeface="Times New Roman" panose="02020603050405020304" pitchFamily="18" charset="0"/>
                 <a:cs typeface="Times New Roman" panose="02020603050405020304" pitchFamily="18" charset="0"/>
               </a:rPr>
@@ -22877,12 +22908,12 @@
             </a:r>
           </a:p>
           <a:p>
-            <a:pPr marL="742950" indent="-742950">
+            <a:pPr marL="742950" indent="-742950" algn="just">
               <a:buFont typeface="+mj-lt"/>
               <a:buAutoNum type="arabicPeriod"/>
             </a:pPr>
             <a:r>
-              <a:rPr lang="en-US" sz="3800" dirty="0">
+              <a:rPr lang="en-US" sz="4500" dirty="0">
                 <a:latin typeface="Times New Roman" panose="02020603050405020304" pitchFamily="18" charset="0"/>
                 <a:cs typeface="Times New Roman" panose="02020603050405020304" pitchFamily="18" charset="0"/>
               </a:rPr>
@@ -22890,12 +22921,12 @@
             </a:r>
           </a:p>
           <a:p>
-            <a:pPr marL="742950" indent="-742950">
+            <a:pPr marL="742950" indent="-742950" algn="just">
               <a:buFont typeface="+mj-lt"/>
               <a:buAutoNum type="arabicPeriod"/>
             </a:pPr>
             <a:r>
-              <a:rPr lang="en-US" sz="3800" dirty="0">
+              <a:rPr lang="en-US" sz="4500" dirty="0">
                 <a:latin typeface="Times New Roman" panose="02020603050405020304" pitchFamily="18" charset="0"/>
                 <a:cs typeface="Times New Roman" panose="02020603050405020304" pitchFamily="18" charset="0"/>
               </a:rPr>
@@ -22923,15 +22954,15 @@
               <a:buChar char="§"/>
             </a:pPr>
             <a:r>
-              <a:rPr lang="en-US" sz="5000" b="1" dirty="0">
+              <a:rPr lang="en-US" sz="6000" b="1" dirty="0">
                 <a:latin typeface="Times New Roman" panose="02020603050405020304" pitchFamily="18" charset="0"/>
                 <a:cs typeface="Times New Roman" panose="02020603050405020304" pitchFamily="18" charset="0"/>
               </a:rPr>
-              <a:t>Your competitive advantage</a:t>
+              <a:t>Your Competitive Advantage:</a:t>
             </a:r>
           </a:p>
           <a:p>
-            <a:pPr marL="514350" indent="-514350">
+            <a:pPr marL="514350" indent="-514350" algn="just">
               <a:buFont typeface="+mj-lt"/>
               <a:buAutoNum type="arabicPeriod"/>
             </a:pPr>
@@ -22944,7 +22975,7 @@
             </a:r>
           </a:p>
           <a:p>
-            <a:pPr marL="514350" indent="-514350">
+            <a:pPr marL="514350" indent="-514350" algn="just">
               <a:buFont typeface="+mj-lt"/>
               <a:buAutoNum type="arabicPeriod"/>
             </a:pPr>
@@ -22957,7 +22988,7 @@
             </a:r>
           </a:p>
           <a:p>
-            <a:pPr marL="514350" indent="-514350">
+            <a:pPr marL="514350" indent="-514350" algn="just">
               <a:buFont typeface="+mj-lt"/>
               <a:buAutoNum type="arabicPeriod"/>
             </a:pPr>
@@ -22970,7 +23001,7 @@
             </a:r>
           </a:p>
           <a:p>
-            <a:pPr marL="514350" indent="-514350">
+            <a:pPr marL="514350" indent="-514350" algn="just">
               <a:buFont typeface="+mj-lt"/>
               <a:buAutoNum type="arabicPeriod"/>
             </a:pPr>
@@ -22983,7 +23014,7 @@
             </a:r>
           </a:p>
           <a:p>
-            <a:pPr marL="514350" indent="-514350">
+            <a:pPr marL="514350" indent="-514350" algn="just">
               <a:buFont typeface="+mj-lt"/>
               <a:buAutoNum type="arabicPeriod"/>
             </a:pPr>
@@ -22996,7 +23027,7 @@
             </a:r>
           </a:p>
           <a:p>
-            <a:pPr marL="514350" indent="-514350">
+            <a:pPr marL="514350" indent="-514350" algn="just">
               <a:buFont typeface="+mj-lt"/>
               <a:buAutoNum type="arabicPeriod"/>
             </a:pPr>
@@ -23009,7 +23040,7 @@
             </a:r>
           </a:p>
           <a:p>
-            <a:pPr marL="514350" indent="-514350">
+            <a:pPr marL="514350" indent="-514350" algn="just">
               <a:buFont typeface="+mj-lt"/>
               <a:buAutoNum type="arabicPeriod"/>
             </a:pPr>
@@ -23050,7 +23081,7 @@
             </a:r>
           </a:p>
           <a:p>
-            <a:pPr marL="514350" indent="-514350">
+            <a:pPr marL="514350" indent="-514350" algn="just">
               <a:buFont typeface="+mj-lt"/>
               <a:buAutoNum type="arabicPeriod"/>
             </a:pPr>
@@ -23063,7 +23094,7 @@
             </a:r>
           </a:p>
           <a:p>
-            <a:pPr marL="514350" indent="-514350">
+            <a:pPr marL="514350" indent="-514350" algn="just">
               <a:buFont typeface="+mj-lt"/>
               <a:buAutoNum type="arabicPeriod"/>
             </a:pPr>
@@ -23210,7 +23241,7 @@
         <p:spPr>
           <a:xfrm>
             <a:off x="685800" y="1066800"/>
-            <a:ext cx="7816553" cy="3856056"/>
+            <a:ext cx="7816553" cy="3344634"/>
           </a:xfrm>
           <a:prstGeom prst="rect">
             <a:avLst/>
@@ -23240,7 +23271,7 @@
                 <a:latin typeface="Times New Roman" panose="02020603050405020304" pitchFamily="18" charset="0"/>
                 <a:cs typeface="Times New Roman" panose="02020603050405020304" pitchFamily="18" charset="0"/>
               </a:rPr>
-              <a:t>Describe:</a:t>
+              <a:t>Description:</a:t>
             </a:r>
           </a:p>
           <a:p>
@@ -23259,11 +23290,18 @@
               <a:defRPr/>
             </a:pPr>
             <a:r>
-              <a:rPr lang="en-US" sz="2400" spc="-53" dirty="0">
+              <a:rPr lang="en-US" sz="2000" b="1" spc="-53" dirty="0">
                 <a:latin typeface="Times New Roman" panose="02020603050405020304" pitchFamily="18" charset="0"/>
                 <a:cs typeface="Times New Roman" panose="02020603050405020304" pitchFamily="18" charset="0"/>
               </a:rPr>
-              <a:t>Amount requested: BDT 1,000,000</a:t>
+              <a:t>Amount Requested:</a:t>
+            </a:r>
+            <a:r>
+              <a:rPr lang="en-US" sz="2000" spc="-53" dirty="0">
+                <a:latin typeface="Times New Roman" panose="02020603050405020304" pitchFamily="18" charset="0"/>
+                <a:cs typeface="Times New Roman" panose="02020603050405020304" pitchFamily="18" charset="0"/>
+              </a:rPr>
+              <a:t> BDT 1,000,000</a:t>
             </a:r>
           </a:p>
           <a:p>
@@ -23282,11 +23320,18 @@
               <a:defRPr/>
             </a:pPr>
             <a:r>
-              <a:rPr lang="en-US" sz="2400" spc="-53" dirty="0">
+              <a:rPr lang="en-US" sz="2000" b="1" spc="-53" dirty="0">
                 <a:latin typeface="Times New Roman" panose="02020603050405020304" pitchFamily="18" charset="0"/>
                 <a:cs typeface="Times New Roman" panose="02020603050405020304" pitchFamily="18" charset="0"/>
               </a:rPr>
-              <a:t>Industry focus: Education and Training</a:t>
+              <a:t>Industry Focus:</a:t>
+            </a:r>
+            <a:r>
+              <a:rPr lang="en-US" sz="2000" spc="-53" dirty="0">
+                <a:latin typeface="Times New Roman" panose="02020603050405020304" pitchFamily="18" charset="0"/>
+                <a:cs typeface="Times New Roman" panose="02020603050405020304" pitchFamily="18" charset="0"/>
+              </a:rPr>
+              <a:t> Education and Training</a:t>
             </a:r>
           </a:p>
           <a:p>
@@ -23305,11 +23350,18 @@
               <a:defRPr/>
             </a:pPr>
             <a:r>
-              <a:rPr lang="en-US" sz="2400" spc="-53" dirty="0">
+              <a:rPr lang="en-US" sz="2000" b="1" spc="-53" dirty="0">
                 <a:latin typeface="Times New Roman" panose="02020603050405020304" pitchFamily="18" charset="0"/>
                 <a:cs typeface="Times New Roman" panose="02020603050405020304" pitchFamily="18" charset="0"/>
               </a:rPr>
-              <a:t>Venture stage: BDT 500,000</a:t>
+              <a:t>Venture Stage:</a:t>
+            </a:r>
+            <a:r>
+              <a:rPr lang="en-US" sz="2000" spc="-53" dirty="0">
+                <a:latin typeface="Times New Roman" panose="02020603050405020304" pitchFamily="18" charset="0"/>
+                <a:cs typeface="Times New Roman" panose="02020603050405020304" pitchFamily="18" charset="0"/>
+              </a:rPr>
+              <a:t> BDT 500,000</a:t>
             </a:r>
           </a:p>
           <a:p>
@@ -23328,11 +23380,18 @@
               <a:defRPr/>
             </a:pPr>
             <a:r>
-              <a:rPr lang="en-US" sz="2400" spc="-53" dirty="0">
+              <a:rPr lang="en-US" sz="2000" b="1" spc="-53" dirty="0">
                 <a:latin typeface="Times New Roman" panose="02020603050405020304" pitchFamily="18" charset="0"/>
                 <a:cs typeface="Times New Roman" panose="02020603050405020304" pitchFamily="18" charset="0"/>
               </a:rPr>
-              <a:t>Timeline to achieve profitability: July to August 2021</a:t>
+              <a:t>Timeline to Achieve Profitability:</a:t>
+            </a:r>
+            <a:r>
+              <a:rPr lang="en-US" sz="2000" spc="-53" dirty="0">
+                <a:latin typeface="Times New Roman" panose="02020603050405020304" pitchFamily="18" charset="0"/>
+                <a:cs typeface="Times New Roman" panose="02020603050405020304" pitchFamily="18" charset="0"/>
+              </a:rPr>
+              <a:t> July to August 2021</a:t>
             </a:r>
           </a:p>
           <a:p>
@@ -23351,11 +23410,18 @@
               <a:defRPr/>
             </a:pPr>
             <a:r>
-              <a:rPr lang="en-US" sz="2400" spc="-53" dirty="0">
+              <a:rPr lang="en-US" sz="2000" b="1" spc="-53" dirty="0">
                 <a:latin typeface="Times New Roman" panose="02020603050405020304" pitchFamily="18" charset="0"/>
                 <a:cs typeface="Times New Roman" panose="02020603050405020304" pitchFamily="18" charset="0"/>
               </a:rPr>
-              <a:t>Monthly burn rate: On Demand Basis </a:t>
+              <a:t>Monthly Burn Rate:</a:t>
+            </a:r>
+            <a:r>
+              <a:rPr lang="en-US" sz="2000" spc="-53" dirty="0">
+                <a:latin typeface="Times New Roman" panose="02020603050405020304" pitchFamily="18" charset="0"/>
+                <a:cs typeface="Times New Roman" panose="02020603050405020304" pitchFamily="18" charset="0"/>
+              </a:rPr>
+              <a:t> On Demand Basis </a:t>
             </a:r>
           </a:p>
           <a:p>
@@ -26665,7 +26731,7 @@
         </p:nvSpPr>
         <p:spPr>
           <a:xfrm>
-            <a:off x="457200" y="274638"/>
+            <a:off x="457200" y="198869"/>
             <a:ext cx="8229600" cy="715962"/>
           </a:xfrm>
         </p:spPr>
@@ -26701,7 +26767,7 @@
             <p:ph idx="1"/>
             <p:extLst>
               <p:ext uri="{D42A27DB-BD31-4B8C-83A1-F6EECF244321}">
-                <p14:modId xmlns:p14="http://schemas.microsoft.com/office/powerpoint/2010/main" val="4000044448"/>
+                <p14:modId xmlns:p14="http://schemas.microsoft.com/office/powerpoint/2010/main" val="3228294177"/>
               </p:ext>
             </p:extLst>
           </p:nvPr>
@@ -26837,7 +26903,7 @@
             <p:ph idx="1"/>
             <p:extLst>
               <p:ext uri="{D42A27DB-BD31-4B8C-83A1-F6EECF244321}">
-                <p14:modId xmlns:p14="http://schemas.microsoft.com/office/powerpoint/2010/main" val="635438086"/>
+                <p14:modId xmlns:p14="http://schemas.microsoft.com/office/powerpoint/2010/main" val="649991932"/>
               </p:ext>
             </p:extLst>
           </p:nvPr>
@@ -26930,7 +26996,7 @@
         </p:nvSpPr>
         <p:spPr>
           <a:xfrm>
-            <a:off x="457200" y="347472"/>
+            <a:off x="457200" y="181708"/>
             <a:ext cx="8229600" cy="611283"/>
           </a:xfrm>
         </p:spPr>
@@ -26945,14 +27011,8 @@
                 <a:latin typeface="Times New Roman" panose="02020603050405020304" pitchFamily="18" charset="0"/>
                 <a:cs typeface="Times New Roman" panose="02020603050405020304" pitchFamily="18" charset="0"/>
               </a:rPr>
-              <a:t>Key Technologies &amp; Platforms</a:t>
+              <a:t>Key Technologies and Platforms</a:t>
             </a:r>
-            <a:br>
-              <a:rPr lang="en-US" sz="3600" b="1" i="1" u="sng" spc="-53" dirty="0">
-                <a:latin typeface="Times New Roman" panose="02020603050405020304" pitchFamily="18" charset="0"/>
-                <a:cs typeface="Times New Roman" panose="02020603050405020304" pitchFamily="18" charset="0"/>
-              </a:rPr>
-            </a:br>
             <a:endParaRPr lang="en-US" b="1" i="1" u="sng" dirty="0"/>
           </a:p>
         </p:txBody>
@@ -27202,33 +27262,26 @@
             <p:ph type="title"/>
           </p:nvPr>
         </p:nvSpPr>
-        <p:spPr/>
+        <p:spPr>
+          <a:xfrm>
+            <a:off x="457201" y="168277"/>
+            <a:ext cx="8229600" cy="639762"/>
+          </a:xfrm>
+        </p:spPr>
         <p:txBody>
           <a:bodyPr>
-            <a:normAutofit fontScale="90000"/>
+            <a:normAutofit/>
           </a:bodyPr>
           <a:lstStyle/>
           <a:p>
-            <a:br>
-              <a:rPr lang="en-US" b="1" i="1" u="sng" dirty="0">
-                <a:latin typeface="Times New Roman" panose="02020603050405020304" pitchFamily="18" charset="0"/>
-                <a:cs typeface="Times New Roman" panose="02020603050405020304" pitchFamily="18" charset="0"/>
-              </a:rPr>
-            </a:br>
             <a:r>
-              <a:rPr lang="en-US" b="1" i="1" u="sng" dirty="0">
+              <a:rPr lang="en-US" sz="3200" b="1" i="1" u="sng" dirty="0">
                 <a:latin typeface="Times New Roman" panose="02020603050405020304" pitchFamily="18" charset="0"/>
                 <a:cs typeface="Times New Roman" panose="02020603050405020304" pitchFamily="18" charset="0"/>
               </a:rPr>
               <a:t>Classroom Decoration Technology</a:t>
             </a:r>
-            <a:br>
-              <a:rPr lang="en-US" b="1" i="1" u="sng" dirty="0">
-                <a:latin typeface="Times New Roman" panose="02020603050405020304" pitchFamily="18" charset="0"/>
-                <a:cs typeface="Times New Roman" panose="02020603050405020304" pitchFamily="18" charset="0"/>
-              </a:rPr>
-            </a:br>
-            <a:endParaRPr lang="en-US" dirty="0"/>
+            <a:endParaRPr lang="en-US" sz="3200" dirty="0"/>
           </a:p>
         </p:txBody>
       </p:sp>
@@ -27250,8 +27303,8 @@
         </p:nvSpPr>
         <p:spPr>
           <a:xfrm>
-            <a:off x="457200" y="1417639"/>
-            <a:ext cx="4114800" cy="3992561"/>
+            <a:off x="457200" y="990601"/>
+            <a:ext cx="4114800" cy="4419600"/>
           </a:xfrm>
         </p:spPr>
         <p:txBody>
@@ -27265,7 +27318,7 @@
               <a:buAutoNum type="arabicPeriod"/>
             </a:pPr>
             <a:r>
-              <a:rPr lang="en-US" sz="1600" dirty="0">
+              <a:rPr lang="en-US" sz="1800" dirty="0">
                 <a:latin typeface="Times New Roman" panose="02020603050405020304" pitchFamily="18" charset="0"/>
                 <a:cs typeface="Times New Roman" panose="02020603050405020304" pitchFamily="18" charset="0"/>
               </a:rPr>
@@ -27278,7 +27331,7 @@
               <a:buAutoNum type="arabicPeriod"/>
             </a:pPr>
             <a:r>
-              <a:rPr lang="en-US" sz="1600" dirty="0">
+              <a:rPr lang="en-US" sz="1800" dirty="0">
                 <a:latin typeface="Times New Roman" panose="02020603050405020304" pitchFamily="18" charset="0"/>
                 <a:cs typeface="Times New Roman" panose="02020603050405020304" pitchFamily="18" charset="0"/>
               </a:rPr>
@@ -27291,7 +27344,7 @@
               <a:buAutoNum type="arabicPeriod"/>
             </a:pPr>
             <a:r>
-              <a:rPr lang="en-US" sz="1600" dirty="0">
+              <a:rPr lang="en-US" sz="1800" dirty="0">
                 <a:latin typeface="Times New Roman" panose="02020603050405020304" pitchFamily="18" charset="0"/>
                 <a:cs typeface="Times New Roman" panose="02020603050405020304" pitchFamily="18" charset="0"/>
               </a:rPr>
@@ -27304,7 +27357,7 @@
               <a:buAutoNum type="arabicPeriod"/>
             </a:pPr>
             <a:r>
-              <a:rPr lang="en-US" sz="1600" dirty="0">
+              <a:rPr lang="en-US" sz="1800" dirty="0">
                 <a:latin typeface="Times New Roman" panose="02020603050405020304" pitchFamily="18" charset="0"/>
                 <a:cs typeface="Times New Roman" panose="02020603050405020304" pitchFamily="18" charset="0"/>
               </a:rPr>
@@ -27317,7 +27370,7 @@
               <a:buAutoNum type="arabicPeriod"/>
             </a:pPr>
             <a:r>
-              <a:rPr lang="en-US" sz="1600" dirty="0">
+              <a:rPr lang="en-US" sz="1800" dirty="0">
                 <a:latin typeface="Times New Roman" panose="02020603050405020304" pitchFamily="18" charset="0"/>
                 <a:cs typeface="Times New Roman" panose="02020603050405020304" pitchFamily="18" charset="0"/>
               </a:rPr>
@@ -27330,7 +27383,7 @@
               <a:buAutoNum type="arabicPeriod"/>
             </a:pPr>
             <a:r>
-              <a:rPr lang="en-US" sz="1600" dirty="0">
+              <a:rPr lang="en-US" sz="1800" dirty="0">
                 <a:latin typeface="Times New Roman" panose="02020603050405020304" pitchFamily="18" charset="0"/>
                 <a:cs typeface="Times New Roman" panose="02020603050405020304" pitchFamily="18" charset="0"/>
               </a:rPr>
@@ -27343,7 +27396,7 @@
               <a:buAutoNum type="arabicPeriod"/>
             </a:pPr>
             <a:r>
-              <a:rPr lang="en-US" sz="1600" dirty="0">
+              <a:rPr lang="en-US" sz="1800" dirty="0">
                 <a:latin typeface="Times New Roman" panose="02020603050405020304" pitchFamily="18" charset="0"/>
                 <a:cs typeface="Times New Roman" panose="02020603050405020304" pitchFamily="18" charset="0"/>
               </a:rPr>
@@ -27356,7 +27409,7 @@
               <a:buAutoNum type="arabicPeriod"/>
             </a:pPr>
             <a:r>
-              <a:rPr lang="en-US" sz="1600" dirty="0">
+              <a:rPr lang="en-US" sz="1800" dirty="0">
                 <a:latin typeface="Times New Roman" panose="02020603050405020304" pitchFamily="18" charset="0"/>
                 <a:cs typeface="Times New Roman" panose="02020603050405020304" pitchFamily="18" charset="0"/>
               </a:rPr>
@@ -27369,7 +27422,7 @@
               <a:buAutoNum type="arabicPeriod"/>
             </a:pPr>
             <a:r>
-              <a:rPr lang="en-US" sz="1600" dirty="0">
+              <a:rPr lang="en-US" sz="1800" dirty="0">
                 <a:latin typeface="Times New Roman" panose="02020603050405020304" pitchFamily="18" charset="0"/>
                 <a:cs typeface="Times New Roman" panose="02020603050405020304" pitchFamily="18" charset="0"/>
               </a:rPr>
@@ -27382,13 +27435,13 @@
               <a:buAutoNum type="arabicPeriod"/>
             </a:pPr>
             <a:r>
-              <a:rPr lang="en-US" sz="1600" dirty="0">
+              <a:rPr lang="en-US" sz="1800" dirty="0">
                 <a:latin typeface="Times New Roman" panose="02020603050405020304" pitchFamily="18" charset="0"/>
                 <a:cs typeface="Times New Roman" panose="02020603050405020304" pitchFamily="18" charset="0"/>
               </a:rPr>
               <a:t>Bluetooth Mouse and key board</a:t>
             </a:r>
-            <a:endParaRPr lang="en-US" sz="1600" dirty="0"/>
+            <a:endParaRPr lang="en-US" sz="1800" dirty="0"/>
           </a:p>
         </p:txBody>
       </p:sp>
@@ -27408,8 +27461,8 @@
         </p:nvSpPr>
         <p:spPr>
           <a:xfrm>
-            <a:off x="4572001" y="1417639"/>
-            <a:ext cx="4114800" cy="3992561"/>
+            <a:off x="4572001" y="990601"/>
+            <a:ext cx="4114800" cy="4419600"/>
           </a:xfrm>
           <a:prstGeom prst="rect">
             <a:avLst/>
@@ -27417,7 +27470,7 @@
         </p:spPr>
         <p:txBody>
           <a:bodyPr>
-            <a:normAutofit/>
+            <a:normAutofit lnSpcReduction="10000"/>
           </a:bodyPr>
           <a:lstStyle>
             <a:lvl1pPr marL="342900" indent="-342900" algn="l" defTabSz="914400" rtl="0" eaLnBrk="1" latinLnBrk="0" hangingPunct="1">
@@ -27562,7 +27615,7 @@
               <a:buAutoNum type="arabicPeriod" startAt="11"/>
             </a:pPr>
             <a:r>
-              <a:rPr lang="en-US" sz="1600" dirty="0">
+              <a:rPr lang="en-US" sz="1800" dirty="0">
                 <a:latin typeface="Times New Roman" panose="02020603050405020304" pitchFamily="18" charset="0"/>
                 <a:cs typeface="Times New Roman" panose="02020603050405020304" pitchFamily="18" charset="0"/>
               </a:rPr>
@@ -27575,7 +27628,7 @@
               <a:buAutoNum type="arabicPeriod" startAt="11"/>
             </a:pPr>
             <a:r>
-              <a:rPr lang="en-US" sz="1600" dirty="0">
+              <a:rPr lang="en-US" sz="1800" dirty="0">
                 <a:latin typeface="Times New Roman" panose="02020603050405020304" pitchFamily="18" charset="0"/>
                 <a:cs typeface="Times New Roman" panose="02020603050405020304" pitchFamily="18" charset="0"/>
               </a:rPr>
@@ -27588,7 +27641,7 @@
               <a:buAutoNum type="arabicPeriod" startAt="11"/>
             </a:pPr>
             <a:r>
-              <a:rPr lang="en-US" sz="1600" dirty="0">
+              <a:rPr lang="en-US" sz="1800" dirty="0">
                 <a:latin typeface="Times New Roman" panose="02020603050405020304" pitchFamily="18" charset="0"/>
                 <a:cs typeface="Times New Roman" panose="02020603050405020304" pitchFamily="18" charset="0"/>
               </a:rPr>
@@ -27601,7 +27654,7 @@
               <a:buAutoNum type="arabicPeriod" startAt="11"/>
             </a:pPr>
             <a:r>
-              <a:rPr lang="en-US" sz="1600" dirty="0">
+              <a:rPr lang="en-US" sz="1800" dirty="0">
                 <a:latin typeface="Times New Roman" panose="02020603050405020304" pitchFamily="18" charset="0"/>
                 <a:cs typeface="Times New Roman" panose="02020603050405020304" pitchFamily="18" charset="0"/>
               </a:rPr>
@@ -27614,7 +27667,7 @@
               <a:buAutoNum type="arabicPeriod" startAt="11"/>
             </a:pPr>
             <a:r>
-              <a:rPr lang="en-US" sz="1600" dirty="0">
+              <a:rPr lang="en-US" sz="1800" dirty="0">
                 <a:latin typeface="Times New Roman" panose="02020603050405020304" pitchFamily="18" charset="0"/>
                 <a:cs typeface="Times New Roman" panose="02020603050405020304" pitchFamily="18" charset="0"/>
               </a:rPr>
@@ -27627,7 +27680,7 @@
               <a:buAutoNum type="arabicPeriod" startAt="11"/>
             </a:pPr>
             <a:r>
-              <a:rPr lang="en-US" sz="1600" dirty="0">
+              <a:rPr lang="en-US" sz="1800" dirty="0">
                 <a:latin typeface="Times New Roman" panose="02020603050405020304" pitchFamily="18" charset="0"/>
                 <a:cs typeface="Times New Roman" panose="02020603050405020304" pitchFamily="18" charset="0"/>
               </a:rPr>
@@ -27640,7 +27693,7 @@
               <a:buAutoNum type="arabicPeriod" startAt="11"/>
             </a:pPr>
             <a:r>
-              <a:rPr lang="en-US" sz="1600" dirty="0">
+              <a:rPr lang="en-US" sz="1800" dirty="0">
                 <a:latin typeface="Times New Roman" panose="02020603050405020304" pitchFamily="18" charset="0"/>
                 <a:cs typeface="Times New Roman" panose="02020603050405020304" pitchFamily="18" charset="0"/>
               </a:rPr>
@@ -27653,7 +27706,7 @@
               <a:buAutoNum type="arabicPeriod" startAt="11"/>
             </a:pPr>
             <a:r>
-              <a:rPr lang="en-US" sz="1600" dirty="0">
+              <a:rPr lang="en-US" sz="1800" dirty="0">
                 <a:latin typeface="Times New Roman" panose="02020603050405020304" pitchFamily="18" charset="0"/>
                 <a:cs typeface="Times New Roman" panose="02020603050405020304" pitchFamily="18" charset="0"/>
               </a:rPr>
@@ -27666,7 +27719,7 @@
               <a:buAutoNum type="arabicPeriod" startAt="11"/>
             </a:pPr>
             <a:r>
-              <a:rPr lang="en-US" sz="1600" dirty="0">
+              <a:rPr lang="en-US" sz="1800" dirty="0">
                 <a:latin typeface="Times New Roman" panose="02020603050405020304" pitchFamily="18" charset="0"/>
                 <a:cs typeface="Times New Roman" panose="02020603050405020304" pitchFamily="18" charset="0"/>
               </a:rPr>
@@ -27679,7 +27732,7 @@
               <a:buAutoNum type="arabicPeriod" startAt="11"/>
             </a:pPr>
             <a:r>
-              <a:rPr lang="en-US" sz="1600" dirty="0">
+              <a:rPr lang="en-US" sz="1800" dirty="0">
                 <a:latin typeface="Times New Roman" panose="02020603050405020304" pitchFamily="18" charset="0"/>
                 <a:cs typeface="Times New Roman" panose="02020603050405020304" pitchFamily="18" charset="0"/>
               </a:rPr>
@@ -27692,7 +27745,7 @@
               <a:buAutoNum type="arabicPeriod" startAt="11"/>
             </a:pPr>
             <a:r>
-              <a:rPr lang="en-US" sz="1600" dirty="0">
+              <a:rPr lang="en-US" sz="1800" dirty="0">
                 <a:latin typeface="Times New Roman" panose="02020603050405020304" pitchFamily="18" charset="0"/>
                 <a:cs typeface="Times New Roman" panose="02020603050405020304" pitchFamily="18" charset="0"/>
               </a:rPr>
@@ -27705,7 +27758,7 @@
               <a:buAutoNum type="arabicPeriod" startAt="11"/>
             </a:pPr>
             <a:r>
-              <a:rPr lang="en-US" sz="1600" dirty="0">
+              <a:rPr lang="en-US" sz="1800" dirty="0">
                 <a:latin typeface="Times New Roman" panose="02020603050405020304" pitchFamily="18" charset="0"/>
                 <a:cs typeface="Times New Roman" panose="02020603050405020304" pitchFamily="18" charset="0"/>
               </a:rPr>
@@ -27790,7 +27843,12 @@
             <p:ph type="title"/>
           </p:nvPr>
         </p:nvSpPr>
-        <p:spPr/>
+        <p:spPr>
+          <a:xfrm>
+            <a:off x="457200" y="178191"/>
+            <a:ext cx="8229600" cy="609600"/>
+          </a:xfrm>
+        </p:spPr>
         <p:txBody>
           <a:bodyPr>
             <a:normAutofit fontScale="90000"/>
@@ -27802,14 +27860,8 @@
                 <a:latin typeface="Times New Roman" panose="02020603050405020304" pitchFamily="18" charset="0"/>
                 <a:cs typeface="Times New Roman" panose="02020603050405020304" pitchFamily="18" charset="0"/>
               </a:rPr>
-              <a:t>Scalability/Security/Deployment plan</a:t>
+              <a:t>Scalability/Security/Deployment Plan</a:t>
             </a:r>
-            <a:br>
-              <a:rPr lang="en-US" sz="3600" b="1" i="1" u="sng" spc="-53" dirty="0">
-                <a:latin typeface="Times New Roman" panose="02020603050405020304" pitchFamily="18" charset="0"/>
-                <a:cs typeface="Times New Roman" panose="02020603050405020304" pitchFamily="18" charset="0"/>
-              </a:rPr>
-            </a:br>
             <a:endParaRPr lang="en-US" b="1" i="1" u="sng" dirty="0"/>
           </a:p>
         </p:txBody>
@@ -27850,7 +27902,7 @@
           </a:bodyPr>
           <a:lstStyle/>
           <a:p>
-            <a:pPr marL="0" indent="0">
+            <a:pPr marL="0" indent="0" algn="just">
               <a:buNone/>
             </a:pPr>
             <a:r>
@@ -27862,7 +27914,7 @@
             </a:r>
           </a:p>
           <a:p>
-            <a:pPr marL="0" indent="0">
+            <a:pPr marL="0" indent="0" algn="just">
               <a:buNone/>
             </a:pPr>
             <a:r>
@@ -27874,7 +27926,7 @@
             </a:r>
           </a:p>
           <a:p>
-            <a:pPr marL="0" indent="0">
+            <a:pPr marL="0" indent="0" algn="just">
               <a:buNone/>
             </a:pPr>
             <a:r>
@@ -27886,7 +27938,7 @@
             </a:r>
           </a:p>
           <a:p>
-            <a:pPr marL="0" indent="0">
+            <a:pPr marL="0" indent="0" algn="just">
               <a:buNone/>
             </a:pPr>
             <a:r>
@@ -27895,18 +27947,6 @@
                 <a:cs typeface="Times New Roman" panose="02020603050405020304" pitchFamily="18" charset="0"/>
               </a:rPr>
               <a:t>	Web pages are secured as built and provide security for institutes. </a:t>
-            </a:r>
-          </a:p>
-          <a:p>
-            <a:pPr marL="0" indent="0">
-              <a:buNone/>
-            </a:pPr>
-            <a:r>
-              <a:rPr lang="en-US" sz="2200" dirty="0">
-                <a:latin typeface="Times New Roman" panose="02020603050405020304" pitchFamily="18" charset="0"/>
-                <a:cs typeface="Times New Roman" panose="02020603050405020304" pitchFamily="18" charset="0"/>
-              </a:rPr>
-              <a:t>Tag with Idea Project</a:t>
             </a:r>
           </a:p>
         </p:txBody>
@@ -28027,7 +28067,12 @@
             <p:ph type="title"/>
           </p:nvPr>
         </p:nvSpPr>
-        <p:spPr/>
+        <p:spPr>
+          <a:xfrm>
+            <a:off x="457200" y="228600"/>
+            <a:ext cx="8229600" cy="685800"/>
+          </a:xfrm>
+        </p:spPr>
         <p:txBody>
           <a:bodyPr>
             <a:normAutofit fontScale="90000"/>
@@ -28072,13 +28117,13 @@
         </p:nvSpPr>
         <p:spPr>
           <a:xfrm>
-            <a:off x="484632" y="1524000"/>
-            <a:ext cx="8229600" cy="3124201"/>
+            <a:off x="484632" y="1219200"/>
+            <a:ext cx="8229600" cy="3733800"/>
           </a:xfrm>
         </p:spPr>
         <p:txBody>
           <a:bodyPr>
-            <a:normAutofit fontScale="92500" lnSpcReduction="10000"/>
+            <a:normAutofit fontScale="92500"/>
           </a:bodyPr>
           <a:lstStyle/>
           <a:p>
@@ -28103,7 +28148,21 @@
                 <a:latin typeface="Times New Roman" panose="02020603050405020304" pitchFamily="18" charset="0"/>
                 <a:cs typeface="Times New Roman" panose="02020603050405020304" pitchFamily="18" charset="0"/>
               </a:rPr>
-              <a:t> Company Name: Sustainable Research and Consultancy Ltd. (SRCL)</a:t>
+              <a:t> </a:t>
+            </a:r>
+            <a:r>
+              <a:rPr lang="en-US" sz="2400" b="1" spc="-53" dirty="0">
+                <a:latin typeface="Times New Roman" panose="02020603050405020304" pitchFamily="18" charset="0"/>
+                <a:cs typeface="Times New Roman" panose="02020603050405020304" pitchFamily="18" charset="0"/>
+              </a:rPr>
+              <a:t>Company Name:</a:t>
+            </a:r>
+            <a:r>
+              <a:rPr lang="en-US" sz="2400" spc="-53" dirty="0">
+                <a:latin typeface="Times New Roman" panose="02020603050405020304" pitchFamily="18" charset="0"/>
+                <a:cs typeface="Times New Roman" panose="02020603050405020304" pitchFamily="18" charset="0"/>
+              </a:rPr>
+              <a:t> Sustainable Research and Consultancy Ltd. (SRCL)</a:t>
             </a:r>
           </a:p>
           <a:p>
@@ -28119,7 +28178,21 @@
                 <a:latin typeface="Times New Roman" panose="02020603050405020304" pitchFamily="18" charset="0"/>
                 <a:cs typeface="Times New Roman" panose="02020603050405020304" pitchFamily="18" charset="0"/>
               </a:rPr>
-              <a:t> Project Name: D- Learning Hub Project (Socheton Academic Care)</a:t>
+              <a:t> </a:t>
+            </a:r>
+            <a:r>
+              <a:rPr lang="en-US" sz="2400" b="1" spc="-53" dirty="0">
+                <a:latin typeface="Times New Roman" panose="02020603050405020304" pitchFamily="18" charset="0"/>
+                <a:cs typeface="Times New Roman" panose="02020603050405020304" pitchFamily="18" charset="0"/>
+              </a:rPr>
+              <a:t>Project Name:</a:t>
+            </a:r>
+            <a:r>
+              <a:rPr lang="en-US" sz="2400" spc="-53" dirty="0">
+                <a:latin typeface="Times New Roman" panose="02020603050405020304" pitchFamily="18" charset="0"/>
+                <a:cs typeface="Times New Roman" panose="02020603050405020304" pitchFamily="18" charset="0"/>
+              </a:rPr>
+              <a:t> D- Learning Hub Project (Socheton Academic Care)</a:t>
             </a:r>
           </a:p>
           <a:p>
@@ -28158,11 +28231,11 @@
               <a:buChar char="§"/>
             </a:pPr>
             <a:r>
-              <a:rPr lang="en-US" sz="2400" spc="-53" dirty="0">
+              <a:rPr lang="en-US" sz="2400" b="1" spc="-53" dirty="0">
                 <a:latin typeface="Times New Roman" panose="02020603050405020304" pitchFamily="18" charset="0"/>
                 <a:cs typeface="Times New Roman" panose="02020603050405020304" pitchFamily="18" charset="0"/>
               </a:rPr>
-              <a:t>Company logo:</a:t>
+              <a:t>Company Logo:</a:t>
             </a:r>
           </a:p>
           <a:p>
@@ -28186,11 +28259,18 @@
               <a:buChar char="§"/>
             </a:pPr>
             <a:r>
+              <a:rPr lang="en-US" sz="2400" b="1" spc="-53" dirty="0">
+                <a:latin typeface="Times New Roman" panose="02020603050405020304" pitchFamily="18" charset="0"/>
+                <a:cs typeface="Times New Roman" panose="02020603050405020304" pitchFamily="18" charset="0"/>
+              </a:rPr>
+              <a:t>Tag Line: </a:t>
+            </a:r>
+            <a:r>
               <a:rPr lang="en-US" sz="2400" spc="-53" dirty="0">
                 <a:latin typeface="Times New Roman" panose="02020603050405020304" pitchFamily="18" charset="0"/>
                 <a:cs typeface="Times New Roman" panose="02020603050405020304" pitchFamily="18" charset="0"/>
               </a:rPr>
-              <a:t>Tag Line: Real Education Online</a:t>
+              <a:t>Real Education Online</a:t>
             </a:r>
           </a:p>
           <a:p>
@@ -28265,7 +28345,7 @@
         </p:blipFill>
         <p:spPr>
           <a:xfrm>
-            <a:off x="6324600" y="3086100"/>
+            <a:off x="6324600" y="3015760"/>
             <a:ext cx="2147672" cy="1066799"/>
           </a:xfrm>
           <a:prstGeom prst="rect">
@@ -28301,7 +28381,7 @@
         </p:blipFill>
         <p:spPr>
           <a:xfrm>
-            <a:off x="2971800" y="3429001"/>
+            <a:off x="2971800" y="3288321"/>
             <a:ext cx="2743200" cy="609600"/>
           </a:xfrm>
           <a:prstGeom prst="rect">
@@ -28488,7 +28568,12 @@
             <p:ph type="title"/>
           </p:nvPr>
         </p:nvSpPr>
-        <p:spPr/>
+        <p:spPr>
+          <a:xfrm>
+            <a:off x="457200" y="152400"/>
+            <a:ext cx="8229600" cy="533400"/>
+          </a:xfrm>
+        </p:spPr>
         <p:txBody>
           <a:bodyPr>
             <a:normAutofit fontScale="90000"/>
@@ -28500,14 +28585,8 @@
                 <a:latin typeface="Times New Roman" panose="02020603050405020304" pitchFamily="18" charset="0"/>
                 <a:cs typeface="Times New Roman" panose="02020603050405020304" pitchFamily="18" charset="0"/>
               </a:rPr>
-              <a:t>Integration with other products/services</a:t>
+              <a:t>Integration with other Products/Services</a:t>
             </a:r>
-            <a:br>
-              <a:rPr lang="en-US" sz="3600" b="1" i="1" u="sng" spc="-53" dirty="0">
-                <a:latin typeface="Times New Roman" panose="02020603050405020304" pitchFamily="18" charset="0"/>
-                <a:cs typeface="Times New Roman" panose="02020603050405020304" pitchFamily="18" charset="0"/>
-              </a:rPr>
-            </a:br>
             <a:endParaRPr lang="en-US" b="1" i="1" u="sng" dirty="0"/>
           </a:p>
         </p:txBody>
@@ -28522,14 +28601,14 @@
             <p:ph idx="1"/>
             <p:extLst>
               <p:ext uri="{D42A27DB-BD31-4B8C-83A1-F6EECF244321}">
-                <p14:modId xmlns:p14="http://schemas.microsoft.com/office/powerpoint/2010/main" val="3406936529"/>
+                <p14:modId xmlns:p14="http://schemas.microsoft.com/office/powerpoint/2010/main" val="2351971600"/>
               </p:ext>
             </p:extLst>
           </p:nvPr>
         </p:nvGraphicFramePr>
         <p:xfrm>
-          <a:off x="457200" y="990601"/>
-          <a:ext cx="8229600" cy="5029200"/>
+          <a:off x="457200" y="838201"/>
+          <a:ext cx="8229600" cy="4876800"/>
         </p:xfrm>
         <a:graphic>
           <a:graphicData uri="http://schemas.openxmlformats.org/drawingml/2006/diagram">
@@ -28794,12 +28873,12 @@
             </a:lvl9pPr>
           </a:lstStyle>
           <a:p>
-            <a:pPr marL="0" indent="0">
+            <a:pPr marL="0" indent="0" algn="just">
               <a:buFont typeface="Arial" pitchFamily="34" charset="0"/>
               <a:buNone/>
             </a:pPr>
             <a:r>
-              <a:rPr lang="en-US" b="1" spc="-53" dirty="0">
+              <a:rPr lang="en-US" sz="2400" b="1" spc="-53" dirty="0">
                 <a:latin typeface="Times New Roman" panose="02020603050405020304" pitchFamily="18" charset="0"/>
                 <a:cs typeface="Times New Roman" panose="02020603050405020304" pitchFamily="18" charset="0"/>
               </a:rPr>
@@ -28807,7 +28886,7 @@
             </a:r>
           </a:p>
           <a:p>
-            <a:pPr lvl="0">
+            <a:pPr lvl="0" algn="just">
               <a:buFont typeface="Wingdings" panose="05000000000000000000" pitchFamily="2" charset="2"/>
               <a:buChar char="ü"/>
             </a:pPr>
@@ -28827,7 +28906,7 @@
             </a:r>
           </a:p>
           <a:p>
-            <a:pPr lvl="0">
+            <a:pPr lvl="0" algn="just">
               <a:buFont typeface="Wingdings" panose="05000000000000000000" pitchFamily="2" charset="2"/>
               <a:buChar char="ü"/>
             </a:pPr>
@@ -28847,7 +28926,7 @@
             </a:r>
           </a:p>
           <a:p>
-            <a:pPr lvl="0">
+            <a:pPr lvl="0" algn="just">
               <a:buFont typeface="Wingdings" panose="05000000000000000000" pitchFamily="2" charset="2"/>
               <a:buChar char="ü"/>
             </a:pPr>
@@ -28867,7 +28946,7 @@
             </a:r>
           </a:p>
           <a:p>
-            <a:pPr lvl="0">
+            <a:pPr lvl="0" algn="just">
               <a:buFont typeface="Wingdings" panose="05000000000000000000" pitchFamily="2" charset="2"/>
               <a:buChar char="ü"/>
             </a:pPr>
@@ -28887,7 +28966,7 @@
             </a:r>
           </a:p>
           <a:p>
-            <a:pPr>
+            <a:pPr algn="just">
               <a:buFont typeface="Wingdings" panose="05000000000000000000" pitchFamily="2" charset="2"/>
               <a:buChar char="ü"/>
             </a:pPr>
@@ -28986,8 +29065,8 @@
         </p:nvSpPr>
         <p:spPr>
           <a:xfrm>
-            <a:off x="457200" y="274638"/>
-            <a:ext cx="8229600" cy="944562"/>
+            <a:off x="457200" y="152400"/>
+            <a:ext cx="8229600" cy="685802"/>
           </a:xfrm>
         </p:spPr>
         <p:txBody>
@@ -28997,13 +29076,13 @@
           <a:lstStyle/>
           <a:p>
             <a:r>
-              <a:rPr lang="en-US" sz="3600" b="1" i="1" u="sng" spc="-53" dirty="0">
+              <a:rPr lang="en-US" sz="3200" b="1" i="1" u="sng" spc="-53" dirty="0">
                 <a:latin typeface="Times New Roman" panose="02020603050405020304" pitchFamily="18" charset="0"/>
                 <a:cs typeface="Times New Roman" panose="02020603050405020304" pitchFamily="18" charset="0"/>
               </a:rPr>
               <a:t>Proposed Partnerships</a:t>
             </a:r>
-            <a:endParaRPr lang="en-US" b="1" i="1" u="sng" dirty="0"/>
+            <a:endParaRPr lang="en-US" sz="3200" b="1" i="1" u="sng" dirty="0"/>
           </a:p>
         </p:txBody>
       </p:sp>
@@ -29019,78 +29098,108 @@
         </p:nvSpPr>
         <p:spPr>
           <a:xfrm>
-            <a:off x="457200" y="1219201"/>
-            <a:ext cx="8229600" cy="4419600"/>
+            <a:off x="457200" y="990599"/>
+            <a:ext cx="8229600" cy="4648201"/>
           </a:xfrm>
         </p:spPr>
         <p:txBody>
           <a:bodyPr>
-            <a:normAutofit fontScale="62500" lnSpcReduction="20000"/>
+            <a:noAutofit/>
           </a:bodyPr>
           <a:lstStyle/>
           <a:p>
-            <a:endParaRPr lang="en-US" dirty="0"/>
-          </a:p>
-          <a:p>
             <a:pPr marL="514350" indent="-514350" algn="just">
+              <a:spcBef>
+                <a:spcPts val="0"/>
+              </a:spcBef>
               <a:buFont typeface="+mj-lt"/>
               <a:buAutoNum type="arabicPeriod"/>
             </a:pPr>
             <a:r>
-              <a:rPr lang="en-US" dirty="0">
+              <a:rPr lang="en-US" sz="2100" b="1" dirty="0">
                 <a:latin typeface="Times New Roman" panose="02020603050405020304" pitchFamily="18" charset="0"/>
                 <a:cs typeface="Times New Roman" panose="02020603050405020304" pitchFamily="18" charset="0"/>
               </a:rPr>
-              <a:t>Basic Partner: Company Directors (07)</a:t>
+              <a:t>Basic Partner:</a:t>
+            </a:r>
+            <a:r>
+              <a:rPr lang="en-US" sz="2100" dirty="0">
+                <a:latin typeface="Times New Roman" panose="02020603050405020304" pitchFamily="18" charset="0"/>
+                <a:cs typeface="Times New Roman" panose="02020603050405020304" pitchFamily="18" charset="0"/>
+              </a:rPr>
+              <a:t> Company Directors (07)</a:t>
             </a:r>
           </a:p>
           <a:p>
             <a:pPr marL="514350" indent="-514350" algn="just">
+              <a:spcBef>
+                <a:spcPts val="0"/>
+              </a:spcBef>
               <a:buFont typeface="+mj-lt"/>
               <a:buAutoNum type="arabicPeriod"/>
             </a:pPr>
             <a:r>
-              <a:rPr lang="en-US" dirty="0">
+              <a:rPr lang="en-US" sz="2100" b="1" dirty="0">
                 <a:latin typeface="Times New Roman" panose="02020603050405020304" pitchFamily="18" charset="0"/>
                 <a:cs typeface="Times New Roman" panose="02020603050405020304" pitchFamily="18" charset="0"/>
               </a:rPr>
-              <a:t>Strategic partner: IDEA Project, A2I Project, ICT ministry</a:t>
+              <a:t>Strategic Partners:</a:t>
+            </a:r>
+            <a:r>
+              <a:rPr lang="en-US" sz="2100" dirty="0">
+                <a:latin typeface="Times New Roman" panose="02020603050405020304" pitchFamily="18" charset="0"/>
+                <a:cs typeface="Times New Roman" panose="02020603050405020304" pitchFamily="18" charset="0"/>
+              </a:rPr>
+              <a:t> IDEA Project, A2I Project, ICT ministry</a:t>
             </a:r>
           </a:p>
           <a:p>
             <a:pPr marL="514350" indent="-514350" algn="just">
+              <a:spcBef>
+                <a:spcPts val="0"/>
+              </a:spcBef>
               <a:buFont typeface="+mj-lt"/>
               <a:buAutoNum type="arabicPeriod"/>
             </a:pPr>
             <a:r>
-              <a:rPr lang="en-US" dirty="0">
+              <a:rPr lang="en-US" sz="2100" b="1" dirty="0">
                 <a:latin typeface="Times New Roman" panose="02020603050405020304" pitchFamily="18" charset="0"/>
                 <a:cs typeface="Times New Roman" panose="02020603050405020304" pitchFamily="18" charset="0"/>
               </a:rPr>
-              <a:t>Implementation Partners: DHSE, DME, DTE, INGOS, BMET, TTC NGOS and Different Training Centers</a:t>
+              <a:t>Implementation Partners: </a:t>
+            </a:r>
+            <a:r>
+              <a:rPr lang="en-US" sz="2100" dirty="0">
+                <a:latin typeface="Times New Roman" panose="02020603050405020304" pitchFamily="18" charset="0"/>
+                <a:cs typeface="Times New Roman" panose="02020603050405020304" pitchFamily="18" charset="0"/>
+              </a:rPr>
+              <a:t>DHSE, DME, DTE, INGOS, BMET, TTC NGOS and Different Training Centers</a:t>
             </a:r>
           </a:p>
           <a:p>
             <a:pPr marL="514350" indent="-514350" algn="just">
+              <a:spcBef>
+                <a:spcPts val="0"/>
+              </a:spcBef>
               <a:buFont typeface="+mj-lt"/>
               <a:buAutoNum type="arabicPeriod"/>
             </a:pPr>
             <a:r>
-              <a:rPr lang="en-US" dirty="0">
+              <a:rPr lang="en-US" sz="2100" b="1" dirty="0">
                 <a:latin typeface="Times New Roman" panose="02020603050405020304" pitchFamily="18" charset="0"/>
                 <a:cs typeface="Times New Roman" panose="02020603050405020304" pitchFamily="18" charset="0"/>
               </a:rPr>
               <a:t>Field Operational Partners: </a:t>
             </a:r>
             <a:r>
-              <a:rPr lang="en-US" dirty="0" err="1">
+              <a:rPr lang="en-US" sz="2100" dirty="0" err="1">
                 <a:latin typeface="Times New Roman" panose="02020603050405020304" pitchFamily="18" charset="0"/>
                 <a:cs typeface="Times New Roman" panose="02020603050405020304" pitchFamily="18" charset="0"/>
               </a:rPr>
               <a:t>Socheton</a:t>
             </a:r>
             <a:r>
-              <a:rPr lang="en-US" dirty="0">
+              <a:rPr lang="en-US" sz="2100" dirty="0">
                 <a:latin typeface="Times New Roman" panose="02020603050405020304" pitchFamily="18" charset="0"/>
                 <a:cs typeface="Times New Roman" panose="02020603050405020304" pitchFamily="18" charset="0"/>
               </a:rPr>
@@ -29099,81 +29208,91 @@
           </a:p>
           <a:p>
             <a:pPr marL="514350" indent="-514350" algn="just">
+              <a:spcBef>
+                <a:spcPts val="0"/>
+              </a:spcBef>
               <a:buFont typeface="+mj-lt"/>
               <a:buAutoNum type="arabicPeriod"/>
             </a:pPr>
             <a:r>
-              <a:rPr lang="en-US" dirty="0">
+              <a:rPr lang="en-US" sz="2100" b="1" dirty="0">
                 <a:latin typeface="Times New Roman" panose="02020603050405020304" pitchFamily="18" charset="0"/>
                 <a:cs typeface="Times New Roman" panose="02020603050405020304" pitchFamily="18" charset="0"/>
               </a:rPr>
-              <a:t>Media Partner: ATN News, ETV, The Daily </a:t>
+              <a:t>Media Partner: </a:t>
             </a:r>
             <a:r>
-              <a:rPr lang="en-US" dirty="0" err="1">
+              <a:rPr lang="en-US" sz="2100" dirty="0">
+                <a:latin typeface="Times New Roman" panose="02020603050405020304" pitchFamily="18" charset="0"/>
+                <a:cs typeface="Times New Roman" panose="02020603050405020304" pitchFamily="18" charset="0"/>
+              </a:rPr>
+              <a:t>ATN News, ETV, The Daily </a:t>
+            </a:r>
+            <a:r>
+              <a:rPr lang="en-US" sz="2100" dirty="0" err="1">
                 <a:latin typeface="Times New Roman" panose="02020603050405020304" pitchFamily="18" charset="0"/>
                 <a:cs typeface="Times New Roman" panose="02020603050405020304" pitchFamily="18" charset="0"/>
               </a:rPr>
               <a:t>Prothom</a:t>
             </a:r>
             <a:r>
-              <a:rPr lang="en-US" dirty="0">
+              <a:rPr lang="en-US" sz="2100" dirty="0">
                 <a:latin typeface="Times New Roman" panose="02020603050405020304" pitchFamily="18" charset="0"/>
                 <a:cs typeface="Times New Roman" panose="02020603050405020304" pitchFamily="18" charset="0"/>
               </a:rPr>
               <a:t> </a:t>
             </a:r>
             <a:r>
-              <a:rPr lang="en-US" dirty="0" err="1">
+              <a:rPr lang="en-US" sz="2100" dirty="0" err="1">
                 <a:latin typeface="Times New Roman" panose="02020603050405020304" pitchFamily="18" charset="0"/>
                 <a:cs typeface="Times New Roman" panose="02020603050405020304" pitchFamily="18" charset="0"/>
               </a:rPr>
               <a:t>Alo</a:t>
             </a:r>
             <a:r>
-              <a:rPr lang="en-US" dirty="0">
+              <a:rPr lang="en-US" sz="2100" dirty="0">
                 <a:latin typeface="Times New Roman" panose="02020603050405020304" pitchFamily="18" charset="0"/>
                 <a:cs typeface="Times New Roman" panose="02020603050405020304" pitchFamily="18" charset="0"/>
               </a:rPr>
               <a:t>, The Daily Star, The Bangladesh </a:t>
             </a:r>
             <a:r>
-              <a:rPr lang="en-US" dirty="0" err="1">
+              <a:rPr lang="en-US" sz="2100" dirty="0" err="1">
                 <a:latin typeface="Times New Roman" panose="02020603050405020304" pitchFamily="18" charset="0"/>
                 <a:cs typeface="Times New Roman" panose="02020603050405020304" pitchFamily="18" charset="0"/>
               </a:rPr>
               <a:t>Protidin</a:t>
             </a:r>
             <a:r>
-              <a:rPr lang="en-US" dirty="0">
+              <a:rPr lang="en-US" sz="2100" dirty="0">
                 <a:latin typeface="Times New Roman" panose="02020603050405020304" pitchFamily="18" charset="0"/>
                 <a:cs typeface="Times New Roman" panose="02020603050405020304" pitchFamily="18" charset="0"/>
               </a:rPr>
               <a:t>, Radio Today, </a:t>
             </a:r>
             <a:r>
-              <a:rPr lang="en-US" dirty="0" err="1">
+              <a:rPr lang="en-US" sz="2100" dirty="0" err="1">
                 <a:latin typeface="Times New Roman" panose="02020603050405020304" pitchFamily="18" charset="0"/>
                 <a:cs typeface="Times New Roman" panose="02020603050405020304" pitchFamily="18" charset="0"/>
               </a:rPr>
               <a:t>Jago</a:t>
             </a:r>
             <a:r>
-              <a:rPr lang="en-US" dirty="0">
+              <a:rPr lang="en-US" sz="2100" dirty="0">
                 <a:latin typeface="Times New Roman" panose="02020603050405020304" pitchFamily="18" charset="0"/>
                 <a:cs typeface="Times New Roman" panose="02020603050405020304" pitchFamily="18" charset="0"/>
               </a:rPr>
               <a:t> FM </a:t>
             </a:r>
             <a:r>
-              <a:rPr lang="en-US" dirty="0" err="1">
+              <a:rPr lang="en-US" sz="2100" dirty="0" err="1">
                 <a:latin typeface="Times New Roman" panose="02020603050405020304" pitchFamily="18" charset="0"/>
                 <a:cs typeface="Times New Roman" panose="02020603050405020304" pitchFamily="18" charset="0"/>
               </a:rPr>
               <a:t>amd</a:t>
             </a:r>
             <a:r>
-              <a:rPr lang="en-US" dirty="0">
+              <a:rPr lang="en-US" sz="2100" dirty="0">
                 <a:latin typeface="Times New Roman" panose="02020603050405020304" pitchFamily="18" charset="0"/>
                 <a:cs typeface="Times New Roman" panose="02020603050405020304" pitchFamily="18" charset="0"/>
               </a:rPr>
@@ -29182,54 +29301,94 @@
           </a:p>
           <a:p>
             <a:pPr marL="514350" indent="-514350" algn="just">
+              <a:spcBef>
+                <a:spcPts val="0"/>
+              </a:spcBef>
               <a:buFont typeface="+mj-lt"/>
               <a:buAutoNum type="arabicPeriod"/>
             </a:pPr>
             <a:r>
-              <a:rPr lang="en-US" dirty="0">
+              <a:rPr lang="en-US" sz="2100" b="1" dirty="0">
                 <a:latin typeface="Times New Roman" panose="02020603050405020304" pitchFamily="18" charset="0"/>
                 <a:cs typeface="Times New Roman" panose="02020603050405020304" pitchFamily="18" charset="0"/>
               </a:rPr>
-              <a:t>Field Partners: Different School, college, madrasah, technical institutes, polytechnic, NGO training centers and others. </a:t>
+              <a:t>Field Partners:</a:t>
+            </a:r>
+            <a:r>
+              <a:rPr lang="en-US" sz="2100" dirty="0">
+                <a:latin typeface="Times New Roman" panose="02020603050405020304" pitchFamily="18" charset="0"/>
+                <a:cs typeface="Times New Roman" panose="02020603050405020304" pitchFamily="18" charset="0"/>
+              </a:rPr>
+              <a:t> Different School, college, madrasah, technical institutes, polytechnic, NGO training centers and others. </a:t>
             </a:r>
           </a:p>
           <a:p>
             <a:pPr marL="514350" indent="-514350" algn="just">
+              <a:spcBef>
+                <a:spcPts val="0"/>
+              </a:spcBef>
               <a:buFont typeface="+mj-lt"/>
               <a:buAutoNum type="arabicPeriod"/>
             </a:pPr>
             <a:r>
-              <a:rPr lang="en-US" dirty="0">
+              <a:rPr lang="en-US" sz="2100" b="1" dirty="0">
                 <a:latin typeface="Times New Roman" panose="02020603050405020304" pitchFamily="18" charset="0"/>
                 <a:cs typeface="Times New Roman" panose="02020603050405020304" pitchFamily="18" charset="0"/>
               </a:rPr>
-              <a:t>Foreign Partners: International Business Expert (b-Ex) Group, UK</a:t>
+              <a:t>Foreign Partners:</a:t>
+            </a:r>
+            <a:r>
+              <a:rPr lang="en-US" sz="2100" dirty="0">
+                <a:latin typeface="Times New Roman" panose="02020603050405020304" pitchFamily="18" charset="0"/>
+                <a:cs typeface="Times New Roman" panose="02020603050405020304" pitchFamily="18" charset="0"/>
+              </a:rPr>
+              <a:t> International Business Expert (b-Ex) Group, UK</a:t>
             </a:r>
           </a:p>
           <a:p>
             <a:pPr marL="514350" indent="-514350" algn="just">
+              <a:spcBef>
+                <a:spcPts val="0"/>
+              </a:spcBef>
               <a:buFont typeface="+mj-lt"/>
               <a:buAutoNum type="arabicPeriod"/>
             </a:pPr>
             <a:r>
-              <a:rPr lang="en-US" dirty="0">
+              <a:rPr lang="en-US" sz="2100" b="1" dirty="0">
                 <a:latin typeface="Times New Roman" panose="02020603050405020304" pitchFamily="18" charset="0"/>
                 <a:cs typeface="Times New Roman" panose="02020603050405020304" pitchFamily="18" charset="0"/>
               </a:rPr>
-              <a:t>Donor Partners: USAID, DFID, Swiss Contact, Embassy of Netherland</a:t>
+              <a:t>Donor Partners:</a:t>
+            </a:r>
+            <a:r>
+              <a:rPr lang="en-US" sz="2100" dirty="0">
+                <a:latin typeface="Times New Roman" panose="02020603050405020304" pitchFamily="18" charset="0"/>
+                <a:cs typeface="Times New Roman" panose="02020603050405020304" pitchFamily="18" charset="0"/>
+              </a:rPr>
+              <a:t> USAID, DFID, Swiss Contact, Embassy of Netherland</a:t>
             </a:r>
           </a:p>
           <a:p>
             <a:pPr marL="514350" indent="-514350" algn="just">
+              <a:spcBef>
+                <a:spcPts val="0"/>
+              </a:spcBef>
               <a:buFont typeface="+mj-lt"/>
               <a:buAutoNum type="arabicPeriod"/>
             </a:pPr>
             <a:r>
-              <a:rPr lang="en-US" dirty="0">
+              <a:rPr lang="en-US" sz="2100" b="1" dirty="0">
                 <a:latin typeface="Times New Roman" panose="02020603050405020304" pitchFamily="18" charset="0"/>
                 <a:cs typeface="Times New Roman" panose="02020603050405020304" pitchFamily="18" charset="0"/>
               </a:rPr>
-              <a:t>International Certification Partners: ISO, UKAS, 3 Plum Certification</a:t>
+              <a:t>International Certification Partners:</a:t>
+            </a:r>
+            <a:r>
+              <a:rPr lang="en-US" sz="2100" dirty="0">
+                <a:latin typeface="Times New Roman" panose="02020603050405020304" pitchFamily="18" charset="0"/>
+                <a:cs typeface="Times New Roman" panose="02020603050405020304" pitchFamily="18" charset="0"/>
+              </a:rPr>
+              <a:t> ISO, UKAS, 3 Plum Certification</a:t>
             </a:r>
           </a:p>
         </p:txBody>
@@ -29310,7 +29469,12 @@
             <p:ph type="title"/>
           </p:nvPr>
         </p:nvSpPr>
-        <p:spPr/>
+        <p:spPr>
+          <a:xfrm>
+            <a:off x="457200" y="274638"/>
+            <a:ext cx="8229600" cy="944562"/>
+          </a:xfrm>
+        </p:spPr>
         <p:txBody>
           <a:bodyPr>
             <a:normAutofit/>
@@ -29322,7 +29486,7 @@
                 <a:latin typeface="Times New Roman" panose="02020603050405020304" pitchFamily="18" charset="0"/>
                 <a:cs typeface="Times New Roman" panose="02020603050405020304" pitchFamily="18" charset="0"/>
               </a:rPr>
-              <a:t>Marketing Plan (web/social/electronic/print)</a:t>
+              <a:t>Marketing Plan (Web/Social/Electronic/Print)</a:t>
             </a:r>
             <a:endParaRPr lang="en-US" sz="3200" b="1" i="1" u="sng" dirty="0"/>
           </a:p>
@@ -29350,39 +29514,71 @@
           </a:bodyPr>
           <a:lstStyle/>
           <a:p>
+            <a:pPr algn="just"/>
+            <a:r>
+              <a:rPr lang="en-US" sz="2200" b="1" dirty="0">
+                <a:latin typeface="Times New Roman" panose="02020603050405020304" pitchFamily="18" charset="0"/>
+                <a:cs typeface="Times New Roman" panose="02020603050405020304" pitchFamily="18" charset="0"/>
+              </a:rPr>
+              <a:t>Web Page:</a:t>
+            </a:r>
             <a:r>
               <a:rPr lang="en-US" sz="2200" dirty="0">
                 <a:latin typeface="Times New Roman" panose="02020603050405020304" pitchFamily="18" charset="0"/>
                 <a:cs typeface="Times New Roman" panose="02020603050405020304" pitchFamily="18" charset="0"/>
               </a:rPr>
-              <a:t>Web page: A smart HTML based Integrated Webpage </a:t>
+              <a:t> A smart HTML based Integrated Webpage </a:t>
             </a:r>
           </a:p>
           <a:p>
+            <a:pPr algn="just"/>
+            <a:r>
+              <a:rPr lang="en-US" sz="2200" b="1" dirty="0">
+                <a:latin typeface="Times New Roman" panose="02020603050405020304" pitchFamily="18" charset="0"/>
+                <a:cs typeface="Times New Roman" panose="02020603050405020304" pitchFamily="18" charset="0"/>
+              </a:rPr>
+              <a:t>Social Media:</a:t>
+            </a:r>
             <a:r>
               <a:rPr lang="en-US" sz="2200" dirty="0">
                 <a:latin typeface="Times New Roman" panose="02020603050405020304" pitchFamily="18" charset="0"/>
                 <a:cs typeface="Times New Roman" panose="02020603050405020304" pitchFamily="18" charset="0"/>
               </a:rPr>
-              <a:t>Social Media: Facebook Boosting (Daily $100), YouTube Branding (Daily $100)</a:t>
+              <a:t> Facebook Boosting (Daily $100), YouTube Branding (Daily $100)</a:t>
             </a:r>
           </a:p>
           <a:p>
+            <a:pPr algn="just"/>
+            <a:r>
+              <a:rPr lang="en-US" sz="2200" b="1" dirty="0">
+                <a:latin typeface="Times New Roman" panose="02020603050405020304" pitchFamily="18" charset="0"/>
+                <a:cs typeface="Times New Roman" panose="02020603050405020304" pitchFamily="18" charset="0"/>
+              </a:rPr>
+              <a:t>Electronic Media:</a:t>
+            </a:r>
             <a:r>
               <a:rPr lang="en-US" sz="2200" dirty="0">
                 <a:latin typeface="Times New Roman" panose="02020603050405020304" pitchFamily="18" charset="0"/>
                 <a:cs typeface="Times New Roman" panose="02020603050405020304" pitchFamily="18" charset="0"/>
               </a:rPr>
-              <a:t>Electronic Media: 5 Talk shows, 2 Round Tables, Special Interviews 10, 1 advertisement</a:t>
+              <a:t> 5 Talk shows, 2 Round Tables, Special Interviews 10, 1 advertisement</a:t>
             </a:r>
           </a:p>
           <a:p>
+            <a:pPr algn="just"/>
+            <a:r>
+              <a:rPr lang="en-US" sz="2200" b="1" dirty="0">
+                <a:latin typeface="Times New Roman" panose="02020603050405020304" pitchFamily="18" charset="0"/>
+                <a:cs typeface="Times New Roman" panose="02020603050405020304" pitchFamily="18" charset="0"/>
+              </a:rPr>
+              <a:t>Print Media:</a:t>
+            </a:r>
             <a:r>
               <a:rPr lang="en-US" sz="2200" dirty="0">
                 <a:latin typeface="Times New Roman" panose="02020603050405020304" pitchFamily="18" charset="0"/>
                 <a:cs typeface="Times New Roman" panose="02020603050405020304" pitchFamily="18" charset="0"/>
               </a:rPr>
-              <a:t>Print Media: Inauguration Program (Full Page), Daily Advertisement (20 Times in 5 National Dailies)</a:t>
+              <a:t> Inauguration Program (Full Page), Daily Advertisement (20 Times in 5 National Dailies)</a:t>
             </a:r>
           </a:p>
         </p:txBody>
@@ -29463,7 +29659,12 @@
             <p:ph type="title"/>
           </p:nvPr>
         </p:nvSpPr>
-        <p:spPr/>
+        <p:spPr>
+          <a:xfrm>
+            <a:off x="457200" y="274638"/>
+            <a:ext cx="8229600" cy="715962"/>
+          </a:xfrm>
+        </p:spPr>
         <p:txBody>
           <a:bodyPr>
             <a:normAutofit/>
@@ -29475,7 +29676,7 @@
                 <a:latin typeface="Times New Roman" panose="02020603050405020304" pitchFamily="18" charset="0"/>
                 <a:cs typeface="Times New Roman" panose="02020603050405020304" pitchFamily="18" charset="0"/>
               </a:rPr>
-              <a:t>Sales Plan (direct/indirect/channels)</a:t>
+              <a:t>Sales Plan (Direct/Indirect/Channels)</a:t>
             </a:r>
             <a:endParaRPr lang="en-US" sz="3200" b="1" i="1" u="sng" dirty="0"/>
           </a:p>
@@ -29505,11 +29706,18 @@
           <a:p>
             <a:pPr algn="just"/>
             <a:r>
+              <a:rPr lang="en-US" sz="2200" b="1" dirty="0">
+                <a:latin typeface="Times New Roman" panose="02020603050405020304" pitchFamily="18" charset="0"/>
+                <a:cs typeface="Times New Roman" panose="02020603050405020304" pitchFamily="18" charset="0"/>
+              </a:rPr>
+              <a:t>Direct Sales:</a:t>
+            </a:r>
+            <a:r>
               <a:rPr lang="en-US" sz="2200" dirty="0">
                 <a:latin typeface="Times New Roman" panose="02020603050405020304" pitchFamily="18" charset="0"/>
                 <a:cs typeface="Times New Roman" panose="02020603050405020304" pitchFamily="18" charset="0"/>
               </a:rPr>
-              <a:t>Direct Sales: School, College, Madrassa, Technical Institutes, NGO Training Centers, Govt. training centers, Skill Programs in Bangladesh. (Work order collection and implementation)</a:t>
+              <a:t> School, College, Madrassa, Technical Institutes, NGO Training Centers, Govt. training centers, Skill Programs in Bangladesh. (Work order collection and implementation)</a:t>
             </a:r>
           </a:p>
           <a:p>
@@ -29524,11 +29732,18 @@
           <a:p>
             <a:pPr algn="just"/>
             <a:r>
+              <a:rPr lang="en-US" sz="2200" b="1" dirty="0">
+                <a:latin typeface="Times New Roman" panose="02020603050405020304" pitchFamily="18" charset="0"/>
+                <a:cs typeface="Times New Roman" panose="02020603050405020304" pitchFamily="18" charset="0"/>
+              </a:rPr>
+              <a:t>Indirect Sales:</a:t>
+            </a:r>
+            <a:r>
               <a:rPr lang="en-US" sz="2200" dirty="0">
                 <a:latin typeface="Times New Roman" panose="02020603050405020304" pitchFamily="18" charset="0"/>
                 <a:cs typeface="Times New Roman" panose="02020603050405020304" pitchFamily="18" charset="0"/>
               </a:rPr>
-              <a:t>Indirect Sales: Collect permission from different departments and according to project cycle implementation</a:t>
+              <a:t> Collect permission from different departments and according to project cycle implementation</a:t>
             </a:r>
           </a:p>
           <a:p>
@@ -29543,11 +29758,18 @@
           <a:p>
             <a:pPr algn="just"/>
             <a:r>
+              <a:rPr lang="en-US" sz="2200" b="1" dirty="0">
+                <a:latin typeface="Times New Roman" panose="02020603050405020304" pitchFamily="18" charset="0"/>
+                <a:cs typeface="Times New Roman" panose="02020603050405020304" pitchFamily="18" charset="0"/>
+              </a:rPr>
+              <a:t>Channels:</a:t>
+            </a:r>
+            <a:r>
               <a:rPr lang="en-US" sz="2200" dirty="0">
                 <a:latin typeface="Times New Roman" panose="02020603050405020304" pitchFamily="18" charset="0"/>
                 <a:cs typeface="Times New Roman" panose="02020603050405020304" pitchFamily="18" charset="0"/>
               </a:rPr>
-              <a:t>Channels: Government, Donors, Foreign Donation, Teachers Associations and others channels will be used as Sales purposes. </a:t>
+              <a:t> Government, Donors, Foreign Donation, Teachers Associations and others channels will be used as Sales purposes. </a:t>
             </a:r>
           </a:p>
         </p:txBody>
@@ -29640,7 +29862,7 @@
           </a:bodyPr>
           <a:lstStyle/>
           <a:p>
-            <a:pPr defTabSz="685800">
+            <a:pPr algn="just" defTabSz="685800">
               <a:lnSpc>
                 <a:spcPct val="150000"/>
               </a:lnSpc>
@@ -29654,7 +29876,7 @@
                 <a:latin typeface="Times New Roman" panose="02020603050405020304" pitchFamily="18" charset="0"/>
                 <a:cs typeface="Times New Roman" panose="02020603050405020304" pitchFamily="18" charset="0"/>
               </a:rPr>
-              <a:t>Describe:</a:t>
+              <a:t>Description:</a:t>
             </a:r>
             <a:r>
               <a:rPr lang="en-US" sz="2400" b="1" dirty="0">
@@ -29669,7 +29891,7 @@
             </a:endParaRPr>
           </a:p>
           <a:p>
-            <a:pPr marL="457200" indent="-457200" defTabSz="685800">
+            <a:pPr marL="457200" indent="-457200" algn="just" defTabSz="685800">
               <a:lnSpc>
                 <a:spcPct val="150000"/>
               </a:lnSpc>
@@ -29681,15 +29903,22 @@
               <a:defRPr/>
             </a:pPr>
             <a:r>
+              <a:rPr lang="en-US" sz="2200" b="1" spc="-53" dirty="0">
+                <a:latin typeface="Times New Roman" panose="02020603050405020304" pitchFamily="18" charset="0"/>
+                <a:cs typeface="Times New Roman" panose="02020603050405020304" pitchFamily="18" charset="0"/>
+              </a:rPr>
+              <a:t>Funding Sources:</a:t>
+            </a:r>
+            <a:r>
               <a:rPr lang="en-US" sz="2200" spc="-53" dirty="0">
                 <a:latin typeface="Times New Roman" panose="02020603050405020304" pitchFamily="18" charset="0"/>
                 <a:cs typeface="Times New Roman" panose="02020603050405020304" pitchFamily="18" charset="0"/>
               </a:rPr>
-              <a:t>Funding sources IDEA Project, A2I Project, Personal, Directors funds and donors fund</a:t>
+              <a:t> IDEA Project, A2I Project, Personal, Directors funds and donors fund</a:t>
             </a:r>
           </a:p>
           <a:p>
-            <a:pPr marL="457200" indent="-457200" defTabSz="685800">
+            <a:pPr marL="457200" indent="-457200" algn="just" defTabSz="685800">
               <a:lnSpc>
                 <a:spcPct val="150000"/>
               </a:lnSpc>
@@ -29701,15 +29930,22 @@
               <a:defRPr/>
             </a:pPr>
             <a:r>
+              <a:rPr lang="en-US" sz="2200" b="1" spc="-53" dirty="0">
+                <a:latin typeface="Times New Roman" panose="02020603050405020304" pitchFamily="18" charset="0"/>
+                <a:cs typeface="Times New Roman" panose="02020603050405020304" pitchFamily="18" charset="0"/>
+              </a:rPr>
+              <a:t>Fund Amount:</a:t>
+            </a:r>
+            <a:r>
               <a:rPr lang="en-US" sz="2200" spc="-53" dirty="0">
                 <a:latin typeface="Times New Roman" panose="02020603050405020304" pitchFamily="18" charset="0"/>
                 <a:cs typeface="Times New Roman" panose="02020603050405020304" pitchFamily="18" charset="0"/>
               </a:rPr>
-              <a:t>Fund amount: Preliminary BDT 1,000,000</a:t>
+              <a:t> Preliminary BDT 1,000,000</a:t>
             </a:r>
           </a:p>
           <a:p>
-            <a:pPr marL="457200" indent="-457200" defTabSz="685800">
+            <a:pPr marL="457200" indent="-457200" algn="just" defTabSz="685800">
               <a:lnSpc>
                 <a:spcPct val="150000"/>
               </a:lnSpc>
@@ -29721,15 +29957,22 @@
               <a:defRPr/>
             </a:pPr>
             <a:r>
+              <a:rPr lang="en-US" sz="2200" b="1" spc="-53" dirty="0">
+                <a:latin typeface="Times New Roman" panose="02020603050405020304" pitchFamily="18" charset="0"/>
+                <a:cs typeface="Times New Roman" panose="02020603050405020304" pitchFamily="18" charset="0"/>
+              </a:rPr>
+              <a:t>Use of Funds:</a:t>
+            </a:r>
+            <a:r>
               <a:rPr lang="en-US" sz="2200" spc="-53" dirty="0">
                 <a:latin typeface="Times New Roman" panose="02020603050405020304" pitchFamily="18" charset="0"/>
                 <a:cs typeface="Times New Roman" panose="02020603050405020304" pitchFamily="18" charset="0"/>
               </a:rPr>
-              <a:t>Use of funds: Product Purchase, Demo Setup, Operational Cost, Overhead, Web page development, financial framework development, Mobile App development, Consultancy and others.</a:t>
+              <a:t> Product Purchase, Demo Setup, Operational Cost, Overhead, Web page development, financial framework development, Mobile App development, Consultancy and others.</a:t>
             </a:r>
           </a:p>
           <a:p>
-            <a:pPr defTabSz="685800">
+            <a:pPr algn="just" defTabSz="685800">
               <a:lnSpc>
                 <a:spcPct val="150000"/>
               </a:lnSpc>
@@ -29868,7 +30111,7 @@
         </p:nvSpPr>
         <p:spPr>
           <a:xfrm>
-            <a:off x="2895600" y="373856"/>
+            <a:off x="2895600" y="133643"/>
             <a:ext cx="3352800" cy="715962"/>
           </a:xfrm>
         </p:spPr>
@@ -29905,14 +30148,14 @@
             <p:ph idx="1"/>
             <p:extLst>
               <p:ext uri="{D42A27DB-BD31-4B8C-83A1-F6EECF244321}">
-                <p14:modId xmlns:p14="http://schemas.microsoft.com/office/powerpoint/2010/main" val="4274778543"/>
+                <p14:modId xmlns:p14="http://schemas.microsoft.com/office/powerpoint/2010/main" val="1122721921"/>
               </p:ext>
             </p:extLst>
           </p:nvPr>
         </p:nvGraphicFramePr>
         <p:xfrm>
-          <a:off x="457200" y="1318848"/>
-          <a:ext cx="8229600" cy="4525963"/>
+          <a:off x="457200" y="1066801"/>
+          <a:ext cx="8229600" cy="4495800"/>
         </p:xfrm>
         <a:graphic>
           <a:graphicData uri="http://schemas.openxmlformats.org/drawingml/2006/diagram">
@@ -30236,7 +30479,7 @@
         <p:spPr>
           <a:xfrm>
             <a:off x="637465" y="1154835"/>
-            <a:ext cx="7869070" cy="4629601"/>
+            <a:ext cx="7869070" cy="4352602"/>
           </a:xfrm>
           <a:prstGeom prst="rect">
             <a:avLst/>
@@ -30249,33 +30492,7 @@
           </a:bodyPr>
           <a:lstStyle/>
           <a:p>
-            <a:pPr defTabSz="685800">
-              <a:lnSpc>
-                <a:spcPct val="150000"/>
-              </a:lnSpc>
-              <a:buClr>
-                <a:srgbClr val="C00000"/>
-              </a:buClr>
-              <a:defRPr/>
-            </a:pPr>
-            <a:endParaRPr lang="en-US" sz="1200" spc="-53" dirty="0">
-              <a:gradFill>
-                <a:gsLst>
-                  <a:gs pos="2917">
-                    <a:srgbClr val="797A7D"/>
-                  </a:gs>
-                  <a:gs pos="95000">
-                    <a:srgbClr val="797A7D"/>
-                  </a:gs>
-                </a:gsLst>
-                <a:lin ang="5400000" scaled="0"/>
-              </a:gradFill>
-              <a:latin typeface="Times New Roman" panose="02020603050405020304" pitchFamily="18" charset="0"/>
-              <a:cs typeface="Times New Roman" panose="02020603050405020304" pitchFamily="18" charset="0"/>
-            </a:endParaRPr>
-          </a:p>
-          <a:p>
-            <a:pPr defTabSz="685800">
+            <a:pPr algn="just" defTabSz="685800">
               <a:lnSpc>
                 <a:spcPct val="150000"/>
               </a:lnSpc>
@@ -30289,23 +30506,21 @@
                 <a:latin typeface="Times New Roman" panose="02020603050405020304" pitchFamily="18" charset="0"/>
                 <a:cs typeface="Times New Roman" panose="02020603050405020304" pitchFamily="18" charset="0"/>
               </a:rPr>
-              <a:t>Describe:   </a:t>
+              <a:t>Description:   </a:t>
             </a:r>
           </a:p>
           <a:p>
-            <a:pPr marL="457200" indent="-457200" defTabSz="685800">
+            <a:pPr algn="just" defTabSz="685800">
               <a:lnSpc>
                 <a:spcPct val="150000"/>
               </a:lnSpc>
               <a:buClr>
                 <a:srgbClr val="C00000"/>
               </a:buClr>
-              <a:buFont typeface="Wingdings" panose="05000000000000000000" pitchFamily="2" charset="2"/>
-              <a:buChar char="§"/>
               <a:defRPr/>
             </a:pPr>
             <a:r>
-              <a:rPr lang="en-US" sz="2200" spc="-53" dirty="0">
+              <a:rPr lang="en-US" sz="2200" b="1" spc="-53" dirty="0">
                 <a:latin typeface="Times New Roman" panose="02020603050405020304" pitchFamily="18" charset="0"/>
                 <a:cs typeface="Times New Roman" panose="02020603050405020304" pitchFamily="18" charset="0"/>
               </a:rPr>
@@ -30313,7 +30528,7 @@
             </a:r>
           </a:p>
           <a:p>
-            <a:pPr marL="342900" indent="-342900" defTabSz="685800">
+            <a:pPr marL="342900" indent="-342900" algn="just" defTabSz="685800">
               <a:lnSpc>
                 <a:spcPct val="150000"/>
               </a:lnSpc>
@@ -30325,29 +30540,36 @@
               <a:defRPr/>
             </a:pPr>
             <a:r>
-              <a:rPr lang="en-US" sz="2200" spc="-53" dirty="0">
+              <a:rPr lang="en-US" sz="2200" b="1" spc="-53" dirty="0">
                 <a:latin typeface="Times New Roman" panose="02020603050405020304" pitchFamily="18" charset="0"/>
                 <a:cs typeface="Times New Roman" panose="02020603050405020304" pitchFamily="18" charset="0"/>
               </a:rPr>
               <a:t>1</a:t>
             </a:r>
             <a:r>
-              <a:rPr lang="en-US" sz="2200" spc="-53" baseline="30000" dirty="0">
+              <a:rPr lang="en-US" sz="2200" b="1" spc="-53" baseline="30000" dirty="0">
                 <a:latin typeface="Times New Roman" panose="02020603050405020304" pitchFamily="18" charset="0"/>
                 <a:cs typeface="Times New Roman" panose="02020603050405020304" pitchFamily="18" charset="0"/>
               </a:rPr>
               <a:t>st</a:t>
             </a:r>
             <a:r>
+              <a:rPr lang="en-US" sz="2200" b="1" spc="-53" dirty="0">
+                <a:latin typeface="Times New Roman" panose="02020603050405020304" pitchFamily="18" charset="0"/>
+                <a:cs typeface="Times New Roman" panose="02020603050405020304" pitchFamily="18" charset="0"/>
+              </a:rPr>
+              <a:t> Quarter:</a:t>
+            </a:r>
+            <a:r>
               <a:rPr lang="en-US" sz="2200" spc="-53" dirty="0">
                 <a:latin typeface="Times New Roman" panose="02020603050405020304" pitchFamily="18" charset="0"/>
                 <a:cs typeface="Times New Roman" panose="02020603050405020304" pitchFamily="18" charset="0"/>
               </a:rPr>
-              <a:t> Quarter: Communication and Project Submission in Different Authorities</a:t>
+              <a:t> Communication and Project Submission in Different Authorities</a:t>
             </a:r>
           </a:p>
           <a:p>
-            <a:pPr marL="342900" indent="-342900" defTabSz="685800">
+            <a:pPr marL="342900" indent="-342900" algn="just" defTabSz="685800">
               <a:lnSpc>
                 <a:spcPct val="150000"/>
               </a:lnSpc>
@@ -30359,29 +30581,36 @@
               <a:defRPr/>
             </a:pPr>
             <a:r>
-              <a:rPr lang="en-US" sz="2200" spc="-53" dirty="0">
+              <a:rPr lang="en-US" sz="2200" b="1" spc="-53" dirty="0">
                 <a:latin typeface="Times New Roman" panose="02020603050405020304" pitchFamily="18" charset="0"/>
                 <a:cs typeface="Times New Roman" panose="02020603050405020304" pitchFamily="18" charset="0"/>
               </a:rPr>
               <a:t>2</a:t>
             </a:r>
             <a:r>
-              <a:rPr lang="en-US" sz="2200" spc="-53" baseline="30000" dirty="0">
+              <a:rPr lang="en-US" sz="2200" b="1" spc="-53" baseline="30000" dirty="0">
                 <a:latin typeface="Times New Roman" panose="02020603050405020304" pitchFamily="18" charset="0"/>
                 <a:cs typeface="Times New Roman" panose="02020603050405020304" pitchFamily="18" charset="0"/>
               </a:rPr>
               <a:t>nd</a:t>
             </a:r>
             <a:r>
+              <a:rPr lang="en-US" sz="2200" b="1" spc="-53" dirty="0">
+                <a:latin typeface="Times New Roman" panose="02020603050405020304" pitchFamily="18" charset="0"/>
+                <a:cs typeface="Times New Roman" panose="02020603050405020304" pitchFamily="18" charset="0"/>
+              </a:rPr>
+              <a:t> Quarter:</a:t>
+            </a:r>
+            <a:r>
               <a:rPr lang="en-US" sz="2200" spc="-53" dirty="0">
                 <a:latin typeface="Times New Roman" panose="02020603050405020304" pitchFamily="18" charset="0"/>
                 <a:cs typeface="Times New Roman" panose="02020603050405020304" pitchFamily="18" charset="0"/>
               </a:rPr>
-              <a:t> Quarter: Corrections and Resubmission according to instructions</a:t>
+              <a:t> Corrections and Resubmission according to instructions</a:t>
             </a:r>
           </a:p>
           <a:p>
-            <a:pPr marL="342900" indent="-342900" defTabSz="685800">
+            <a:pPr marL="342900" indent="-342900" algn="just" defTabSz="685800">
               <a:lnSpc>
                 <a:spcPct val="150000"/>
               </a:lnSpc>
@@ -30393,29 +30622,36 @@
               <a:defRPr/>
             </a:pPr>
             <a:r>
-              <a:rPr lang="en-US" sz="2200" spc="-53" dirty="0">
+              <a:rPr lang="en-US" sz="2200" b="1" spc="-53" dirty="0">
                 <a:latin typeface="Times New Roman" panose="02020603050405020304" pitchFamily="18" charset="0"/>
                 <a:cs typeface="Times New Roman" panose="02020603050405020304" pitchFamily="18" charset="0"/>
               </a:rPr>
               <a:t>3</a:t>
             </a:r>
             <a:r>
-              <a:rPr lang="en-US" sz="2200" spc="-53" baseline="30000" dirty="0">
+              <a:rPr lang="en-US" sz="2200" b="1" spc="-53" baseline="30000" dirty="0">
                 <a:latin typeface="Times New Roman" panose="02020603050405020304" pitchFamily="18" charset="0"/>
                 <a:cs typeface="Times New Roman" panose="02020603050405020304" pitchFamily="18" charset="0"/>
               </a:rPr>
               <a:t>rd</a:t>
             </a:r>
             <a:r>
+              <a:rPr lang="en-US" sz="2200" b="1" spc="-53" dirty="0">
+                <a:latin typeface="Times New Roman" panose="02020603050405020304" pitchFamily="18" charset="0"/>
+                <a:cs typeface="Times New Roman" panose="02020603050405020304" pitchFamily="18" charset="0"/>
+              </a:rPr>
+              <a:t> Quarter:</a:t>
+            </a:r>
+            <a:r>
               <a:rPr lang="en-US" sz="2200" spc="-53" dirty="0">
                 <a:latin typeface="Times New Roman" panose="02020603050405020304" pitchFamily="18" charset="0"/>
                 <a:cs typeface="Times New Roman" panose="02020603050405020304" pitchFamily="18" charset="0"/>
               </a:rPr>
-              <a:t> Quarter: Fund Collection, Work Order collection and Start Implementation</a:t>
+              <a:t> Fund Collection, Work Order collection and Start Implementation</a:t>
             </a:r>
           </a:p>
           <a:p>
-            <a:pPr marL="342900" indent="-342900" defTabSz="685800">
+            <a:pPr marL="342900" indent="-342900" algn="just" defTabSz="685800">
               <a:lnSpc>
                 <a:spcPct val="150000"/>
               </a:lnSpc>
@@ -30427,25 +30663,32 @@
               <a:defRPr/>
             </a:pPr>
             <a:r>
-              <a:rPr lang="en-US" sz="2200" spc="-53" dirty="0">
+              <a:rPr lang="en-US" sz="2200" b="1" spc="-53" dirty="0">
                 <a:latin typeface="Times New Roman" panose="02020603050405020304" pitchFamily="18" charset="0"/>
                 <a:cs typeface="Times New Roman" panose="02020603050405020304" pitchFamily="18" charset="0"/>
               </a:rPr>
               <a:t>4</a:t>
             </a:r>
             <a:r>
-              <a:rPr lang="en-US" sz="2200" spc="-53" baseline="30000" dirty="0">
+              <a:rPr lang="en-US" sz="2200" b="1" spc="-53" baseline="30000" dirty="0">
                 <a:latin typeface="Times New Roman" panose="02020603050405020304" pitchFamily="18" charset="0"/>
                 <a:cs typeface="Times New Roman" panose="02020603050405020304" pitchFamily="18" charset="0"/>
               </a:rPr>
               <a:t>th</a:t>
             </a:r>
             <a:r>
+              <a:rPr lang="en-US" sz="2200" b="1" spc="-53" dirty="0">
+                <a:latin typeface="Times New Roman" panose="02020603050405020304" pitchFamily="18" charset="0"/>
+                <a:cs typeface="Times New Roman" panose="02020603050405020304" pitchFamily="18" charset="0"/>
+              </a:rPr>
+              <a:t> Quarter:</a:t>
+            </a:r>
+            <a:r>
               <a:rPr lang="en-US" sz="2200" spc="-53" dirty="0">
                 <a:latin typeface="Times New Roman" panose="02020603050405020304" pitchFamily="18" charset="0"/>
                 <a:cs typeface="Times New Roman" panose="02020603050405020304" pitchFamily="18" charset="0"/>
               </a:rPr>
-              <a:t> Quarter: Monitoring, Evaluation, Management and Development</a:t>
+              <a:t> Monitoring, Evaluation, Management and Development</a:t>
             </a:r>
           </a:p>
           <a:p>
@@ -30586,7 +30829,12 @@
             <p:ph type="title"/>
           </p:nvPr>
         </p:nvSpPr>
-        <p:spPr/>
+        <p:spPr>
+          <a:xfrm>
+            <a:off x="457200" y="125838"/>
+            <a:ext cx="8229600" cy="487362"/>
+          </a:xfrm>
+        </p:spPr>
         <p:txBody>
           <a:bodyPr>
             <a:normAutofit fontScale="90000"/>
@@ -30631,13 +30879,13 @@
         </p:nvSpPr>
         <p:spPr>
           <a:xfrm>
-            <a:off x="527304" y="1295400"/>
-            <a:ext cx="8153400" cy="4425378"/>
+            <a:off x="527304" y="990600"/>
+            <a:ext cx="8153400" cy="4730178"/>
           </a:xfrm>
         </p:spPr>
         <p:txBody>
           <a:bodyPr>
-            <a:normAutofit fontScale="92500" lnSpcReduction="10000"/>
+            <a:normAutofit/>
           </a:bodyPr>
           <a:lstStyle/>
           <a:p>
@@ -30648,25 +30896,19 @@
               <a:buFont typeface="Wingdings" panose="05000000000000000000" pitchFamily="2" charset="2"/>
               <a:buChar char="§"/>
             </a:pPr>
-            <a:endParaRPr lang="en-US" sz="2400" dirty="0">
-              <a:latin typeface="Times New Roman" panose="02020603050405020304" pitchFamily="18" charset="0"/>
-              <a:cs typeface="Times New Roman" panose="02020603050405020304" pitchFamily="18" charset="0"/>
-            </a:endParaRPr>
-          </a:p>
-          <a:p>
-            <a:pPr algn="just">
-              <a:buClr>
-                <a:srgbClr val="C00000"/>
-              </a:buClr>
-              <a:buFont typeface="Wingdings" panose="05000000000000000000" pitchFamily="2" charset="2"/>
-              <a:buChar char="§"/>
-            </a:pPr>
             <a:r>
-              <a:rPr lang="en-US" sz="2400" dirty="0">
+              <a:rPr lang="en-US" sz="2200" b="1" dirty="0">
                 <a:latin typeface="Times New Roman" panose="02020603050405020304" pitchFamily="18" charset="0"/>
                 <a:cs typeface="Times New Roman" panose="02020603050405020304" pitchFamily="18" charset="0"/>
               </a:rPr>
-              <a:t>Establishment Area: Dhaka North City Corporation </a:t>
+              <a:t>Establishment Area:</a:t>
+            </a:r>
+            <a:r>
+              <a:rPr lang="en-US" sz="2200" dirty="0">
+                <a:latin typeface="Times New Roman" panose="02020603050405020304" pitchFamily="18" charset="0"/>
+                <a:cs typeface="Times New Roman" panose="02020603050405020304" pitchFamily="18" charset="0"/>
+              </a:rPr>
+              <a:t> Dhaka North City Corporation </a:t>
             </a:r>
           </a:p>
           <a:p>
@@ -30678,11 +30920,18 @@
               <a:buChar char="§"/>
             </a:pPr>
             <a:r>
-              <a:rPr lang="en-US" sz="2400" dirty="0">
+              <a:rPr lang="en-US" sz="2200" b="1" dirty="0">
                 <a:latin typeface="Times New Roman" panose="02020603050405020304" pitchFamily="18" charset="0"/>
                 <a:cs typeface="Times New Roman" panose="02020603050405020304" pitchFamily="18" charset="0"/>
               </a:rPr>
-              <a:t>Location of operations: 8 divisions of the Bangladesh</a:t>
+              <a:t>Location of Operations:</a:t>
+            </a:r>
+            <a:r>
+              <a:rPr lang="en-US" sz="2200" dirty="0">
+                <a:latin typeface="Times New Roman" panose="02020603050405020304" pitchFamily="18" charset="0"/>
+                <a:cs typeface="Times New Roman" panose="02020603050405020304" pitchFamily="18" charset="0"/>
+              </a:rPr>
+              <a:t> 8 divisions of the Bangladesh</a:t>
             </a:r>
           </a:p>
           <a:p>
@@ -30694,11 +30943,18 @@
               <a:buChar char="§"/>
             </a:pPr>
             <a:r>
-              <a:rPr lang="en-US" sz="2400" dirty="0">
+              <a:rPr lang="en-US" sz="2200" b="1" dirty="0">
                 <a:latin typeface="Times New Roman" panose="02020603050405020304" pitchFamily="18" charset="0"/>
                 <a:cs typeface="Times New Roman" panose="02020603050405020304" pitchFamily="18" charset="0"/>
               </a:rPr>
-              <a:t>Incorporation Certificate No.: 127679-2015 (Annex-1)</a:t>
+              <a:t>Incorporation Certificate No.:</a:t>
+            </a:r>
+            <a:r>
+              <a:rPr lang="en-US" sz="2200" dirty="0">
+                <a:latin typeface="Times New Roman" panose="02020603050405020304" pitchFamily="18" charset="0"/>
+                <a:cs typeface="Times New Roman" panose="02020603050405020304" pitchFamily="18" charset="0"/>
+              </a:rPr>
+              <a:t> 127679-2015 (Annex-1)</a:t>
             </a:r>
           </a:p>
           <a:p>
@@ -30710,11 +30966,18 @@
               <a:buChar char="§"/>
             </a:pPr>
             <a:r>
-              <a:rPr lang="en-US" sz="2400" dirty="0">
+              <a:rPr lang="en-US" sz="2200" b="1" dirty="0">
                 <a:latin typeface="Times New Roman" panose="02020603050405020304" pitchFamily="18" charset="0"/>
                 <a:cs typeface="Times New Roman" panose="02020603050405020304" pitchFamily="18" charset="0"/>
               </a:rPr>
-              <a:t>Trade License No.: 05-28140 (BNCC) (Annex-1)</a:t>
+              <a:t>Trade License No.: </a:t>
+            </a:r>
+            <a:r>
+              <a:rPr lang="en-US" sz="2200" dirty="0">
+                <a:latin typeface="Times New Roman" panose="02020603050405020304" pitchFamily="18" charset="0"/>
+                <a:cs typeface="Times New Roman" panose="02020603050405020304" pitchFamily="18" charset="0"/>
+              </a:rPr>
+              <a:t>05-28140 (BNCC) (Annex-1)</a:t>
             </a:r>
           </a:p>
           <a:p>
@@ -30726,11 +30989,18 @@
               <a:buChar char="§"/>
             </a:pPr>
             <a:r>
-              <a:rPr lang="en-US" sz="2400" dirty="0">
+              <a:rPr lang="en-US" sz="2200" b="1" dirty="0">
                 <a:latin typeface="Times New Roman" panose="02020603050405020304" pitchFamily="18" charset="0"/>
                 <a:cs typeface="Times New Roman" panose="02020603050405020304" pitchFamily="18" charset="0"/>
               </a:rPr>
-              <a:t>TIN Certificate No.: 839930663812 (Annex-1)</a:t>
+              <a:t>TIN Certificate No.: </a:t>
+            </a:r>
+            <a:r>
+              <a:rPr lang="en-US" sz="2200" dirty="0">
+                <a:latin typeface="Times New Roman" panose="02020603050405020304" pitchFamily="18" charset="0"/>
+                <a:cs typeface="Times New Roman" panose="02020603050405020304" pitchFamily="18" charset="0"/>
+              </a:rPr>
+              <a:t>839930663812 (Annex-1)</a:t>
             </a:r>
           </a:p>
           <a:p>
@@ -30742,11 +31012,11 @@
               <a:buChar char="§"/>
             </a:pPr>
             <a:r>
-              <a:rPr lang="en-US" sz="2400" b="1" dirty="0">
+              <a:rPr lang="en-US" sz="2200" b="1" dirty="0">
                 <a:latin typeface="Times New Roman" panose="02020603050405020304" pitchFamily="18" charset="0"/>
                 <a:cs typeface="Times New Roman" panose="02020603050405020304" pitchFamily="18" charset="0"/>
               </a:rPr>
-              <a:t>Mission and objectives of the startup:</a:t>
+              <a:t>Mission and Objectives of the Startup:</a:t>
             </a:r>
           </a:p>
           <a:p>
@@ -30757,11 +31027,11 @@
               <a:buNone/>
             </a:pPr>
             <a:r>
-              <a:rPr lang="en-US" sz="2400" dirty="0">
+              <a:rPr lang="en-US" sz="2200" dirty="0">
                 <a:latin typeface="Times New Roman" panose="02020603050405020304" pitchFamily="18" charset="0"/>
                 <a:cs typeface="Times New Roman" panose="02020603050405020304" pitchFamily="18" charset="0"/>
               </a:rPr>
-              <a:t>The mission is to establish Socheton as the number one online platform in the country that will be affordable and sustainable.</a:t>
+              <a:t>	The mission is to establish Socheton as the number one online platform in the country that will be affordable and sustainable.</a:t>
             </a:r>
           </a:p>
           <a:p>
@@ -30772,11 +31042,11 @@
               <a:buNone/>
             </a:pPr>
             <a:r>
-              <a:rPr lang="en-US" sz="2400" dirty="0">
+              <a:rPr lang="en-US" sz="2200" dirty="0">
                 <a:latin typeface="Times New Roman" panose="02020603050405020304" pitchFamily="18" charset="0"/>
                 <a:cs typeface="Times New Roman" panose="02020603050405020304" pitchFamily="18" charset="0"/>
               </a:rPr>
-              <a:t>The objective is to meeting the country's academic, vocational and technical demand for distance learning activities as well as adapting to national and international markets.</a:t>
+              <a:t>	The objective is to meeting the country's academic, vocational and technical demand for distance learning activities as well as adapting to national and international markets.</a:t>
             </a:r>
           </a:p>
         </p:txBody>
@@ -30870,13 +31140,19 @@
           <a:lstStyle/>
           <a:p>
             <a:r>
+              <a:rPr lang="en-US" sz="3200" b="1" i="1" u="sng" spc="-53" dirty="0">
+                <a:latin typeface="Times New Roman" panose="02020603050405020304" pitchFamily="18" charset="0"/>
+                <a:cs typeface="Times New Roman" panose="02020603050405020304" pitchFamily="18" charset="0"/>
+              </a:rPr>
+              <a:t>Implementation</a:t>
+            </a:r>
+            <a:r>
               <a:rPr lang="en-US" sz="3600" b="1" i="1" u="sng" spc="-53" dirty="0">
                 <a:latin typeface="Times New Roman" panose="02020603050405020304" pitchFamily="18" charset="0"/>
                 <a:cs typeface="Times New Roman" panose="02020603050405020304" pitchFamily="18" charset="0"/>
               </a:rPr>
-              <a:t>Quarterly Plan (4 Qtrs.) - Technical</a:t>
+              <a:t> Plan</a:t>
             </a:r>
-            <a:endParaRPr lang="en-US" b="1" i="1" u="sng" dirty="0"/>
           </a:p>
         </p:txBody>
       </p:sp>
@@ -30892,20 +31168,23 @@
         </p:nvSpPr>
         <p:spPr>
           <a:xfrm>
-            <a:off x="457200" y="1066801"/>
-            <a:ext cx="8229600" cy="4419600"/>
+            <a:off x="457200" y="1066800"/>
+            <a:ext cx="8229600" cy="4571999"/>
           </a:xfrm>
         </p:spPr>
         <p:txBody>
           <a:bodyPr>
-            <a:normAutofit fontScale="70000" lnSpcReduction="20000"/>
+            <a:normAutofit fontScale="25000" lnSpcReduction="20000"/>
           </a:bodyPr>
           <a:lstStyle/>
           <a:p>
-            <a:pPr marL="0" indent="0" defTabSz="685800">
+            <a:pPr marL="0" indent="0" algn="just" defTabSz="685800">
               <a:lnSpc>
-                <a:spcPct val="150000"/>
+                <a:spcPct val="170000"/>
               </a:lnSpc>
+              <a:spcBef>
+                <a:spcPts val="0"/>
+              </a:spcBef>
               <a:buClr>
                 <a:srgbClr val="C00000"/>
               </a:buClr>
@@ -30913,121 +31192,179 @@
               <a:defRPr/>
             </a:pPr>
             <a:r>
-              <a:rPr lang="en-US" b="1" spc="-53" dirty="0">
+              <a:rPr lang="en-US" sz="8800" b="1" spc="-53" dirty="0">
                 <a:latin typeface="Times New Roman" panose="02020603050405020304" pitchFamily="18" charset="0"/>
                 <a:cs typeface="Times New Roman" panose="02020603050405020304" pitchFamily="18" charset="0"/>
               </a:rPr>
-              <a:t>Quarterly Plan (4 Qtrs.) – Business</a:t>
+              <a:t>Quarterly Plan (4 Qtrs.) – Technical</a:t>
             </a:r>
           </a:p>
           <a:p>
-            <a:pPr defTabSz="685800">
+            <a:pPr algn="just" defTabSz="685800">
               <a:lnSpc>
-                <a:spcPct val="150000"/>
+                <a:spcPct val="170000"/>
               </a:lnSpc>
+              <a:spcBef>
+                <a:spcPts val="0"/>
+              </a:spcBef>
               <a:buClr>
                 <a:srgbClr val="C00000"/>
               </a:buClr>
               <a:defRPr/>
             </a:pPr>
             <a:r>
-              <a:rPr lang="en-US" spc="-53" dirty="0">
+              <a:rPr lang="en-US" sz="8800" b="1" spc="-53" dirty="0">
                 <a:latin typeface="Times New Roman" panose="02020603050405020304" pitchFamily="18" charset="0"/>
                 <a:cs typeface="Times New Roman" panose="02020603050405020304" pitchFamily="18" charset="0"/>
               </a:rPr>
               <a:t>1</a:t>
             </a:r>
             <a:r>
-              <a:rPr lang="en-US" spc="-53" baseline="30000" dirty="0">
+              <a:rPr lang="en-US" sz="8800" b="1" spc="-53" baseline="30000" dirty="0">
                 <a:latin typeface="Times New Roman" panose="02020603050405020304" pitchFamily="18" charset="0"/>
                 <a:cs typeface="Times New Roman" panose="02020603050405020304" pitchFamily="18" charset="0"/>
               </a:rPr>
               <a:t>st</a:t>
             </a:r>
             <a:r>
-              <a:rPr lang="en-US" spc="-53" dirty="0">
+              <a:rPr lang="en-US" sz="8800" b="1" spc="-53" dirty="0">
                 <a:latin typeface="Times New Roman" panose="02020603050405020304" pitchFamily="18" charset="0"/>
                 <a:cs typeface="Times New Roman" panose="02020603050405020304" pitchFamily="18" charset="0"/>
               </a:rPr>
-              <a:t> Quarter: Web Page Development with integrated facilities 2</a:t>
+              <a:t> Quarter:</a:t>
             </a:r>
             <a:r>
-              <a:rPr lang="en-US" spc="-53" baseline="30000" dirty="0">
+              <a:rPr lang="en-US" sz="8800" spc="-53" dirty="0">
+                <a:latin typeface="Times New Roman" panose="02020603050405020304" pitchFamily="18" charset="0"/>
+                <a:cs typeface="Times New Roman" panose="02020603050405020304" pitchFamily="18" charset="0"/>
+              </a:rPr>
+              <a:t> Web Page Development with integrated facilities</a:t>
+            </a:r>
+          </a:p>
+          <a:p>
+            <a:pPr algn="just" defTabSz="685800">
+              <a:lnSpc>
+                <a:spcPct val="170000"/>
+              </a:lnSpc>
+              <a:spcBef>
+                <a:spcPts val="0"/>
+              </a:spcBef>
+              <a:buClr>
+                <a:srgbClr val="C00000"/>
+              </a:buClr>
+              <a:defRPr/>
+            </a:pPr>
+            <a:r>
+              <a:rPr lang="en-US" sz="8800" b="1" spc="-53" dirty="0">
+                <a:latin typeface="Times New Roman" panose="02020603050405020304" pitchFamily="18" charset="0"/>
+                <a:cs typeface="Times New Roman" panose="02020603050405020304" pitchFamily="18" charset="0"/>
+              </a:rPr>
+              <a:t>2</a:t>
+            </a:r>
+            <a:r>
+              <a:rPr lang="en-US" sz="8800" b="1" spc="-53" baseline="30000" dirty="0">
                 <a:latin typeface="Times New Roman" panose="02020603050405020304" pitchFamily="18" charset="0"/>
                 <a:cs typeface="Times New Roman" panose="02020603050405020304" pitchFamily="18" charset="0"/>
               </a:rPr>
               <a:t>nd</a:t>
             </a:r>
             <a:r>
-              <a:rPr lang="en-US" spc="-53" dirty="0">
+              <a:rPr lang="en-US" sz="8800" b="1" spc="-53" dirty="0">
                 <a:latin typeface="Times New Roman" panose="02020603050405020304" pitchFamily="18" charset="0"/>
                 <a:cs typeface="Times New Roman" panose="02020603050405020304" pitchFamily="18" charset="0"/>
               </a:rPr>
-              <a:t> Quarter: Demo Classroom Preparation, Test Class start, Virtual coaching start, Problems identifications and solutions for clear live class productions.</a:t>
+              <a:t> Quarter:</a:t>
+            </a:r>
+            <a:r>
+              <a:rPr lang="en-US" sz="8800" spc="-53" dirty="0">
+                <a:latin typeface="Times New Roman" panose="02020603050405020304" pitchFamily="18" charset="0"/>
+                <a:cs typeface="Times New Roman" panose="02020603050405020304" pitchFamily="18" charset="0"/>
+              </a:rPr>
+              <a:t> Demo Classroom Preparation, Test Class start, Virtual coaching start, Problems identifications and solutions for clear live class productions.</a:t>
             </a:r>
           </a:p>
           <a:p>
-            <a:pPr defTabSz="685800">
+            <a:pPr algn="just" defTabSz="685800">
               <a:lnSpc>
-                <a:spcPct val="150000"/>
+                <a:spcPct val="170000"/>
               </a:lnSpc>
+              <a:spcBef>
+                <a:spcPts val="0"/>
+              </a:spcBef>
               <a:buClr>
                 <a:srgbClr val="C00000"/>
               </a:buClr>
               <a:defRPr/>
             </a:pPr>
             <a:r>
-              <a:rPr lang="en-US" spc="-53" dirty="0">
+              <a:rPr lang="en-US" sz="8800" b="1" spc="-53" dirty="0">
                 <a:latin typeface="Times New Roman" panose="02020603050405020304" pitchFamily="18" charset="0"/>
                 <a:cs typeface="Times New Roman" panose="02020603050405020304" pitchFamily="18" charset="0"/>
               </a:rPr>
               <a:t>3</a:t>
             </a:r>
             <a:r>
-              <a:rPr lang="en-US" spc="-53" baseline="30000" dirty="0">
+              <a:rPr lang="en-US" sz="8800" b="1" spc="-53" baseline="30000" dirty="0">
                 <a:latin typeface="Times New Roman" panose="02020603050405020304" pitchFamily="18" charset="0"/>
                 <a:cs typeface="Times New Roman" panose="02020603050405020304" pitchFamily="18" charset="0"/>
               </a:rPr>
               <a:t>rd</a:t>
             </a:r>
             <a:r>
-              <a:rPr lang="en-US" spc="-53" dirty="0">
+              <a:rPr lang="en-US" sz="8800" b="1" spc="-53" dirty="0">
                 <a:latin typeface="Times New Roman" panose="02020603050405020304" pitchFamily="18" charset="0"/>
                 <a:cs typeface="Times New Roman" panose="02020603050405020304" pitchFamily="18" charset="0"/>
               </a:rPr>
-              <a:t> Quarter: Classroom preparation, project running, day-to-day IT problems solutions, Digital revenue generations.</a:t>
+              <a:t> Quarter:</a:t>
+            </a:r>
+            <a:r>
+              <a:rPr lang="en-US" sz="8800" spc="-53" dirty="0">
+                <a:latin typeface="Times New Roman" panose="02020603050405020304" pitchFamily="18" charset="0"/>
+                <a:cs typeface="Times New Roman" panose="02020603050405020304" pitchFamily="18" charset="0"/>
+              </a:rPr>
+              <a:t> Classroom preparation, project running, day-to-day IT problems solutions, Digital revenue generations.</a:t>
             </a:r>
           </a:p>
           <a:p>
-            <a:pPr defTabSz="685800">
+            <a:pPr algn="just" defTabSz="685800">
               <a:lnSpc>
-                <a:spcPct val="150000"/>
+                <a:spcPct val="170000"/>
               </a:lnSpc>
+              <a:spcBef>
+                <a:spcPts val="0"/>
+              </a:spcBef>
               <a:buClr>
                 <a:srgbClr val="C00000"/>
               </a:buClr>
               <a:defRPr/>
             </a:pPr>
             <a:r>
-              <a:rPr lang="en-US" spc="-53" dirty="0">
+              <a:rPr lang="en-US" sz="8800" b="1" spc="-53" dirty="0">
                 <a:latin typeface="Times New Roman" panose="02020603050405020304" pitchFamily="18" charset="0"/>
                 <a:cs typeface="Times New Roman" panose="02020603050405020304" pitchFamily="18" charset="0"/>
               </a:rPr>
               <a:t>4</a:t>
             </a:r>
             <a:r>
-              <a:rPr lang="en-US" spc="-53" baseline="30000" dirty="0">
+              <a:rPr lang="en-US" sz="8800" b="1" spc="-53" baseline="30000" dirty="0">
                 <a:latin typeface="Times New Roman" panose="02020603050405020304" pitchFamily="18" charset="0"/>
                 <a:cs typeface="Times New Roman" panose="02020603050405020304" pitchFamily="18" charset="0"/>
               </a:rPr>
               <a:t>th</a:t>
             </a:r>
             <a:r>
-              <a:rPr lang="en-US" spc="-53" dirty="0">
+              <a:rPr lang="en-US" sz="8800" b="1" spc="-53" dirty="0">
                 <a:latin typeface="Times New Roman" panose="02020603050405020304" pitchFamily="18" charset="0"/>
                 <a:cs typeface="Times New Roman" panose="02020603050405020304" pitchFamily="18" charset="0"/>
               </a:rPr>
-              <a:t> Quarter: Advance Technology adding, Game Development, Monitoring, Evaluation, Management and Development</a:t>
+              <a:t> Quarter:</a:t>
+            </a:r>
+            <a:r>
+              <a:rPr lang="en-US" sz="8800" spc="-53" dirty="0">
+                <a:latin typeface="Times New Roman" panose="02020603050405020304" pitchFamily="18" charset="0"/>
+                <a:cs typeface="Times New Roman" panose="02020603050405020304" pitchFamily="18" charset="0"/>
+              </a:rPr>
+              <a:t> Advance Technology adding, Game Development, Monitoring, Evaluation, Management and Development</a:t>
             </a:r>
           </a:p>
           <a:p>
@@ -31116,8 +31453,8 @@
         </p:nvSpPr>
         <p:spPr>
           <a:xfrm>
-            <a:off x="457200" y="274638"/>
-            <a:ext cx="8229600" cy="639762"/>
+            <a:off x="457200" y="152400"/>
+            <a:ext cx="8229600" cy="609600"/>
           </a:xfrm>
         </p:spPr>
         <p:txBody>
@@ -31131,7 +31468,7 @@
                 <a:latin typeface="Times New Roman" panose="02020603050405020304" pitchFamily="18" charset="0"/>
                 <a:cs typeface="Times New Roman" panose="02020603050405020304" pitchFamily="18" charset="0"/>
               </a:rPr>
-              <a:t>Quarterly Plan (4 Qtrs.) - Financial</a:t>
+              <a:t>Implementation Plan</a:t>
             </a:r>
             <a:endParaRPr lang="en-US" b="1" i="1" u="sng" dirty="0"/>
           </a:p>
@@ -31149,145 +31486,208 @@
         </p:nvSpPr>
         <p:spPr>
           <a:xfrm>
-            <a:off x="457200" y="1166019"/>
-            <a:ext cx="8229600" cy="3939382"/>
+            <a:off x="457200" y="762000"/>
+            <a:ext cx="8229600" cy="4953000"/>
           </a:xfrm>
         </p:spPr>
         <p:txBody>
           <a:bodyPr>
-            <a:normAutofit fontScale="70000" lnSpcReduction="20000"/>
+            <a:noAutofit/>
           </a:bodyPr>
           <a:lstStyle/>
           <a:p>
-            <a:pPr defTabSz="685800">
+            <a:pPr marL="0" indent="0" algn="just" defTabSz="685800">
               <a:lnSpc>
                 <a:spcPct val="150000"/>
               </a:lnSpc>
+              <a:spcBef>
+                <a:spcPts val="0"/>
+              </a:spcBef>
+              <a:buClr>
+                <a:srgbClr val="C00000"/>
+              </a:buClr>
+              <a:buNone/>
+              <a:defRPr/>
+            </a:pPr>
+            <a:r>
+              <a:rPr lang="en-US" sz="2200" b="1" spc="-53" dirty="0">
+                <a:latin typeface="Times New Roman" panose="02020603050405020304" pitchFamily="18" charset="0"/>
+                <a:cs typeface="Times New Roman" panose="02020603050405020304" pitchFamily="18" charset="0"/>
+              </a:rPr>
+              <a:t>Quarterly Plan (4 Qtrs.) – Financial</a:t>
+            </a:r>
+          </a:p>
+          <a:p>
+            <a:pPr algn="just" defTabSz="685800">
+              <a:lnSpc>
+                <a:spcPct val="150000"/>
+              </a:lnSpc>
+              <a:spcBef>
+                <a:spcPts val="0"/>
+              </a:spcBef>
               <a:buClr>
                 <a:srgbClr val="C00000"/>
               </a:buClr>
               <a:defRPr/>
             </a:pPr>
             <a:r>
-              <a:rPr lang="en-US" spc="-53" dirty="0">
+              <a:rPr lang="en-US" sz="2200" b="1" spc="-53" dirty="0">
                 <a:latin typeface="Times New Roman" panose="02020603050405020304" pitchFamily="18" charset="0"/>
                 <a:cs typeface="Times New Roman" panose="02020603050405020304" pitchFamily="18" charset="0"/>
               </a:rPr>
               <a:t>1</a:t>
             </a:r>
             <a:r>
-              <a:rPr lang="en-US" spc="-53" baseline="30000" dirty="0">
+              <a:rPr lang="en-US" sz="2200" b="1" spc="-53" baseline="30000" dirty="0">
                 <a:latin typeface="Times New Roman" panose="02020603050405020304" pitchFamily="18" charset="0"/>
                 <a:cs typeface="Times New Roman" panose="02020603050405020304" pitchFamily="18" charset="0"/>
               </a:rPr>
               <a:t>st</a:t>
             </a:r>
             <a:r>
-              <a:rPr lang="en-US" spc="-53" dirty="0">
+              <a:rPr lang="en-US" sz="2200" b="1" spc="-53" dirty="0">
                 <a:latin typeface="Times New Roman" panose="02020603050405020304" pitchFamily="18" charset="0"/>
                 <a:cs typeface="Times New Roman" panose="02020603050405020304" pitchFamily="18" charset="0"/>
               </a:rPr>
-              <a:t> Quarter: Application for fund, contact for personal fund, Collect different source of fund, Prepare a presentation and show to funding authorities</a:t>
+              <a:t> Quarter:</a:t>
+            </a:r>
+            <a:r>
+              <a:rPr lang="en-US" sz="2200" spc="-53" dirty="0">
+                <a:latin typeface="Times New Roman" panose="02020603050405020304" pitchFamily="18" charset="0"/>
+                <a:cs typeface="Times New Roman" panose="02020603050405020304" pitchFamily="18" charset="0"/>
+              </a:rPr>
+              <a:t> Application for fund, contact for personal fund, Collect different source of fund, Prepare a presentation and show to funding authorities</a:t>
             </a:r>
           </a:p>
           <a:p>
-            <a:pPr defTabSz="685800">
+            <a:pPr algn="just" defTabSz="685800">
               <a:lnSpc>
                 <a:spcPct val="150000"/>
               </a:lnSpc>
+              <a:spcBef>
+                <a:spcPts val="0"/>
+              </a:spcBef>
               <a:buClr>
                 <a:srgbClr val="C00000"/>
               </a:buClr>
               <a:defRPr/>
             </a:pPr>
             <a:r>
-              <a:rPr lang="en-US" spc="-53" dirty="0">
+              <a:rPr lang="en-US" sz="2200" b="1" spc="-53" dirty="0">
                 <a:latin typeface="Times New Roman" panose="02020603050405020304" pitchFamily="18" charset="0"/>
                 <a:cs typeface="Times New Roman" panose="02020603050405020304" pitchFamily="18" charset="0"/>
               </a:rPr>
               <a:t>2</a:t>
             </a:r>
             <a:r>
-              <a:rPr lang="en-US" spc="-53" baseline="30000" dirty="0">
+              <a:rPr lang="en-US" sz="2200" b="1" spc="-53" baseline="30000" dirty="0">
                 <a:latin typeface="Times New Roman" panose="02020603050405020304" pitchFamily="18" charset="0"/>
                 <a:cs typeface="Times New Roman" panose="02020603050405020304" pitchFamily="18" charset="0"/>
               </a:rPr>
               <a:t>nd</a:t>
             </a:r>
             <a:r>
-              <a:rPr lang="en-US" spc="-53" dirty="0">
+              <a:rPr lang="en-US" sz="2200" b="1" spc="-53" dirty="0">
                 <a:latin typeface="Times New Roman" panose="02020603050405020304" pitchFamily="18" charset="0"/>
                 <a:cs typeface="Times New Roman" panose="02020603050405020304" pitchFamily="18" charset="0"/>
               </a:rPr>
-              <a:t> Quarter: Collect project fund, work order fund, start a live coaching center for regular activities, fund use for different purposed </a:t>
+              <a:t> Quarter:</a:t>
+            </a:r>
+            <a:r>
+              <a:rPr lang="en-US" sz="2200" spc="-53" dirty="0">
+                <a:latin typeface="Times New Roman" panose="02020603050405020304" pitchFamily="18" charset="0"/>
+                <a:cs typeface="Times New Roman" panose="02020603050405020304" pitchFamily="18" charset="0"/>
+              </a:rPr>
+              <a:t> Collect project fund, work order fund, start a live coaching center for regular activities, fund use for different purposed </a:t>
             </a:r>
           </a:p>
           <a:p>
-            <a:pPr defTabSz="685800">
+            <a:pPr algn="just" defTabSz="685800">
               <a:lnSpc>
                 <a:spcPct val="150000"/>
               </a:lnSpc>
+              <a:spcBef>
+                <a:spcPts val="0"/>
+              </a:spcBef>
               <a:buClr>
                 <a:srgbClr val="C00000"/>
               </a:buClr>
               <a:defRPr/>
             </a:pPr>
             <a:r>
-              <a:rPr lang="en-US" spc="-53" dirty="0">
+              <a:rPr lang="en-US" sz="2200" b="1" spc="-53" dirty="0">
                 <a:latin typeface="Times New Roman" panose="02020603050405020304" pitchFamily="18" charset="0"/>
                 <a:cs typeface="Times New Roman" panose="02020603050405020304" pitchFamily="18" charset="0"/>
               </a:rPr>
               <a:t>3</a:t>
             </a:r>
             <a:r>
-              <a:rPr lang="en-US" spc="-53" baseline="30000" dirty="0">
+              <a:rPr lang="en-US" sz="2200" b="1" spc="-53" baseline="30000" dirty="0">
                 <a:latin typeface="Times New Roman" panose="02020603050405020304" pitchFamily="18" charset="0"/>
                 <a:cs typeface="Times New Roman" panose="02020603050405020304" pitchFamily="18" charset="0"/>
               </a:rPr>
               <a:t>rd</a:t>
             </a:r>
             <a:r>
-              <a:rPr lang="en-US" spc="-53" dirty="0">
+              <a:rPr lang="en-US" sz="2200" b="1" spc="-53" dirty="0">
                 <a:latin typeface="Times New Roman" panose="02020603050405020304" pitchFamily="18" charset="0"/>
                 <a:cs typeface="Times New Roman" panose="02020603050405020304" pitchFamily="18" charset="0"/>
               </a:rPr>
-              <a:t> Quarter: Revenue collections and fund generation.</a:t>
+              <a:t> Quarter:</a:t>
+            </a:r>
+            <a:r>
+              <a:rPr lang="en-US" sz="2200" spc="-53" dirty="0">
+                <a:latin typeface="Times New Roman" panose="02020603050405020304" pitchFamily="18" charset="0"/>
+                <a:cs typeface="Times New Roman" panose="02020603050405020304" pitchFamily="18" charset="0"/>
+              </a:rPr>
+              <a:t> Revenue collections and fund generation.</a:t>
             </a:r>
           </a:p>
           <a:p>
-            <a:pPr defTabSz="685800">
+            <a:pPr algn="just" defTabSz="685800">
               <a:lnSpc>
                 <a:spcPct val="150000"/>
               </a:lnSpc>
+              <a:spcBef>
+                <a:spcPts val="0"/>
+              </a:spcBef>
               <a:buClr>
                 <a:srgbClr val="C00000"/>
               </a:buClr>
               <a:defRPr/>
             </a:pPr>
             <a:r>
-              <a:rPr lang="en-US" spc="-53" dirty="0">
+              <a:rPr lang="en-US" sz="2200" b="1" spc="-53" dirty="0">
                 <a:latin typeface="Times New Roman" panose="02020603050405020304" pitchFamily="18" charset="0"/>
                 <a:cs typeface="Times New Roman" panose="02020603050405020304" pitchFamily="18" charset="0"/>
               </a:rPr>
               <a:t>4</a:t>
             </a:r>
             <a:r>
-              <a:rPr lang="en-US" spc="-53" baseline="30000" dirty="0">
+              <a:rPr lang="en-US" sz="2200" b="1" spc="-53" baseline="30000" dirty="0">
                 <a:latin typeface="Times New Roman" panose="02020603050405020304" pitchFamily="18" charset="0"/>
                 <a:cs typeface="Times New Roman" panose="02020603050405020304" pitchFamily="18" charset="0"/>
               </a:rPr>
               <a:t>th</a:t>
             </a:r>
             <a:r>
-              <a:rPr lang="en-US" spc="-53" dirty="0">
+              <a:rPr lang="en-US" sz="2200" b="1" spc="-53" dirty="0">
                 <a:latin typeface="Times New Roman" panose="02020603050405020304" pitchFamily="18" charset="0"/>
                 <a:cs typeface="Times New Roman" panose="02020603050405020304" pitchFamily="18" charset="0"/>
               </a:rPr>
-              <a:t> Quarter: Advance Technology adding, Research and Development investment, Monitoring, Evaluation, Management and Training program</a:t>
+              <a:t> Quarter: </a:t>
+            </a:r>
+            <a:r>
+              <a:rPr lang="en-US" sz="2200" spc="-53" dirty="0">
+                <a:latin typeface="Times New Roman" panose="02020603050405020304" pitchFamily="18" charset="0"/>
+                <a:cs typeface="Times New Roman" panose="02020603050405020304" pitchFamily="18" charset="0"/>
+              </a:rPr>
+              <a:t>Advance Technology adding, Research and Development investment, Monitoring, Evaluation, Management and Training program</a:t>
             </a:r>
           </a:p>
           <a:p>
-            <a:endParaRPr lang="en-US" dirty="0"/>
+            <a:pPr algn="just"/>
+            <a:endParaRPr lang="en-US" sz="2200" dirty="0"/>
           </a:p>
         </p:txBody>
       </p:sp>
@@ -31369,8 +31769,8 @@
         </p:nvSpPr>
         <p:spPr>
           <a:xfrm>
-            <a:off x="457200" y="3048000"/>
-            <a:ext cx="8229600" cy="1143000"/>
+            <a:off x="2743200" y="2857500"/>
+            <a:ext cx="3657600" cy="1143000"/>
           </a:xfrm>
         </p:spPr>
         <p:txBody>
@@ -31517,10 +31917,15 @@
             <p:ph type="title"/>
           </p:nvPr>
         </p:nvSpPr>
-        <p:spPr/>
+        <p:spPr>
+          <a:xfrm>
+            <a:off x="457200" y="118034"/>
+            <a:ext cx="8229600" cy="517525"/>
+          </a:xfrm>
+        </p:spPr>
         <p:txBody>
           <a:bodyPr>
-            <a:normAutofit/>
+            <a:noAutofit/>
           </a:bodyPr>
           <a:lstStyle/>
           <a:p>
@@ -31546,8 +31951,8 @@
         </p:nvSpPr>
         <p:spPr>
           <a:xfrm>
-            <a:off x="439003" y="1143000"/>
-            <a:ext cx="8229600" cy="4525963"/>
+            <a:off x="439003" y="990600"/>
+            <a:ext cx="8229600" cy="4678363"/>
           </a:xfrm>
         </p:spPr>
         <p:txBody>

</xml_diff>